<commit_message>
Images node 9981 contra accounts
</commit_message>
<xml_diff>
--- a/en/accounting/other functions/node_9981_images.pptx
+++ b/en/accounting/other functions/node_9981_images.pptx
@@ -6,6 +6,7 @@
   </p:sldMasterIdLst>
   <p:sldIdLst>
     <p:sldId id="256" r:id="rId2"/>
+    <p:sldId id="257" r:id="rId3"/>
   </p:sldIdLst>
   <p:sldSz cx="12192000" cy="6858000"/>
   <p:notesSz cx="6858000" cy="9144000"/>
@@ -3344,10 +3345,837 @@
       </p:grpSpPr>
       <p:pic>
         <p:nvPicPr>
-          <p:cNvPr id="5" name="Immagine 4">
-            <a:extLst>
-              <a:ext uri="{FF2B5EF4-FFF2-40B4-BE49-F238E27FC236}">
-                <a16:creationId xmlns:a16="http://schemas.microsoft.com/office/drawing/2014/main" id="{A733F23E-A783-71D0-0679-E377DE66CAF7}"/>
+          <p:cNvPr id="18" name="Immagine 17">
+            <a:extLst>
+              <a:ext uri="{FF2B5EF4-FFF2-40B4-BE49-F238E27FC236}">
+                <a16:creationId xmlns:a16="http://schemas.microsoft.com/office/drawing/2014/main" id="{7ADBDFAD-E7B0-F0FE-FEB7-3F0161D6856C}"/>
+              </a:ext>
+            </a:extLst>
+          </p:cNvPr>
+          <p:cNvPicPr>
+            <a:picLocks noChangeAspect="1"/>
+          </p:cNvPicPr>
+          <p:nvPr/>
+        </p:nvPicPr>
+        <p:blipFill>
+          <a:blip r:embed="rId2">
+            <a:extLst>
+              <a:ext uri="{28A0092B-C50C-407E-A947-70E740481C1C}">
+                <a14:useLocalDpi xmlns:a14="http://schemas.microsoft.com/office/drawing/2010/main" val="0"/>
+              </a:ext>
+            </a:extLst>
+          </a:blip>
+          <a:stretch>
+            <a:fillRect/>
+          </a:stretch>
+        </p:blipFill>
+        <p:spPr>
+          <a:xfrm>
+            <a:off x="54430" y="985623"/>
+            <a:ext cx="12192000" cy="5409259"/>
+          </a:xfrm>
+          <a:prstGeom prst="rect">
+            <a:avLst/>
+          </a:prstGeom>
+        </p:spPr>
+      </p:pic>
+      <p:sp>
+        <p:nvSpPr>
+          <p:cNvPr id="7" name="CasellaDiTesto 6">
+            <a:extLst>
+              <a:ext uri="{FF2B5EF4-FFF2-40B4-BE49-F238E27FC236}">
+                <a16:creationId xmlns:a16="http://schemas.microsoft.com/office/drawing/2014/main" id="{39FB5C5B-84C9-B056-08CC-B9B3EBC4D0FA}"/>
+              </a:ext>
+            </a:extLst>
+          </p:cNvPr>
+          <p:cNvSpPr txBox="1"/>
+          <p:nvPr/>
+        </p:nvSpPr>
+        <p:spPr>
+          <a:xfrm>
+            <a:off x="9368160" y="2119951"/>
+            <a:ext cx="640934" cy="2246769"/>
+          </a:xfrm>
+          <a:prstGeom prst="rect">
+            <a:avLst/>
+          </a:prstGeom>
+          <a:noFill/>
+        </p:spPr>
+        <p:txBody>
+          <a:bodyPr wrap="square">
+            <a:spAutoFit/>
+          </a:bodyPr>
+          <a:lstStyle/>
+          <a:p>
+            <a:endParaRPr lang="de-CH" sz="2000" dirty="0">
+              <a:solidFill>
+                <a:srgbClr val="FF0000"/>
+              </a:solidFill>
+              <a:effectLst/>
+              <a:latin typeface="Calibri" panose="020F0502020204030204" pitchFamily="34" charset="0"/>
+              <a:ea typeface="DengXian" panose="02010600030101010101" pitchFamily="2" charset="-122"/>
+              <a:cs typeface="Times New Roman" panose="02020603050405020304" pitchFamily="18" charset="0"/>
+              <a:sym typeface="Wingdings" panose="05000000000000000000" pitchFamily="2" charset="2"/>
+            </a:endParaRPr>
+          </a:p>
+          <a:p>
+            <a:endParaRPr lang="de-CH" sz="2000" dirty="0">
+              <a:solidFill>
+                <a:srgbClr val="FF0000"/>
+              </a:solidFill>
+              <a:effectLst/>
+              <a:latin typeface="Calibri" panose="020F0502020204030204" pitchFamily="34" charset="0"/>
+              <a:ea typeface="DengXian" panose="02010600030101010101" pitchFamily="2" charset="-122"/>
+              <a:cs typeface="Times New Roman" panose="02020603050405020304" pitchFamily="18" charset="0"/>
+              <a:sym typeface="Wingdings" panose="05000000000000000000" pitchFamily="2" charset="2"/>
+            </a:endParaRPr>
+          </a:p>
+          <a:p>
+            <a:r>
+              <a:rPr lang="de-CH" sz="2000" dirty="0">
+                <a:solidFill>
+                  <a:srgbClr val="FF0000"/>
+                </a:solidFill>
+                <a:effectLst/>
+                <a:latin typeface="Calibri" panose="020F0502020204030204" pitchFamily="34" charset="0"/>
+                <a:ea typeface="DengXian" panose="02010600030101010101" pitchFamily="2" charset="-122"/>
+                <a:cs typeface="Times New Roman" panose="02020603050405020304" pitchFamily="18" charset="0"/>
+                <a:sym typeface="Wingdings" panose="05000000000000000000" pitchFamily="2" charset="2"/>
+              </a:rPr>
+              <a:t></a:t>
+            </a:r>
+          </a:p>
+          <a:p>
+            <a:endParaRPr lang="de-CH" sz="2000" dirty="0">
+              <a:solidFill>
+                <a:srgbClr val="FF0000"/>
+              </a:solidFill>
+              <a:effectLst/>
+              <a:latin typeface="Calibri" panose="020F0502020204030204" pitchFamily="34" charset="0"/>
+              <a:ea typeface="DengXian" panose="02010600030101010101" pitchFamily="2" charset="-122"/>
+              <a:cs typeface="Times New Roman" panose="02020603050405020304" pitchFamily="18" charset="0"/>
+              <a:sym typeface="Wingdings" panose="05000000000000000000" pitchFamily="2" charset="2"/>
+            </a:endParaRPr>
+          </a:p>
+          <a:p>
+            <a:r>
+              <a:rPr lang="de-CH" sz="2000" dirty="0">
+                <a:solidFill>
+                  <a:srgbClr val="FF0000"/>
+                </a:solidFill>
+                <a:effectLst/>
+                <a:latin typeface="Calibri" panose="020F0502020204030204" pitchFamily="34" charset="0"/>
+                <a:ea typeface="DengXian" panose="02010600030101010101" pitchFamily="2" charset="-122"/>
+                <a:cs typeface="Times New Roman" panose="02020603050405020304" pitchFamily="18" charset="0"/>
+                <a:sym typeface="Wingdings" panose="05000000000000000000" pitchFamily="2" charset="2"/>
+              </a:rPr>
+              <a:t></a:t>
+            </a:r>
+          </a:p>
+          <a:p>
+            <a:r>
+              <a:rPr lang="de-CH" sz="2000" dirty="0">
+                <a:solidFill>
+                  <a:srgbClr val="FF0000"/>
+                </a:solidFill>
+                <a:effectLst/>
+                <a:latin typeface="Calibri" panose="020F0502020204030204" pitchFamily="34" charset="0"/>
+                <a:ea typeface="DengXian" panose="02010600030101010101" pitchFamily="2" charset="-122"/>
+                <a:cs typeface="Times New Roman" panose="02020603050405020304" pitchFamily="18" charset="0"/>
+                <a:sym typeface="Wingdings" panose="05000000000000000000" pitchFamily="2" charset="2"/>
+              </a:rPr>
+              <a:t></a:t>
+            </a:r>
+          </a:p>
+          <a:p>
+            <a:r>
+              <a:rPr lang="de-CH" sz="2000" dirty="0">
+                <a:solidFill>
+                  <a:srgbClr val="FF0000"/>
+                </a:solidFill>
+                <a:effectLst/>
+                <a:latin typeface="Calibri" panose="020F0502020204030204" pitchFamily="34" charset="0"/>
+                <a:ea typeface="DengXian" panose="02010600030101010101" pitchFamily="2" charset="-122"/>
+                <a:cs typeface="Times New Roman" panose="02020603050405020304" pitchFamily="18" charset="0"/>
+                <a:sym typeface="Wingdings" panose="05000000000000000000" pitchFamily="2" charset="2"/>
+              </a:rPr>
+              <a:t></a:t>
+            </a:r>
+            <a:endParaRPr lang="de-CH" sz="2000" dirty="0"/>
+          </a:p>
+        </p:txBody>
+      </p:sp>
+      <p:sp>
+        <p:nvSpPr>
+          <p:cNvPr id="8" name="CasellaDiTesto 7">
+            <a:extLst>
+              <a:ext uri="{FF2B5EF4-FFF2-40B4-BE49-F238E27FC236}">
+                <a16:creationId xmlns:a16="http://schemas.microsoft.com/office/drawing/2014/main" id="{99E2BD63-4797-300E-F2DC-FB2C30EE7629}"/>
+              </a:ext>
+            </a:extLst>
+          </p:cNvPr>
+          <p:cNvSpPr txBox="1"/>
+          <p:nvPr/>
+        </p:nvSpPr>
+        <p:spPr>
+          <a:xfrm>
+            <a:off x="10142408" y="2109791"/>
+            <a:ext cx="640934" cy="2246769"/>
+          </a:xfrm>
+          <a:prstGeom prst="rect">
+            <a:avLst/>
+          </a:prstGeom>
+          <a:noFill/>
+        </p:spPr>
+        <p:txBody>
+          <a:bodyPr wrap="square">
+            <a:spAutoFit/>
+          </a:bodyPr>
+          <a:lstStyle/>
+          <a:p>
+            <a:r>
+              <a:rPr lang="de-CH" sz="2000" dirty="0">
+                <a:solidFill>
+                  <a:srgbClr val="FF0000"/>
+                </a:solidFill>
+                <a:effectLst/>
+                <a:latin typeface="Calibri" panose="020F0502020204030204" pitchFamily="34" charset="0"/>
+                <a:ea typeface="DengXian" panose="02010600030101010101" pitchFamily="2" charset="-122"/>
+                <a:cs typeface="Times New Roman" panose="02020603050405020304" pitchFamily="18" charset="0"/>
+                <a:sym typeface="Wingdings" panose="05000000000000000000" pitchFamily="2" charset="2"/>
+              </a:rPr>
+              <a:t></a:t>
+            </a:r>
+          </a:p>
+          <a:p>
+            <a:endParaRPr lang="de-CH" sz="2000" dirty="0">
+              <a:solidFill>
+                <a:srgbClr val="FF0000"/>
+              </a:solidFill>
+              <a:effectLst/>
+              <a:latin typeface="Calibri" panose="020F0502020204030204" pitchFamily="34" charset="0"/>
+              <a:ea typeface="DengXian" panose="02010600030101010101" pitchFamily="2" charset="-122"/>
+              <a:cs typeface="Times New Roman" panose="02020603050405020304" pitchFamily="18" charset="0"/>
+              <a:sym typeface="Wingdings" panose="05000000000000000000" pitchFamily="2" charset="2"/>
+            </a:endParaRPr>
+          </a:p>
+          <a:p>
+            <a:endParaRPr lang="de-CH" sz="2000" dirty="0">
+              <a:solidFill>
+                <a:srgbClr val="FF0000"/>
+              </a:solidFill>
+              <a:effectLst/>
+              <a:latin typeface="Calibri" panose="020F0502020204030204" pitchFamily="34" charset="0"/>
+              <a:ea typeface="DengXian" panose="02010600030101010101" pitchFamily="2" charset="-122"/>
+              <a:cs typeface="Times New Roman" panose="02020603050405020304" pitchFamily="18" charset="0"/>
+              <a:sym typeface="Wingdings" panose="05000000000000000000" pitchFamily="2" charset="2"/>
+            </a:endParaRPr>
+          </a:p>
+          <a:p>
+            <a:r>
+              <a:rPr lang="de-CH" sz="2000" dirty="0">
+                <a:solidFill>
+                  <a:srgbClr val="FF0000"/>
+                </a:solidFill>
+                <a:effectLst/>
+                <a:latin typeface="Calibri" panose="020F0502020204030204" pitchFamily="34" charset="0"/>
+                <a:ea typeface="DengXian" panose="02010600030101010101" pitchFamily="2" charset="-122"/>
+                <a:cs typeface="Times New Roman" panose="02020603050405020304" pitchFamily="18" charset="0"/>
+                <a:sym typeface="Wingdings" panose="05000000000000000000" pitchFamily="2" charset="2"/>
+              </a:rPr>
+              <a:t></a:t>
+            </a:r>
+          </a:p>
+          <a:p>
+            <a:endParaRPr lang="de-CH" sz="2000" dirty="0">
+              <a:solidFill>
+                <a:srgbClr val="FF0000"/>
+              </a:solidFill>
+              <a:effectLst/>
+              <a:latin typeface="Calibri" panose="020F0502020204030204" pitchFamily="34" charset="0"/>
+              <a:ea typeface="DengXian" panose="02010600030101010101" pitchFamily="2" charset="-122"/>
+              <a:cs typeface="Times New Roman" panose="02020603050405020304" pitchFamily="18" charset="0"/>
+              <a:sym typeface="Wingdings" panose="05000000000000000000" pitchFamily="2" charset="2"/>
+            </a:endParaRPr>
+          </a:p>
+          <a:p>
+            <a:endParaRPr lang="de-CH" sz="2000" dirty="0">
+              <a:solidFill>
+                <a:srgbClr val="FF0000"/>
+              </a:solidFill>
+              <a:effectLst/>
+              <a:latin typeface="Calibri" panose="020F0502020204030204" pitchFamily="34" charset="0"/>
+              <a:ea typeface="DengXian" panose="02010600030101010101" pitchFamily="2" charset="-122"/>
+              <a:cs typeface="Times New Roman" panose="02020603050405020304" pitchFamily="18" charset="0"/>
+              <a:sym typeface="Wingdings" panose="05000000000000000000" pitchFamily="2" charset="2"/>
+            </a:endParaRPr>
+          </a:p>
+          <a:p>
+            <a:endParaRPr lang="de-CH" sz="2000" dirty="0"/>
+          </a:p>
+        </p:txBody>
+      </p:sp>
+      <p:sp>
+        <p:nvSpPr>
+          <p:cNvPr id="10" name="CasellaDiTesto 9">
+            <a:extLst>
+              <a:ext uri="{FF2B5EF4-FFF2-40B4-BE49-F238E27FC236}">
+                <a16:creationId xmlns:a16="http://schemas.microsoft.com/office/drawing/2014/main" id="{E9CEF901-06C2-C8D1-2229-4918AAAA054E}"/>
+              </a:ext>
+            </a:extLst>
+          </p:cNvPr>
+          <p:cNvSpPr txBox="1"/>
+          <p:nvPr/>
+        </p:nvSpPr>
+        <p:spPr>
+          <a:xfrm>
+            <a:off x="1611080" y="2155371"/>
+            <a:ext cx="5304749" cy="276999"/>
+          </a:xfrm>
+          <a:prstGeom prst="rect">
+            <a:avLst/>
+          </a:prstGeom>
+          <a:solidFill>
+            <a:schemeClr val="bg1"/>
+          </a:solidFill>
+        </p:spPr>
+        <p:txBody>
+          <a:bodyPr wrap="square" rtlCol="0">
+            <a:spAutoFit/>
+          </a:bodyPr>
+          <a:lstStyle/>
+          <a:p>
+            <a:r>
+              <a:rPr lang="de-DE" sz="1200" b="1" dirty="0" err="1">
+                <a:latin typeface="Arial" panose="020B0604020202020204" pitchFamily="34" charset="0"/>
+                <a:cs typeface="Arial" panose="020B0604020202020204" pitchFamily="34" charset="0"/>
+              </a:rPr>
+              <a:t>Twint</a:t>
+            </a:r>
+            <a:r>
+              <a:rPr lang="de-DE" sz="1200" b="1" dirty="0">
+                <a:latin typeface="Arial" panose="020B0604020202020204" pitchFamily="34" charset="0"/>
+                <a:cs typeface="Arial" panose="020B0604020202020204" pitchFamily="34" charset="0"/>
+              </a:rPr>
+              <a:t> </a:t>
+            </a:r>
+            <a:r>
+              <a:rPr lang="de-DE" sz="1200" b="1" dirty="0" err="1">
+                <a:latin typeface="Arial" panose="020B0604020202020204" pitchFamily="34" charset="0"/>
+                <a:cs typeface="Arial" panose="020B0604020202020204" pitchFamily="34" charset="0"/>
+              </a:rPr>
+              <a:t>Resale</a:t>
+            </a:r>
+            <a:r>
+              <a:rPr lang="de-DE" sz="1200" b="1" dirty="0">
+                <a:latin typeface="Arial" panose="020B0604020202020204" pitchFamily="34" charset="0"/>
+                <a:cs typeface="Arial" panose="020B0604020202020204" pitchFamily="34" charset="0"/>
+              </a:rPr>
+              <a:t> </a:t>
+            </a:r>
+            <a:r>
+              <a:rPr lang="de-DE" sz="1100" dirty="0">
+                <a:latin typeface="Arial" panose="020B0604020202020204" pitchFamily="34" charset="0"/>
+                <a:cs typeface="Arial" panose="020B0604020202020204" pitchFamily="34" charset="0"/>
+              </a:rPr>
+              <a:t>#131948210 </a:t>
+            </a:r>
+            <a:r>
+              <a:rPr lang="de-DE" sz="1100" dirty="0" err="1">
+                <a:latin typeface="Arial" panose="020B0604020202020204" pitchFamily="34" charset="0"/>
+                <a:cs typeface="Arial" panose="020B0604020202020204" pitchFamily="34" charset="0"/>
+              </a:rPr>
+              <a:t>Ref</a:t>
+            </a:r>
+            <a:r>
+              <a:rPr lang="de-DE" sz="1100" dirty="0">
+                <a:latin typeface="Arial" panose="020B0604020202020204" pitchFamily="34" charset="0"/>
+                <a:cs typeface="Arial" panose="020B0604020202020204" pitchFamily="34" charset="0"/>
+              </a:rPr>
+              <a:t> 9901798E64844898 220525CH09DOI7MZ</a:t>
+            </a:r>
+            <a:endParaRPr lang="de-CH" sz="1100" dirty="0">
+              <a:latin typeface="Arial" panose="020B0604020202020204" pitchFamily="34" charset="0"/>
+              <a:cs typeface="Arial" panose="020B0604020202020204" pitchFamily="34" charset="0"/>
+            </a:endParaRPr>
+          </a:p>
+        </p:txBody>
+      </p:sp>
+      <p:sp>
+        <p:nvSpPr>
+          <p:cNvPr id="11" name="CasellaDiTesto 10">
+            <a:extLst>
+              <a:ext uri="{FF2B5EF4-FFF2-40B4-BE49-F238E27FC236}">
+                <a16:creationId xmlns:a16="http://schemas.microsoft.com/office/drawing/2014/main" id="{9F4BB1BD-B4DF-02FD-13B7-053127BEF472}"/>
+              </a:ext>
+            </a:extLst>
+          </p:cNvPr>
+          <p:cNvSpPr txBox="1"/>
+          <p:nvPr/>
+        </p:nvSpPr>
+        <p:spPr>
+          <a:xfrm>
+            <a:off x="1611080" y="3069775"/>
+            <a:ext cx="5304749" cy="276999"/>
+          </a:xfrm>
+          <a:prstGeom prst="rect">
+            <a:avLst/>
+          </a:prstGeom>
+          <a:solidFill>
+            <a:schemeClr val="bg1"/>
+          </a:solidFill>
+        </p:spPr>
+        <p:txBody>
+          <a:bodyPr wrap="square" rtlCol="0">
+            <a:spAutoFit/>
+          </a:bodyPr>
+          <a:lstStyle/>
+          <a:p>
+            <a:r>
+              <a:rPr lang="de-DE" sz="1200" b="1" dirty="0" err="1">
+                <a:latin typeface="Arial" panose="020B0604020202020204" pitchFamily="34" charset="0"/>
+                <a:cs typeface="Arial" panose="020B0604020202020204" pitchFamily="34" charset="0"/>
+              </a:rPr>
+              <a:t>Twint</a:t>
+            </a:r>
+            <a:r>
+              <a:rPr lang="de-DE" sz="1200" b="1" dirty="0">
+                <a:latin typeface="Arial" panose="020B0604020202020204" pitchFamily="34" charset="0"/>
+                <a:cs typeface="Arial" panose="020B0604020202020204" pitchFamily="34" charset="0"/>
+              </a:rPr>
+              <a:t> </a:t>
+            </a:r>
+            <a:r>
+              <a:rPr lang="de-DE" sz="1200" b="1" dirty="0" err="1">
+                <a:latin typeface="Arial" panose="020B0604020202020204" pitchFamily="34" charset="0"/>
+                <a:cs typeface="Arial" panose="020B0604020202020204" pitchFamily="34" charset="0"/>
+              </a:rPr>
+              <a:t>Resale</a:t>
+            </a:r>
+            <a:r>
+              <a:rPr lang="de-DE" sz="1200" b="1" dirty="0">
+                <a:latin typeface="Arial" panose="020B0604020202020204" pitchFamily="34" charset="0"/>
+                <a:cs typeface="Arial" panose="020B0604020202020204" pitchFamily="34" charset="0"/>
+              </a:rPr>
+              <a:t> </a:t>
+            </a:r>
+            <a:r>
+              <a:rPr lang="de-DE" sz="1100" dirty="0">
+                <a:latin typeface="Arial" panose="020B0604020202020204" pitchFamily="34" charset="0"/>
+                <a:cs typeface="Arial" panose="020B0604020202020204" pitchFamily="34" charset="0"/>
+              </a:rPr>
+              <a:t>#131948212 </a:t>
+            </a:r>
+            <a:r>
+              <a:rPr lang="de-DE" sz="1100" dirty="0" err="1">
+                <a:latin typeface="Arial" panose="020B0604020202020204" pitchFamily="34" charset="0"/>
+                <a:cs typeface="Arial" panose="020B0604020202020204" pitchFamily="34" charset="0"/>
+              </a:rPr>
+              <a:t>Ref</a:t>
+            </a:r>
+            <a:r>
+              <a:rPr lang="de-DE" sz="1100" dirty="0">
+                <a:latin typeface="Arial" panose="020B0604020202020204" pitchFamily="34" charset="0"/>
+                <a:cs typeface="Arial" panose="020B0604020202020204" pitchFamily="34" charset="0"/>
+              </a:rPr>
+              <a:t> 9901798E64844992 220619CH08EOI7EL</a:t>
+            </a:r>
+            <a:endParaRPr lang="de-CH" sz="1100" dirty="0">
+              <a:latin typeface="Arial" panose="020B0604020202020204" pitchFamily="34" charset="0"/>
+              <a:cs typeface="Arial" panose="020B0604020202020204" pitchFamily="34" charset="0"/>
+            </a:endParaRPr>
+          </a:p>
+        </p:txBody>
+      </p:sp>
+      <p:sp>
+        <p:nvSpPr>
+          <p:cNvPr id="12" name="CasellaDiTesto 11">
+            <a:extLst>
+              <a:ext uri="{FF2B5EF4-FFF2-40B4-BE49-F238E27FC236}">
+                <a16:creationId xmlns:a16="http://schemas.microsoft.com/office/drawing/2014/main" id="{EF17402A-A015-96C2-96E4-7645ED115433}"/>
+              </a:ext>
+            </a:extLst>
+          </p:cNvPr>
+          <p:cNvSpPr txBox="1"/>
+          <p:nvPr/>
+        </p:nvSpPr>
+        <p:spPr>
+          <a:xfrm>
+            <a:off x="1611080" y="2471057"/>
+            <a:ext cx="5304749" cy="261610"/>
+          </a:xfrm>
+          <a:prstGeom prst="rect">
+            <a:avLst/>
+          </a:prstGeom>
+          <a:solidFill>
+            <a:schemeClr val="bg1"/>
+          </a:solidFill>
+        </p:spPr>
+        <p:txBody>
+          <a:bodyPr wrap="square" rtlCol="0">
+            <a:spAutoFit/>
+          </a:bodyPr>
+          <a:lstStyle/>
+          <a:p>
+            <a:r>
+              <a:rPr lang="de-DE" sz="1100" dirty="0">
+                <a:latin typeface="Arial" panose="020B0604020202020204" pitchFamily="34" charset="0"/>
+                <a:cs typeface="Arial" panose="020B0604020202020204" pitchFamily="34" charset="0"/>
+              </a:rPr>
+              <a:t>Fees May - Monthly</a:t>
+            </a:r>
+            <a:endParaRPr lang="de-CH" sz="1100" dirty="0">
+              <a:latin typeface="Arial" panose="020B0604020202020204" pitchFamily="34" charset="0"/>
+              <a:cs typeface="Arial" panose="020B0604020202020204" pitchFamily="34" charset="0"/>
+            </a:endParaRPr>
+          </a:p>
+        </p:txBody>
+      </p:sp>
+      <p:sp>
+        <p:nvSpPr>
+          <p:cNvPr id="13" name="CasellaDiTesto 12">
+            <a:extLst>
+              <a:ext uri="{FF2B5EF4-FFF2-40B4-BE49-F238E27FC236}">
+                <a16:creationId xmlns:a16="http://schemas.microsoft.com/office/drawing/2014/main" id="{88545D8D-E301-9AB7-7F89-952E84F77056}"/>
+              </a:ext>
+            </a:extLst>
+          </p:cNvPr>
+          <p:cNvSpPr txBox="1"/>
+          <p:nvPr/>
+        </p:nvSpPr>
+        <p:spPr>
+          <a:xfrm>
+            <a:off x="1611080" y="2772314"/>
+            <a:ext cx="6723154" cy="276999"/>
+          </a:xfrm>
+          <a:prstGeom prst="rect">
+            <a:avLst/>
+          </a:prstGeom>
+          <a:solidFill>
+            <a:schemeClr val="bg1"/>
+          </a:solidFill>
+        </p:spPr>
+        <p:txBody>
+          <a:bodyPr wrap="square" rtlCol="0">
+            <a:spAutoFit/>
+          </a:bodyPr>
+          <a:lstStyle/>
+          <a:p>
+            <a:r>
+              <a:rPr lang="de-DE" sz="1100" dirty="0">
+                <a:latin typeface="Arial" panose="020B0604020202020204" pitchFamily="34" charset="0"/>
+                <a:cs typeface="Arial" panose="020B0604020202020204" pitchFamily="34" charset="0"/>
+              </a:rPr>
+              <a:t>Charge CH4570000001690000812 </a:t>
+            </a:r>
+            <a:r>
+              <a:rPr lang="de-DE" sz="1200" b="1" dirty="0" err="1">
+                <a:latin typeface="Arial" panose="020B0604020202020204" pitchFamily="34" charset="0"/>
+                <a:cs typeface="Arial" panose="020B0604020202020204" pitchFamily="34" charset="0"/>
+              </a:rPr>
+              <a:t>Interac</a:t>
+            </a:r>
+            <a:r>
+              <a:rPr lang="de-DE" sz="1200" b="1" dirty="0">
+                <a:latin typeface="Arial" panose="020B0604020202020204" pitchFamily="34" charset="0"/>
+                <a:cs typeface="Arial" panose="020B0604020202020204" pitchFamily="34" charset="0"/>
+              </a:rPr>
+              <a:t> Electronics </a:t>
+            </a:r>
+            <a:r>
+              <a:rPr lang="de-DE" sz="1100" dirty="0">
+                <a:latin typeface="Arial" panose="020B0604020202020204" pitchFamily="34" charset="0"/>
+                <a:cs typeface="Arial" panose="020B0604020202020204" pitchFamily="34" charset="0"/>
+              </a:rPr>
+              <a:t>8000 Zürich Reference 20221024000893583</a:t>
+            </a:r>
+            <a:endParaRPr lang="de-CH" sz="1100" dirty="0">
+              <a:latin typeface="Arial" panose="020B0604020202020204" pitchFamily="34" charset="0"/>
+              <a:cs typeface="Arial" panose="020B0604020202020204" pitchFamily="34" charset="0"/>
+            </a:endParaRPr>
+          </a:p>
+        </p:txBody>
+      </p:sp>
+      <p:sp>
+        <p:nvSpPr>
+          <p:cNvPr id="14" name="CasellaDiTesto 13">
+            <a:extLst>
+              <a:ext uri="{FF2B5EF4-FFF2-40B4-BE49-F238E27FC236}">
+                <a16:creationId xmlns:a16="http://schemas.microsoft.com/office/drawing/2014/main" id="{08B27F42-C1D8-8AAA-D0A8-2BA1519D153E}"/>
+              </a:ext>
+            </a:extLst>
+          </p:cNvPr>
+          <p:cNvSpPr txBox="1"/>
+          <p:nvPr/>
+        </p:nvSpPr>
+        <p:spPr>
+          <a:xfrm>
+            <a:off x="1611080" y="3360146"/>
+            <a:ext cx="7315206" cy="276999"/>
+          </a:xfrm>
+          <a:prstGeom prst="rect">
+            <a:avLst/>
+          </a:prstGeom>
+          <a:solidFill>
+            <a:schemeClr val="bg1"/>
+          </a:solidFill>
+        </p:spPr>
+        <p:txBody>
+          <a:bodyPr wrap="square" rtlCol="0">
+            <a:spAutoFit/>
+          </a:bodyPr>
+          <a:lstStyle/>
+          <a:p>
+            <a:r>
+              <a:rPr lang="de-DE" sz="1100" dirty="0">
+                <a:latin typeface="Arial" panose="020B0604020202020204" pitchFamily="34" charset="0"/>
+                <a:cs typeface="Arial" panose="020B0604020202020204" pitchFamily="34" charset="0"/>
+              </a:rPr>
+              <a:t>Charge CH6990000001690000823 </a:t>
+            </a:r>
+            <a:r>
+              <a:rPr lang="de-DE" sz="1200" b="1" dirty="0">
+                <a:latin typeface="Arial" panose="020B0604020202020204" pitchFamily="34" charset="0"/>
+                <a:cs typeface="Arial" panose="020B0604020202020204" pitchFamily="34" charset="0"/>
+              </a:rPr>
+              <a:t>Swisscom </a:t>
+            </a:r>
+            <a:r>
+              <a:rPr lang="de-DE" sz="1200" dirty="0">
+                <a:latin typeface="Arial" panose="020B0604020202020204" pitchFamily="34" charset="0"/>
+                <a:cs typeface="Arial" panose="020B0604020202020204" pitchFamily="34" charset="0"/>
+              </a:rPr>
+              <a:t>Bern</a:t>
+            </a:r>
+            <a:r>
+              <a:rPr lang="de-DE" sz="1100" dirty="0">
+                <a:latin typeface="Arial" panose="020B0604020202020204" pitchFamily="34" charset="0"/>
+                <a:cs typeface="Arial" panose="020B0604020202020204" pitchFamily="34" charset="0"/>
+              </a:rPr>
+              <a:t> Reference: 2022-05-31 </a:t>
+            </a:r>
+            <a:r>
+              <a:rPr lang="de-DE" sz="1100" dirty="0" err="1">
+                <a:latin typeface="Arial" panose="020B0604020202020204" pitchFamily="34" charset="0"/>
+                <a:cs typeface="Arial" panose="020B0604020202020204" pitchFamily="34" charset="0"/>
+              </a:rPr>
+              <a:t>Telephone</a:t>
+            </a:r>
+            <a:r>
+              <a:rPr lang="de-DE" sz="1100" dirty="0">
+                <a:latin typeface="Arial" panose="020B0604020202020204" pitchFamily="34" charset="0"/>
+                <a:cs typeface="Arial" panose="020B0604020202020204" pitchFamily="34" charset="0"/>
+              </a:rPr>
+              <a:t> </a:t>
+            </a:r>
+            <a:r>
+              <a:rPr lang="de-DE" sz="1200" b="1" dirty="0">
+                <a:latin typeface="Arial" panose="020B0604020202020204" pitchFamily="34" charset="0"/>
+                <a:cs typeface="Arial" panose="020B0604020202020204" pitchFamily="34" charset="0"/>
+              </a:rPr>
+              <a:t>+41795561718</a:t>
+            </a:r>
+            <a:endParaRPr lang="de-CH" sz="1200" b="1" dirty="0">
+              <a:latin typeface="Arial" panose="020B0604020202020204" pitchFamily="34" charset="0"/>
+              <a:cs typeface="Arial" panose="020B0604020202020204" pitchFamily="34" charset="0"/>
+            </a:endParaRPr>
+          </a:p>
+        </p:txBody>
+      </p:sp>
+      <p:sp>
+        <p:nvSpPr>
+          <p:cNvPr id="15" name="CasellaDiTesto 14">
+            <a:extLst>
+              <a:ext uri="{FF2B5EF4-FFF2-40B4-BE49-F238E27FC236}">
+                <a16:creationId xmlns:a16="http://schemas.microsoft.com/office/drawing/2014/main" id="{2ED1781B-913C-EE8B-A358-62DE0B785DFA}"/>
+              </a:ext>
+            </a:extLst>
+          </p:cNvPr>
+          <p:cNvSpPr txBox="1"/>
+          <p:nvPr/>
+        </p:nvSpPr>
+        <p:spPr>
+          <a:xfrm>
+            <a:off x="1611080" y="3682551"/>
+            <a:ext cx="6723154" cy="276999"/>
+          </a:xfrm>
+          <a:prstGeom prst="rect">
+            <a:avLst/>
+          </a:prstGeom>
+          <a:solidFill>
+            <a:schemeClr val="bg1"/>
+          </a:solidFill>
+        </p:spPr>
+        <p:txBody>
+          <a:bodyPr wrap="square" rtlCol="0">
+            <a:spAutoFit/>
+          </a:bodyPr>
+          <a:lstStyle/>
+          <a:p>
+            <a:r>
+              <a:rPr lang="de-DE" sz="1100" dirty="0">
+                <a:latin typeface="Arial" panose="020B0604020202020204" pitchFamily="34" charset="0"/>
+                <a:cs typeface="Arial" panose="020B0604020202020204" pitchFamily="34" charset="0"/>
+              </a:rPr>
+              <a:t>Charge CH6830000001690000944 </a:t>
+            </a:r>
+            <a:r>
+              <a:rPr lang="de-DE" sz="1200" b="1" dirty="0">
+                <a:latin typeface="Arial" panose="020B0604020202020204" pitchFamily="34" charset="0"/>
+                <a:cs typeface="Arial" panose="020B0604020202020204" pitchFamily="34" charset="0"/>
+              </a:rPr>
+              <a:t>Best Insurance</a:t>
+            </a:r>
+            <a:r>
+              <a:rPr lang="de-DE" sz="1100" dirty="0">
+                <a:latin typeface="Arial" panose="020B0604020202020204" pitchFamily="34" charset="0"/>
+                <a:cs typeface="Arial" panose="020B0604020202020204" pitchFamily="34" charset="0"/>
+              </a:rPr>
+              <a:t> 2021 </a:t>
+            </a:r>
+            <a:r>
+              <a:rPr lang="de-DE" sz="1100" dirty="0" err="1">
+                <a:latin typeface="Arial" panose="020B0604020202020204" pitchFamily="34" charset="0"/>
+                <a:cs typeface="Arial" panose="020B0604020202020204" pitchFamily="34" charset="0"/>
+              </a:rPr>
+              <a:t>Contract</a:t>
+            </a:r>
+            <a:r>
+              <a:rPr lang="de-DE" sz="1100" dirty="0">
+                <a:latin typeface="Arial" panose="020B0604020202020204" pitchFamily="34" charset="0"/>
+                <a:cs typeface="Arial" panose="020B0604020202020204" pitchFamily="34" charset="0"/>
+              </a:rPr>
+              <a:t> </a:t>
+            </a:r>
+            <a:r>
+              <a:rPr lang="de-DE" sz="1200" b="1" dirty="0">
+                <a:latin typeface="Arial" panose="020B0604020202020204" pitchFamily="34" charset="0"/>
+                <a:cs typeface="Arial" panose="020B0604020202020204" pitchFamily="34" charset="0"/>
+              </a:rPr>
+              <a:t>892-948</a:t>
+            </a:r>
+            <a:endParaRPr lang="de-CH" sz="1200" b="1" dirty="0">
+              <a:latin typeface="Arial" panose="020B0604020202020204" pitchFamily="34" charset="0"/>
+              <a:cs typeface="Arial" panose="020B0604020202020204" pitchFamily="34" charset="0"/>
+            </a:endParaRPr>
+          </a:p>
+        </p:txBody>
+      </p:sp>
+      <p:sp>
+        <p:nvSpPr>
+          <p:cNvPr id="16" name="CasellaDiTesto 15">
+            <a:extLst>
+              <a:ext uri="{FF2B5EF4-FFF2-40B4-BE49-F238E27FC236}">
+                <a16:creationId xmlns:a16="http://schemas.microsoft.com/office/drawing/2014/main" id="{AC029DA2-A05D-98A1-C49A-E004B5938D0E}"/>
+              </a:ext>
+            </a:extLst>
+          </p:cNvPr>
+          <p:cNvSpPr txBox="1"/>
+          <p:nvPr/>
+        </p:nvSpPr>
+        <p:spPr>
+          <a:xfrm>
+            <a:off x="1611080" y="3976466"/>
+            <a:ext cx="6723154" cy="276999"/>
+          </a:xfrm>
+          <a:prstGeom prst="rect">
+            <a:avLst/>
+          </a:prstGeom>
+          <a:solidFill>
+            <a:schemeClr val="bg1"/>
+          </a:solidFill>
+        </p:spPr>
+        <p:txBody>
+          <a:bodyPr wrap="square" rtlCol="0">
+            <a:spAutoFit/>
+          </a:bodyPr>
+          <a:lstStyle/>
+          <a:p>
+            <a:r>
+              <a:rPr lang="de-DE" sz="1100" dirty="0">
+                <a:latin typeface="Arial" panose="020B0604020202020204" pitchFamily="34" charset="0"/>
+                <a:cs typeface="Arial" panose="020B0604020202020204" pitchFamily="34" charset="0"/>
+              </a:rPr>
+              <a:t>Charge CH6830000001690000944 </a:t>
+            </a:r>
+            <a:r>
+              <a:rPr lang="de-DE" sz="1200" b="1" dirty="0">
+                <a:latin typeface="Arial" panose="020B0604020202020204" pitchFamily="34" charset="0"/>
+                <a:cs typeface="Arial" panose="020B0604020202020204" pitchFamily="34" charset="0"/>
+              </a:rPr>
+              <a:t>Best Insurance</a:t>
+            </a:r>
+            <a:r>
+              <a:rPr lang="de-DE" sz="1100" dirty="0">
+                <a:latin typeface="Arial" panose="020B0604020202020204" pitchFamily="34" charset="0"/>
+                <a:cs typeface="Arial" panose="020B0604020202020204" pitchFamily="34" charset="0"/>
+              </a:rPr>
+              <a:t> 2021 </a:t>
+            </a:r>
+            <a:r>
+              <a:rPr lang="de-DE" sz="1100" dirty="0" err="1">
+                <a:latin typeface="Arial" panose="020B0604020202020204" pitchFamily="34" charset="0"/>
+                <a:cs typeface="Arial" panose="020B0604020202020204" pitchFamily="34" charset="0"/>
+              </a:rPr>
+              <a:t>Contract</a:t>
+            </a:r>
+            <a:r>
+              <a:rPr lang="de-DE" sz="1100" dirty="0">
+                <a:latin typeface="Arial" panose="020B0604020202020204" pitchFamily="34" charset="0"/>
+                <a:cs typeface="Arial" panose="020B0604020202020204" pitchFamily="34" charset="0"/>
+              </a:rPr>
+              <a:t> </a:t>
+            </a:r>
+            <a:r>
+              <a:rPr lang="de-DE" sz="1200" b="1" dirty="0">
+                <a:latin typeface="Arial" panose="020B0604020202020204" pitchFamily="34" charset="0"/>
+                <a:cs typeface="Arial" panose="020B0604020202020204" pitchFamily="34" charset="0"/>
+              </a:rPr>
+              <a:t>987-650</a:t>
+            </a:r>
+            <a:endParaRPr lang="de-CH" sz="1200" b="1" dirty="0">
+              <a:latin typeface="Arial" panose="020B0604020202020204" pitchFamily="34" charset="0"/>
+              <a:cs typeface="Arial" panose="020B0604020202020204" pitchFamily="34" charset="0"/>
+            </a:endParaRPr>
+          </a:p>
+        </p:txBody>
+      </p:sp>
+    </p:spTree>
+    <p:extLst>
+      <p:ext uri="{BB962C8B-B14F-4D97-AF65-F5344CB8AC3E}">
+        <p14:creationId xmlns:p14="http://schemas.microsoft.com/office/powerpoint/2010/main" val="3864314638"/>
+      </p:ext>
+    </p:extLst>
+  </p:cSld>
+  <p:clrMapOvr>
+    <a:masterClrMapping/>
+  </p:clrMapOvr>
+</p:sld>
+</file>
+
+<file path=ppt/slides/slide2.xml><?xml version="1.0" encoding="utf-8"?>
+<p:sld xmlns:a="http://schemas.openxmlformats.org/drawingml/2006/main" xmlns:r="http://schemas.openxmlformats.org/officeDocument/2006/relationships" xmlns:p="http://schemas.openxmlformats.org/presentationml/2006/main">
+  <p:cSld>
+    <p:spTree>
+      <p:nvGrpSpPr>
+        <p:cNvPr id="1" name=""/>
+        <p:cNvGrpSpPr/>
+        <p:nvPr/>
+      </p:nvGrpSpPr>
+      <p:grpSpPr>
+        <a:xfrm>
+          <a:off x="0" y="0"/>
+          <a:ext cx="0" cy="0"/>
+          <a:chOff x="0" y="0"/>
+          <a:chExt cx="0" cy="0"/>
+        </a:xfrm>
+      </p:grpSpPr>
+      <p:pic>
+        <p:nvPicPr>
+          <p:cNvPr id="8" name="Immagine 7">
+            <a:extLst>
+              <a:ext uri="{FF2B5EF4-FFF2-40B4-BE49-F238E27FC236}">
+                <a16:creationId xmlns:a16="http://schemas.microsoft.com/office/drawing/2014/main" id="{F1374FC1-6786-D8DD-F122-F5CB8FEE30AC}"/>
               </a:ext>
             </a:extLst>
           </p:cNvPr>
@@ -3380,10 +4208,10 @@
       </p:pic>
       <p:sp>
         <p:nvSpPr>
-          <p:cNvPr id="7" name="CasellaDiTesto 6">
-            <a:extLst>
-              <a:ext uri="{FF2B5EF4-FFF2-40B4-BE49-F238E27FC236}">
-                <a16:creationId xmlns:a16="http://schemas.microsoft.com/office/drawing/2014/main" id="{39FB5C5B-84C9-B056-08CC-B9B3EBC4D0FA}"/>
+          <p:cNvPr id="4" name="CasellaDiTesto 3">
+            <a:extLst>
+              <a:ext uri="{FF2B5EF4-FFF2-40B4-BE49-F238E27FC236}">
+                <a16:creationId xmlns:a16="http://schemas.microsoft.com/office/drawing/2014/main" id="{C595C068-3A71-DF52-C755-419161569562}"/>
               </a:ext>
             </a:extLst>
           </p:cNvPr>
@@ -3392,8 +4220,8 @@
         </p:nvSpPr>
         <p:spPr>
           <a:xfrm>
-            <a:off x="8660593" y="2109065"/>
-            <a:ext cx="640934" cy="2246769"/>
+            <a:off x="7572022" y="2109065"/>
+            <a:ext cx="640934" cy="1631216"/>
           </a:xfrm>
           <a:prstGeom prst="rect">
             <a:avLst/>
@@ -3405,18 +4233,6 @@
             <a:spAutoFit/>
           </a:bodyPr>
           <a:lstStyle/>
-          <a:p>
-            <a:endParaRPr lang="de-CH" sz="2000" dirty="0">
-              <a:solidFill>
-                <a:srgbClr val="FF0000"/>
-              </a:solidFill>
-              <a:effectLst/>
-              <a:latin typeface="Calibri" panose="020F0502020204030204" pitchFamily="34" charset="0"/>
-              <a:ea typeface="DengXian" panose="02010600030101010101" pitchFamily="2" charset="-122"/>
-              <a:cs typeface="Times New Roman" panose="02020603050405020304" pitchFamily="18" charset="0"/>
-              <a:sym typeface="Wingdings" panose="05000000000000000000" pitchFamily="2" charset="2"/>
-            </a:endParaRPr>
-          </a:p>
           <a:p>
             <a:r>
               <a:rPr lang="de-CH" sz="2000" dirty="0">
@@ -3429,7 +4245,7 @@
                 <a:cs typeface="Times New Roman" panose="02020603050405020304" pitchFamily="18" charset="0"/>
                 <a:sym typeface="Wingdings" panose="05000000000000000000" pitchFamily="2" charset="2"/>
               </a:rPr>
-              <a:t></a:t>
+              <a:t></a:t>
             </a:r>
           </a:p>
           <a:p>
@@ -3444,20 +4260,8 @@
                 <a:cs typeface="Times New Roman" panose="02020603050405020304" pitchFamily="18" charset="0"/>
                 <a:sym typeface="Wingdings" panose="05000000000000000000" pitchFamily="2" charset="2"/>
               </a:rPr>
-              <a:t></a:t>
-            </a:r>
-          </a:p>
-          <a:p>
-            <a:endParaRPr lang="de-CH" sz="2000" dirty="0">
-              <a:solidFill>
-                <a:srgbClr val="FF0000"/>
-              </a:solidFill>
-              <a:effectLst/>
-              <a:latin typeface="Calibri" panose="020F0502020204030204" pitchFamily="34" charset="0"/>
-              <a:ea typeface="DengXian" panose="02010600030101010101" pitchFamily="2" charset="-122"/>
-              <a:cs typeface="Times New Roman" panose="02020603050405020304" pitchFamily="18" charset="0"/>
-              <a:sym typeface="Wingdings" panose="05000000000000000000" pitchFamily="2" charset="2"/>
-            </a:endParaRPr>
+              <a:t></a:t>
+            </a:r>
           </a:p>
           <a:p>
             <a:r>
@@ -3471,7 +4275,7 @@
                 <a:cs typeface="Times New Roman" panose="02020603050405020304" pitchFamily="18" charset="0"/>
                 <a:sym typeface="Wingdings" panose="05000000000000000000" pitchFamily="2" charset="2"/>
               </a:rPr>
-              <a:t></a:t>
+              <a:t></a:t>
             </a:r>
           </a:p>
           <a:p>
@@ -3486,7 +4290,7 @@
                 <a:cs typeface="Times New Roman" panose="02020603050405020304" pitchFamily="18" charset="0"/>
                 <a:sym typeface="Wingdings" panose="05000000000000000000" pitchFamily="2" charset="2"/>
               </a:rPr>
-              <a:t></a:t>
+              <a:t></a:t>
             </a:r>
           </a:p>
           <a:p>
@@ -3501,637 +4305,15 @@
                 <a:cs typeface="Times New Roman" panose="02020603050405020304" pitchFamily="18" charset="0"/>
                 <a:sym typeface="Wingdings" panose="05000000000000000000" pitchFamily="2" charset="2"/>
               </a:rPr>
-              <a:t></a:t>
-            </a:r>
-            <a:endParaRPr lang="de-CH" sz="2000" dirty="0"/>
-          </a:p>
-        </p:txBody>
-      </p:sp>
-      <p:sp>
-        <p:nvSpPr>
-          <p:cNvPr id="8" name="CasellaDiTesto 7">
-            <a:extLst>
-              <a:ext uri="{FF2B5EF4-FFF2-40B4-BE49-F238E27FC236}">
-                <a16:creationId xmlns:a16="http://schemas.microsoft.com/office/drawing/2014/main" id="{99E2BD63-4797-300E-F2DC-FB2C30EE7629}"/>
-              </a:ext>
-            </a:extLst>
-          </p:cNvPr>
-          <p:cNvSpPr txBox="1"/>
-          <p:nvPr/>
-        </p:nvSpPr>
-        <p:spPr>
-          <a:xfrm>
-            <a:off x="9249779" y="2098905"/>
-            <a:ext cx="640934" cy="2246769"/>
-          </a:xfrm>
-          <a:prstGeom prst="rect">
-            <a:avLst/>
-          </a:prstGeom>
-          <a:noFill/>
-        </p:spPr>
-        <p:txBody>
-          <a:bodyPr wrap="square">
-            <a:spAutoFit/>
-          </a:bodyPr>
-          <a:lstStyle/>
-          <a:p>
-            <a:r>
-              <a:rPr lang="de-CH" sz="2000" dirty="0">
-                <a:solidFill>
-                  <a:srgbClr val="FF0000"/>
-                </a:solidFill>
-                <a:effectLst/>
-                <a:latin typeface="Calibri" panose="020F0502020204030204" pitchFamily="34" charset="0"/>
-                <a:ea typeface="DengXian" panose="02010600030101010101" pitchFamily="2" charset="-122"/>
-                <a:cs typeface="Times New Roman" panose="02020603050405020304" pitchFamily="18" charset="0"/>
-                <a:sym typeface="Wingdings" panose="05000000000000000000" pitchFamily="2" charset="2"/>
-              </a:rPr>
-              <a:t></a:t>
-            </a:r>
-          </a:p>
-          <a:p>
-            <a:endParaRPr lang="de-CH" sz="2000" dirty="0">
-              <a:solidFill>
-                <a:srgbClr val="FF0000"/>
-              </a:solidFill>
-              <a:effectLst/>
-              <a:latin typeface="Calibri" panose="020F0502020204030204" pitchFamily="34" charset="0"/>
-              <a:ea typeface="DengXian" panose="02010600030101010101" pitchFamily="2" charset="-122"/>
-              <a:cs typeface="Times New Roman" panose="02020603050405020304" pitchFamily="18" charset="0"/>
-              <a:sym typeface="Wingdings" panose="05000000000000000000" pitchFamily="2" charset="2"/>
-            </a:endParaRPr>
-          </a:p>
-          <a:p>
-            <a:endParaRPr lang="de-CH" sz="2000" dirty="0">
-              <a:solidFill>
-                <a:srgbClr val="FF0000"/>
-              </a:solidFill>
-              <a:effectLst/>
-              <a:latin typeface="Calibri" panose="020F0502020204030204" pitchFamily="34" charset="0"/>
-              <a:ea typeface="DengXian" panose="02010600030101010101" pitchFamily="2" charset="-122"/>
-              <a:cs typeface="Times New Roman" panose="02020603050405020304" pitchFamily="18" charset="0"/>
-              <a:sym typeface="Wingdings" panose="05000000000000000000" pitchFamily="2" charset="2"/>
-            </a:endParaRPr>
-          </a:p>
-          <a:p>
-            <a:r>
-              <a:rPr lang="de-CH" sz="2000" dirty="0">
-                <a:solidFill>
-                  <a:srgbClr val="FF0000"/>
-                </a:solidFill>
-                <a:effectLst/>
-                <a:latin typeface="Calibri" panose="020F0502020204030204" pitchFamily="34" charset="0"/>
-                <a:ea typeface="DengXian" panose="02010600030101010101" pitchFamily="2" charset="-122"/>
-                <a:cs typeface="Times New Roman" panose="02020603050405020304" pitchFamily="18" charset="0"/>
-                <a:sym typeface="Wingdings" panose="05000000000000000000" pitchFamily="2" charset="2"/>
-              </a:rPr>
-              <a:t></a:t>
-            </a:r>
-          </a:p>
-          <a:p>
-            <a:endParaRPr lang="de-CH" sz="2000" dirty="0">
-              <a:solidFill>
-                <a:srgbClr val="FF0000"/>
-              </a:solidFill>
-              <a:effectLst/>
-              <a:latin typeface="Calibri" panose="020F0502020204030204" pitchFamily="34" charset="0"/>
-              <a:ea typeface="DengXian" panose="02010600030101010101" pitchFamily="2" charset="-122"/>
-              <a:cs typeface="Times New Roman" panose="02020603050405020304" pitchFamily="18" charset="0"/>
-              <a:sym typeface="Wingdings" panose="05000000000000000000" pitchFamily="2" charset="2"/>
-            </a:endParaRPr>
-          </a:p>
-          <a:p>
-            <a:endParaRPr lang="de-CH" sz="2000" dirty="0">
-              <a:solidFill>
-                <a:srgbClr val="FF0000"/>
-              </a:solidFill>
-              <a:effectLst/>
-              <a:latin typeface="Calibri" panose="020F0502020204030204" pitchFamily="34" charset="0"/>
-              <a:ea typeface="DengXian" panose="02010600030101010101" pitchFamily="2" charset="-122"/>
-              <a:cs typeface="Times New Roman" panose="02020603050405020304" pitchFamily="18" charset="0"/>
-              <a:sym typeface="Wingdings" panose="05000000000000000000" pitchFamily="2" charset="2"/>
-            </a:endParaRPr>
-          </a:p>
-          <a:p>
-            <a:endParaRPr lang="de-CH" sz="2000" dirty="0"/>
-          </a:p>
-        </p:txBody>
-      </p:sp>
-      <p:sp>
-        <p:nvSpPr>
-          <p:cNvPr id="10" name="CasellaDiTesto 9">
-            <a:extLst>
-              <a:ext uri="{FF2B5EF4-FFF2-40B4-BE49-F238E27FC236}">
-                <a16:creationId xmlns:a16="http://schemas.microsoft.com/office/drawing/2014/main" id="{E9CEF901-06C2-C8D1-2229-4918AAAA054E}"/>
-              </a:ext>
-            </a:extLst>
-          </p:cNvPr>
-          <p:cNvSpPr txBox="1"/>
-          <p:nvPr/>
-        </p:nvSpPr>
-        <p:spPr>
-          <a:xfrm>
-            <a:off x="1611080" y="2155371"/>
-            <a:ext cx="5304749" cy="276999"/>
-          </a:xfrm>
-          <a:prstGeom prst="rect">
-            <a:avLst/>
-          </a:prstGeom>
-          <a:solidFill>
-            <a:schemeClr val="bg1"/>
-          </a:solidFill>
-        </p:spPr>
-        <p:txBody>
-          <a:bodyPr wrap="square" rtlCol="0">
-            <a:spAutoFit/>
-          </a:bodyPr>
-          <a:lstStyle/>
-          <a:p>
-            <a:r>
-              <a:rPr lang="de-DE" sz="1200" b="1" dirty="0" err="1">
-                <a:latin typeface="Arial" panose="020B0604020202020204" pitchFamily="34" charset="0"/>
-                <a:cs typeface="Arial" panose="020B0604020202020204" pitchFamily="34" charset="0"/>
-              </a:rPr>
-              <a:t>Twint</a:t>
-            </a:r>
-            <a:r>
-              <a:rPr lang="de-DE" sz="1200" b="1" dirty="0">
-                <a:latin typeface="Arial" panose="020B0604020202020204" pitchFamily="34" charset="0"/>
-                <a:cs typeface="Arial" panose="020B0604020202020204" pitchFamily="34" charset="0"/>
-              </a:rPr>
-              <a:t> </a:t>
-            </a:r>
-            <a:r>
-              <a:rPr lang="de-DE" sz="1200" b="1" dirty="0" err="1">
-                <a:latin typeface="Arial" panose="020B0604020202020204" pitchFamily="34" charset="0"/>
-                <a:cs typeface="Arial" panose="020B0604020202020204" pitchFamily="34" charset="0"/>
-              </a:rPr>
-              <a:t>Resale</a:t>
-            </a:r>
-            <a:r>
-              <a:rPr lang="de-DE" sz="1200" b="1" dirty="0">
-                <a:latin typeface="Arial" panose="020B0604020202020204" pitchFamily="34" charset="0"/>
-                <a:cs typeface="Arial" panose="020B0604020202020204" pitchFamily="34" charset="0"/>
-              </a:rPr>
-              <a:t> </a:t>
-            </a:r>
-            <a:r>
-              <a:rPr lang="de-DE" sz="1100" dirty="0">
-                <a:latin typeface="Arial" panose="020B0604020202020204" pitchFamily="34" charset="0"/>
-                <a:cs typeface="Arial" panose="020B0604020202020204" pitchFamily="34" charset="0"/>
-              </a:rPr>
-              <a:t>#131948210 </a:t>
-            </a:r>
-            <a:r>
-              <a:rPr lang="de-DE" sz="1100" dirty="0" err="1">
-                <a:latin typeface="Arial" panose="020B0604020202020204" pitchFamily="34" charset="0"/>
-                <a:cs typeface="Arial" panose="020B0604020202020204" pitchFamily="34" charset="0"/>
-              </a:rPr>
-              <a:t>Ref</a:t>
-            </a:r>
-            <a:r>
-              <a:rPr lang="de-DE" sz="1100" dirty="0">
-                <a:latin typeface="Arial" panose="020B0604020202020204" pitchFamily="34" charset="0"/>
-                <a:cs typeface="Arial" panose="020B0604020202020204" pitchFamily="34" charset="0"/>
-              </a:rPr>
-              <a:t> 9901798E64844898 220525CH09DOI7MZ</a:t>
-            </a:r>
-            <a:endParaRPr lang="de-CH" sz="1100" dirty="0">
-              <a:latin typeface="Arial" panose="020B0604020202020204" pitchFamily="34" charset="0"/>
-              <a:cs typeface="Arial" panose="020B0604020202020204" pitchFamily="34" charset="0"/>
-            </a:endParaRPr>
-          </a:p>
-        </p:txBody>
-      </p:sp>
-      <p:sp>
-        <p:nvSpPr>
-          <p:cNvPr id="11" name="CasellaDiTesto 10">
-            <a:extLst>
-              <a:ext uri="{FF2B5EF4-FFF2-40B4-BE49-F238E27FC236}">
-                <a16:creationId xmlns:a16="http://schemas.microsoft.com/office/drawing/2014/main" id="{9F4BB1BD-B4DF-02FD-13B7-053127BEF472}"/>
-              </a:ext>
-            </a:extLst>
-          </p:cNvPr>
-          <p:cNvSpPr txBox="1"/>
-          <p:nvPr/>
-        </p:nvSpPr>
-        <p:spPr>
-          <a:xfrm>
-            <a:off x="1611080" y="3069775"/>
-            <a:ext cx="5304749" cy="276999"/>
-          </a:xfrm>
-          <a:prstGeom prst="rect">
-            <a:avLst/>
-          </a:prstGeom>
-          <a:solidFill>
-            <a:schemeClr val="bg1"/>
-          </a:solidFill>
-        </p:spPr>
-        <p:txBody>
-          <a:bodyPr wrap="square" rtlCol="0">
-            <a:spAutoFit/>
-          </a:bodyPr>
-          <a:lstStyle/>
-          <a:p>
-            <a:r>
-              <a:rPr lang="de-DE" sz="1200" b="1" dirty="0" err="1">
-                <a:latin typeface="Arial" panose="020B0604020202020204" pitchFamily="34" charset="0"/>
-                <a:cs typeface="Arial" panose="020B0604020202020204" pitchFamily="34" charset="0"/>
-              </a:rPr>
-              <a:t>Twint</a:t>
-            </a:r>
-            <a:r>
-              <a:rPr lang="de-DE" sz="1200" b="1" dirty="0">
-                <a:latin typeface="Arial" panose="020B0604020202020204" pitchFamily="34" charset="0"/>
-                <a:cs typeface="Arial" panose="020B0604020202020204" pitchFamily="34" charset="0"/>
-              </a:rPr>
-              <a:t> </a:t>
-            </a:r>
-            <a:r>
-              <a:rPr lang="de-DE" sz="1200" b="1" dirty="0" err="1">
-                <a:latin typeface="Arial" panose="020B0604020202020204" pitchFamily="34" charset="0"/>
-                <a:cs typeface="Arial" panose="020B0604020202020204" pitchFamily="34" charset="0"/>
-              </a:rPr>
-              <a:t>Resale</a:t>
-            </a:r>
-            <a:r>
-              <a:rPr lang="de-DE" sz="1200" b="1" dirty="0">
-                <a:latin typeface="Arial" panose="020B0604020202020204" pitchFamily="34" charset="0"/>
-                <a:cs typeface="Arial" panose="020B0604020202020204" pitchFamily="34" charset="0"/>
-              </a:rPr>
-              <a:t> </a:t>
-            </a:r>
-            <a:r>
-              <a:rPr lang="de-DE" sz="1100" dirty="0">
-                <a:latin typeface="Arial" panose="020B0604020202020204" pitchFamily="34" charset="0"/>
-                <a:cs typeface="Arial" panose="020B0604020202020204" pitchFamily="34" charset="0"/>
-              </a:rPr>
-              <a:t>#131948212 </a:t>
-            </a:r>
-            <a:r>
-              <a:rPr lang="de-DE" sz="1100" dirty="0" err="1">
-                <a:latin typeface="Arial" panose="020B0604020202020204" pitchFamily="34" charset="0"/>
-                <a:cs typeface="Arial" panose="020B0604020202020204" pitchFamily="34" charset="0"/>
-              </a:rPr>
-              <a:t>Ref</a:t>
-            </a:r>
-            <a:r>
-              <a:rPr lang="de-DE" sz="1100" dirty="0">
-                <a:latin typeface="Arial" panose="020B0604020202020204" pitchFamily="34" charset="0"/>
-                <a:cs typeface="Arial" panose="020B0604020202020204" pitchFamily="34" charset="0"/>
-              </a:rPr>
-              <a:t> 9901798E64844992 220619CH08EOI7EL</a:t>
-            </a:r>
-            <a:endParaRPr lang="de-CH" sz="1100" dirty="0">
-              <a:latin typeface="Arial" panose="020B0604020202020204" pitchFamily="34" charset="0"/>
-              <a:cs typeface="Arial" panose="020B0604020202020204" pitchFamily="34" charset="0"/>
-            </a:endParaRPr>
-          </a:p>
-        </p:txBody>
-      </p:sp>
-      <p:sp>
-        <p:nvSpPr>
-          <p:cNvPr id="12" name="CasellaDiTesto 11">
-            <a:extLst>
-              <a:ext uri="{FF2B5EF4-FFF2-40B4-BE49-F238E27FC236}">
-                <a16:creationId xmlns:a16="http://schemas.microsoft.com/office/drawing/2014/main" id="{EF17402A-A015-96C2-96E4-7645ED115433}"/>
-              </a:ext>
-            </a:extLst>
-          </p:cNvPr>
-          <p:cNvSpPr txBox="1"/>
-          <p:nvPr/>
-        </p:nvSpPr>
-        <p:spPr>
-          <a:xfrm>
-            <a:off x="1611080" y="2471057"/>
-            <a:ext cx="5304749" cy="261610"/>
-          </a:xfrm>
-          <a:prstGeom prst="rect">
-            <a:avLst/>
-          </a:prstGeom>
-          <a:solidFill>
-            <a:schemeClr val="bg1"/>
-          </a:solidFill>
-        </p:spPr>
-        <p:txBody>
-          <a:bodyPr wrap="square" rtlCol="0">
-            <a:spAutoFit/>
-          </a:bodyPr>
-          <a:lstStyle/>
-          <a:p>
-            <a:r>
-              <a:rPr lang="de-DE" sz="1100" dirty="0">
-                <a:latin typeface="Arial" panose="020B0604020202020204" pitchFamily="34" charset="0"/>
-                <a:cs typeface="Arial" panose="020B0604020202020204" pitchFamily="34" charset="0"/>
-              </a:rPr>
-              <a:t>Fees May - Monthly</a:t>
-            </a:r>
-            <a:endParaRPr lang="de-CH" sz="1100" dirty="0">
-              <a:latin typeface="Arial" panose="020B0604020202020204" pitchFamily="34" charset="0"/>
-              <a:cs typeface="Arial" panose="020B0604020202020204" pitchFamily="34" charset="0"/>
-            </a:endParaRPr>
-          </a:p>
-        </p:txBody>
-      </p:sp>
-      <p:sp>
-        <p:nvSpPr>
-          <p:cNvPr id="13" name="CasellaDiTesto 12">
-            <a:extLst>
-              <a:ext uri="{FF2B5EF4-FFF2-40B4-BE49-F238E27FC236}">
-                <a16:creationId xmlns:a16="http://schemas.microsoft.com/office/drawing/2014/main" id="{88545D8D-E301-9AB7-7F89-952E84F77056}"/>
-              </a:ext>
-            </a:extLst>
-          </p:cNvPr>
-          <p:cNvSpPr txBox="1"/>
-          <p:nvPr/>
-        </p:nvSpPr>
-        <p:spPr>
-          <a:xfrm>
-            <a:off x="1611080" y="2772314"/>
-            <a:ext cx="6723154" cy="276999"/>
-          </a:xfrm>
-          <a:prstGeom prst="rect">
-            <a:avLst/>
-          </a:prstGeom>
-          <a:solidFill>
-            <a:schemeClr val="bg1"/>
-          </a:solidFill>
-        </p:spPr>
-        <p:txBody>
-          <a:bodyPr wrap="square" rtlCol="0">
-            <a:spAutoFit/>
-          </a:bodyPr>
-          <a:lstStyle/>
-          <a:p>
-            <a:r>
-              <a:rPr lang="de-DE" sz="1100" dirty="0">
-                <a:latin typeface="Arial" panose="020B0604020202020204" pitchFamily="34" charset="0"/>
-                <a:cs typeface="Arial" panose="020B0604020202020204" pitchFamily="34" charset="0"/>
-              </a:rPr>
-              <a:t>Charge CH4570000001690000812 </a:t>
-            </a:r>
-            <a:r>
-              <a:rPr lang="de-DE" sz="1200" b="1" dirty="0" err="1">
-                <a:latin typeface="Arial" panose="020B0604020202020204" pitchFamily="34" charset="0"/>
-                <a:cs typeface="Arial" panose="020B0604020202020204" pitchFamily="34" charset="0"/>
-              </a:rPr>
-              <a:t>Interac</a:t>
-            </a:r>
-            <a:r>
-              <a:rPr lang="de-DE" sz="1200" b="1" dirty="0">
-                <a:latin typeface="Arial" panose="020B0604020202020204" pitchFamily="34" charset="0"/>
-                <a:cs typeface="Arial" panose="020B0604020202020204" pitchFamily="34" charset="0"/>
-              </a:rPr>
-              <a:t> Electronics </a:t>
-            </a:r>
-            <a:r>
-              <a:rPr lang="de-DE" sz="1100" dirty="0">
-                <a:latin typeface="Arial" panose="020B0604020202020204" pitchFamily="34" charset="0"/>
-                <a:cs typeface="Arial" panose="020B0604020202020204" pitchFamily="34" charset="0"/>
-              </a:rPr>
-              <a:t>8000 Zürich Reference 20221024000893583</a:t>
-            </a:r>
-            <a:endParaRPr lang="de-CH" sz="1100" dirty="0">
-              <a:latin typeface="Arial" panose="020B0604020202020204" pitchFamily="34" charset="0"/>
-              <a:cs typeface="Arial" panose="020B0604020202020204" pitchFamily="34" charset="0"/>
-            </a:endParaRPr>
-          </a:p>
-        </p:txBody>
-      </p:sp>
-      <p:sp>
-        <p:nvSpPr>
-          <p:cNvPr id="14" name="CasellaDiTesto 13">
-            <a:extLst>
-              <a:ext uri="{FF2B5EF4-FFF2-40B4-BE49-F238E27FC236}">
-                <a16:creationId xmlns:a16="http://schemas.microsoft.com/office/drawing/2014/main" id="{08B27F42-C1D8-8AAA-D0A8-2BA1519D153E}"/>
-              </a:ext>
-            </a:extLst>
-          </p:cNvPr>
-          <p:cNvSpPr txBox="1"/>
-          <p:nvPr/>
-        </p:nvSpPr>
-        <p:spPr>
-          <a:xfrm>
-            <a:off x="1611080" y="3360146"/>
-            <a:ext cx="6792692" cy="276999"/>
-          </a:xfrm>
-          <a:prstGeom prst="rect">
-            <a:avLst/>
-          </a:prstGeom>
-          <a:solidFill>
-            <a:schemeClr val="bg1"/>
-          </a:solidFill>
-        </p:spPr>
-        <p:txBody>
-          <a:bodyPr wrap="square" rtlCol="0">
-            <a:spAutoFit/>
-          </a:bodyPr>
-          <a:lstStyle/>
-          <a:p>
-            <a:r>
-              <a:rPr lang="de-DE" sz="1100" dirty="0">
-                <a:latin typeface="Arial" panose="020B0604020202020204" pitchFamily="34" charset="0"/>
-                <a:cs typeface="Arial" panose="020B0604020202020204" pitchFamily="34" charset="0"/>
-              </a:rPr>
-              <a:t>Charge CH6990000001690000823 </a:t>
-            </a:r>
-            <a:r>
-              <a:rPr lang="de-DE" sz="1200" b="1" dirty="0">
-                <a:latin typeface="Arial" panose="020B0604020202020204" pitchFamily="34" charset="0"/>
-                <a:cs typeface="Arial" panose="020B0604020202020204" pitchFamily="34" charset="0"/>
-              </a:rPr>
-              <a:t>Swisscom Bern</a:t>
-            </a:r>
-            <a:r>
-              <a:rPr lang="de-DE" sz="1100" dirty="0">
-                <a:latin typeface="Arial" panose="020B0604020202020204" pitchFamily="34" charset="0"/>
-                <a:cs typeface="Arial" panose="020B0604020202020204" pitchFamily="34" charset="0"/>
-              </a:rPr>
-              <a:t> Reference: 2022-05-31 </a:t>
-            </a:r>
-            <a:r>
-              <a:rPr lang="de-DE" sz="1100" dirty="0" err="1">
-                <a:latin typeface="Arial" panose="020B0604020202020204" pitchFamily="34" charset="0"/>
-                <a:cs typeface="Arial" panose="020B0604020202020204" pitchFamily="34" charset="0"/>
-              </a:rPr>
-              <a:t>Telephone</a:t>
-            </a:r>
-            <a:r>
-              <a:rPr lang="de-DE" sz="1100" dirty="0">
-                <a:latin typeface="Arial" panose="020B0604020202020204" pitchFamily="34" charset="0"/>
-                <a:cs typeface="Arial" panose="020B0604020202020204" pitchFamily="34" charset="0"/>
-              </a:rPr>
-              <a:t> +41795561</a:t>
-            </a:r>
-            <a:endParaRPr lang="de-CH" sz="1100" dirty="0">
-              <a:latin typeface="Arial" panose="020B0604020202020204" pitchFamily="34" charset="0"/>
-              <a:cs typeface="Arial" panose="020B0604020202020204" pitchFamily="34" charset="0"/>
-            </a:endParaRPr>
-          </a:p>
-        </p:txBody>
-      </p:sp>
-      <p:sp>
-        <p:nvSpPr>
-          <p:cNvPr id="15" name="CasellaDiTesto 14">
-            <a:extLst>
-              <a:ext uri="{FF2B5EF4-FFF2-40B4-BE49-F238E27FC236}">
-                <a16:creationId xmlns:a16="http://schemas.microsoft.com/office/drawing/2014/main" id="{2ED1781B-913C-EE8B-A358-62DE0B785DFA}"/>
-              </a:ext>
-            </a:extLst>
-          </p:cNvPr>
-          <p:cNvSpPr txBox="1"/>
-          <p:nvPr/>
-        </p:nvSpPr>
-        <p:spPr>
-          <a:xfrm>
-            <a:off x="1611080" y="3682551"/>
-            <a:ext cx="6723154" cy="276999"/>
-          </a:xfrm>
-          <a:prstGeom prst="rect">
-            <a:avLst/>
-          </a:prstGeom>
-          <a:solidFill>
-            <a:schemeClr val="bg1"/>
-          </a:solidFill>
-        </p:spPr>
-        <p:txBody>
-          <a:bodyPr wrap="square" rtlCol="0">
-            <a:spAutoFit/>
-          </a:bodyPr>
-          <a:lstStyle/>
-          <a:p>
-            <a:r>
-              <a:rPr lang="de-DE" sz="1100" dirty="0">
-                <a:latin typeface="Arial" panose="020B0604020202020204" pitchFamily="34" charset="0"/>
-                <a:cs typeface="Arial" panose="020B0604020202020204" pitchFamily="34" charset="0"/>
-              </a:rPr>
-              <a:t>Charge CH6830000001690000944 </a:t>
-            </a:r>
-            <a:r>
-              <a:rPr lang="de-DE" sz="1200" b="1" dirty="0">
-                <a:latin typeface="Arial" panose="020B0604020202020204" pitchFamily="34" charset="0"/>
-                <a:cs typeface="Arial" panose="020B0604020202020204" pitchFamily="34" charset="0"/>
-              </a:rPr>
-              <a:t>Best Insurance</a:t>
-            </a:r>
-            <a:r>
-              <a:rPr lang="de-DE" sz="1100" dirty="0">
-                <a:latin typeface="Arial" panose="020B0604020202020204" pitchFamily="34" charset="0"/>
-                <a:cs typeface="Arial" panose="020B0604020202020204" pitchFamily="34" charset="0"/>
-              </a:rPr>
-              <a:t> 2021 </a:t>
-            </a:r>
-            <a:r>
-              <a:rPr lang="de-DE" sz="1100" dirty="0" err="1">
-                <a:latin typeface="Arial" panose="020B0604020202020204" pitchFamily="34" charset="0"/>
-                <a:cs typeface="Arial" panose="020B0604020202020204" pitchFamily="34" charset="0"/>
-              </a:rPr>
-              <a:t>Contract</a:t>
-            </a:r>
-            <a:r>
-              <a:rPr lang="de-DE" sz="1100" dirty="0">
-                <a:latin typeface="Arial" panose="020B0604020202020204" pitchFamily="34" charset="0"/>
-                <a:cs typeface="Arial" panose="020B0604020202020204" pitchFamily="34" charset="0"/>
-              </a:rPr>
-              <a:t> CAR </a:t>
-            </a:r>
-            <a:r>
-              <a:rPr lang="de-DE" sz="1200" b="1" dirty="0">
-                <a:latin typeface="Arial" panose="020B0604020202020204" pitchFamily="34" charset="0"/>
-                <a:cs typeface="Arial" panose="020B0604020202020204" pitchFamily="34" charset="0"/>
-              </a:rPr>
-              <a:t>892-948</a:t>
-            </a:r>
-            <a:endParaRPr lang="de-CH" sz="1200" b="1" dirty="0">
-              <a:latin typeface="Arial" panose="020B0604020202020204" pitchFamily="34" charset="0"/>
-              <a:cs typeface="Arial" panose="020B0604020202020204" pitchFamily="34" charset="0"/>
-            </a:endParaRPr>
-          </a:p>
-        </p:txBody>
-      </p:sp>
-      <p:sp>
-        <p:nvSpPr>
-          <p:cNvPr id="16" name="CasellaDiTesto 15">
-            <a:extLst>
-              <a:ext uri="{FF2B5EF4-FFF2-40B4-BE49-F238E27FC236}">
-                <a16:creationId xmlns:a16="http://schemas.microsoft.com/office/drawing/2014/main" id="{AC029DA2-A05D-98A1-C49A-E004B5938D0E}"/>
-              </a:ext>
-            </a:extLst>
-          </p:cNvPr>
-          <p:cNvSpPr txBox="1"/>
-          <p:nvPr/>
-        </p:nvSpPr>
-        <p:spPr>
-          <a:xfrm>
-            <a:off x="1611080" y="3976466"/>
-            <a:ext cx="6723154" cy="276999"/>
-          </a:xfrm>
-          <a:prstGeom prst="rect">
-            <a:avLst/>
-          </a:prstGeom>
-          <a:solidFill>
-            <a:schemeClr val="bg1"/>
-          </a:solidFill>
-        </p:spPr>
-        <p:txBody>
-          <a:bodyPr wrap="square" rtlCol="0">
-            <a:spAutoFit/>
-          </a:bodyPr>
-          <a:lstStyle/>
-          <a:p>
-            <a:r>
-              <a:rPr lang="de-DE" sz="1100" dirty="0">
-                <a:latin typeface="Arial" panose="020B0604020202020204" pitchFamily="34" charset="0"/>
-                <a:cs typeface="Arial" panose="020B0604020202020204" pitchFamily="34" charset="0"/>
-              </a:rPr>
-              <a:t>Charge CH6830000001690000944 </a:t>
-            </a:r>
-            <a:r>
-              <a:rPr lang="de-DE" sz="1200" b="1" dirty="0">
-                <a:latin typeface="Arial" panose="020B0604020202020204" pitchFamily="34" charset="0"/>
-                <a:cs typeface="Arial" panose="020B0604020202020204" pitchFamily="34" charset="0"/>
-              </a:rPr>
-              <a:t>Best Insurance</a:t>
-            </a:r>
-            <a:r>
-              <a:rPr lang="de-DE" sz="1100" dirty="0">
-                <a:latin typeface="Arial" panose="020B0604020202020204" pitchFamily="34" charset="0"/>
-                <a:cs typeface="Arial" panose="020B0604020202020204" pitchFamily="34" charset="0"/>
-              </a:rPr>
-              <a:t> 2021 </a:t>
-            </a:r>
-            <a:r>
-              <a:rPr lang="de-DE" sz="1100" dirty="0" err="1">
-                <a:latin typeface="Arial" panose="020B0604020202020204" pitchFamily="34" charset="0"/>
-                <a:cs typeface="Arial" panose="020B0604020202020204" pitchFamily="34" charset="0"/>
-              </a:rPr>
-              <a:t>Contract</a:t>
-            </a:r>
-            <a:r>
-              <a:rPr lang="de-DE" sz="1100" dirty="0">
-                <a:latin typeface="Arial" panose="020B0604020202020204" pitchFamily="34" charset="0"/>
-                <a:cs typeface="Arial" panose="020B0604020202020204" pitchFamily="34" charset="0"/>
-              </a:rPr>
-              <a:t> HEALTH </a:t>
-            </a:r>
-            <a:r>
-              <a:rPr lang="de-DE" sz="1200" b="1" dirty="0">
-                <a:latin typeface="Arial" panose="020B0604020202020204" pitchFamily="34" charset="0"/>
-                <a:cs typeface="Arial" panose="020B0604020202020204" pitchFamily="34" charset="0"/>
-              </a:rPr>
-              <a:t>987-650</a:t>
-            </a:r>
-            <a:endParaRPr lang="de-CH" sz="1200" b="1" dirty="0">
-              <a:latin typeface="Arial" panose="020B0604020202020204" pitchFamily="34" charset="0"/>
-              <a:cs typeface="Arial" panose="020B0604020202020204" pitchFamily="34" charset="0"/>
-            </a:endParaRPr>
+              <a:t></a:t>
+            </a:r>
           </a:p>
         </p:txBody>
       </p:sp>
     </p:spTree>
     <p:extLst>
       <p:ext uri="{BB962C8B-B14F-4D97-AF65-F5344CB8AC3E}">
-        <p14:creationId xmlns:p14="http://schemas.microsoft.com/office/powerpoint/2010/main" val="3864314638"/>
+        <p14:creationId xmlns:p14="http://schemas.microsoft.com/office/powerpoint/2010/main" val="4267621367"/>
       </p:ext>
     </p:extLst>
   </p:cSld>

</xml_diff>

<commit_message>
Update Images node 9981 contra accounts
</commit_message>
<xml_diff>
--- a/en/accounting/other functions/node_9981_images.pptx
+++ b/en/accounting/other functions/node_9981_images.pptx
@@ -5,9 +5,9 @@
     <p:sldMasterId id="2147483648" r:id="rId1"/>
   </p:sldMasterIdLst>
   <p:sldIdLst>
-    <p:sldId id="256" r:id="rId2"/>
+    <p:sldId id="258" r:id="rId2"/>
     <p:sldId id="257" r:id="rId3"/>
-    <p:sldId id="258" r:id="rId4"/>
+    <p:sldId id="256" r:id="rId4"/>
   </p:sldIdLst>
   <p:sldSz cx="12192000" cy="6858000"/>
   <p:notesSz cx="6858000" cy="9144000"/>
@@ -263,7 +263,7 @@
           <a:p>
             <a:fld id="{EFB833B5-D8B8-4489-A7BD-CF7361CF5303}" type="datetimeFigureOut">
               <a:rPr lang="de-CH" smtClean="0"/>
-              <a:t>17.11.2022</a:t>
+              <a:t>18.11.2022</a:t>
             </a:fld>
             <a:endParaRPr lang="de-CH"/>
           </a:p>
@@ -463,7 +463,7 @@
           <a:p>
             <a:fld id="{EFB833B5-D8B8-4489-A7BD-CF7361CF5303}" type="datetimeFigureOut">
               <a:rPr lang="de-CH" smtClean="0"/>
-              <a:t>17.11.2022</a:t>
+              <a:t>18.11.2022</a:t>
             </a:fld>
             <a:endParaRPr lang="de-CH"/>
           </a:p>
@@ -673,7 +673,7 @@
           <a:p>
             <a:fld id="{EFB833B5-D8B8-4489-A7BD-CF7361CF5303}" type="datetimeFigureOut">
               <a:rPr lang="de-CH" smtClean="0"/>
-              <a:t>17.11.2022</a:t>
+              <a:t>18.11.2022</a:t>
             </a:fld>
             <a:endParaRPr lang="de-CH"/>
           </a:p>
@@ -873,7 +873,7 @@
           <a:p>
             <a:fld id="{EFB833B5-D8B8-4489-A7BD-CF7361CF5303}" type="datetimeFigureOut">
               <a:rPr lang="de-CH" smtClean="0"/>
-              <a:t>17.11.2022</a:t>
+              <a:t>18.11.2022</a:t>
             </a:fld>
             <a:endParaRPr lang="de-CH"/>
           </a:p>
@@ -1149,7 +1149,7 @@
           <a:p>
             <a:fld id="{EFB833B5-D8B8-4489-A7BD-CF7361CF5303}" type="datetimeFigureOut">
               <a:rPr lang="de-CH" smtClean="0"/>
-              <a:t>17.11.2022</a:t>
+              <a:t>18.11.2022</a:t>
             </a:fld>
             <a:endParaRPr lang="de-CH"/>
           </a:p>
@@ -1417,7 +1417,7 @@
           <a:p>
             <a:fld id="{EFB833B5-D8B8-4489-A7BD-CF7361CF5303}" type="datetimeFigureOut">
               <a:rPr lang="de-CH" smtClean="0"/>
-              <a:t>17.11.2022</a:t>
+              <a:t>18.11.2022</a:t>
             </a:fld>
             <a:endParaRPr lang="de-CH"/>
           </a:p>
@@ -1832,7 +1832,7 @@
           <a:p>
             <a:fld id="{EFB833B5-D8B8-4489-A7BD-CF7361CF5303}" type="datetimeFigureOut">
               <a:rPr lang="de-CH" smtClean="0"/>
-              <a:t>17.11.2022</a:t>
+              <a:t>18.11.2022</a:t>
             </a:fld>
             <a:endParaRPr lang="de-CH"/>
           </a:p>
@@ -1974,7 +1974,7 @@
           <a:p>
             <a:fld id="{EFB833B5-D8B8-4489-A7BD-CF7361CF5303}" type="datetimeFigureOut">
               <a:rPr lang="de-CH" smtClean="0"/>
-              <a:t>17.11.2022</a:t>
+              <a:t>18.11.2022</a:t>
             </a:fld>
             <a:endParaRPr lang="de-CH"/>
           </a:p>
@@ -2087,7 +2087,7 @@
           <a:p>
             <a:fld id="{EFB833B5-D8B8-4489-A7BD-CF7361CF5303}" type="datetimeFigureOut">
               <a:rPr lang="de-CH" smtClean="0"/>
-              <a:t>17.11.2022</a:t>
+              <a:t>18.11.2022</a:t>
             </a:fld>
             <a:endParaRPr lang="de-CH"/>
           </a:p>
@@ -2400,7 +2400,7 @@
           <a:p>
             <a:fld id="{EFB833B5-D8B8-4489-A7BD-CF7361CF5303}" type="datetimeFigureOut">
               <a:rPr lang="de-CH" smtClean="0"/>
-              <a:t>17.11.2022</a:t>
+              <a:t>18.11.2022</a:t>
             </a:fld>
             <a:endParaRPr lang="de-CH"/>
           </a:p>
@@ -2689,7 +2689,7 @@
           <a:p>
             <a:fld id="{EFB833B5-D8B8-4489-A7BD-CF7361CF5303}" type="datetimeFigureOut">
               <a:rPr lang="de-CH" smtClean="0"/>
-              <a:t>17.11.2022</a:t>
+              <a:t>18.11.2022</a:t>
             </a:fld>
             <a:endParaRPr lang="de-CH"/>
           </a:p>
@@ -2932,7 +2932,7 @@
           <a:p>
             <a:fld id="{EFB833B5-D8B8-4489-A7BD-CF7361CF5303}" type="datetimeFigureOut">
               <a:rPr lang="de-CH" smtClean="0"/>
-              <a:t>17.11.2022</a:t>
+              <a:t>18.11.2022</a:t>
             </a:fld>
             <a:endParaRPr lang="de-CH"/>
           </a:p>
@@ -3351,10 +3351,10 @@
       </p:grpSpPr>
       <p:pic>
         <p:nvPicPr>
-          <p:cNvPr id="18" name="Immagine 17">
-            <a:extLst>
-              <a:ext uri="{FF2B5EF4-FFF2-40B4-BE49-F238E27FC236}">
-                <a16:creationId xmlns:a16="http://schemas.microsoft.com/office/drawing/2014/main" id="{7ADBDFAD-E7B0-F0FE-FEB7-3F0161D6856C}"/>
+          <p:cNvPr id="26" name="Immagine 25">
+            <a:extLst>
+              <a:ext uri="{FF2B5EF4-FFF2-40B4-BE49-F238E27FC236}">
+                <a16:creationId xmlns:a16="http://schemas.microsoft.com/office/drawing/2014/main" id="{FD8CCD54-69C1-4F5A-8551-5C0B3EFC4060}"/>
               </a:ext>
             </a:extLst>
           </p:cNvPr>
@@ -3377,7 +3377,7 @@
         </p:blipFill>
         <p:spPr>
           <a:xfrm>
-            <a:off x="54430" y="985623"/>
+            <a:off x="0" y="724370"/>
             <a:ext cx="12192000" cy="5409259"/>
           </a:xfrm>
           <a:prstGeom prst="rect">
@@ -3387,10 +3387,10 @@
       </p:pic>
       <p:sp>
         <p:nvSpPr>
-          <p:cNvPr id="7" name="CasellaDiTesto 6">
-            <a:extLst>
-              <a:ext uri="{FF2B5EF4-FFF2-40B4-BE49-F238E27FC236}">
-                <a16:creationId xmlns:a16="http://schemas.microsoft.com/office/drawing/2014/main" id="{39FB5C5B-84C9-B056-08CC-B9B3EBC4D0FA}"/>
+          <p:cNvPr id="4" name="CasellaDiTesto 3">
+            <a:extLst>
+              <a:ext uri="{FF2B5EF4-FFF2-40B4-BE49-F238E27FC236}">
+                <a16:creationId xmlns:a16="http://schemas.microsoft.com/office/drawing/2014/main" id="{3EB9ADD0-7BD0-1F9C-047F-4EF6F8E8024D}"/>
               </a:ext>
             </a:extLst>
           </p:cNvPr>
@@ -3399,7 +3399,7 @@
         </p:nvSpPr>
         <p:spPr>
           <a:xfrm>
-            <a:off x="9368160" y="2119951"/>
+            <a:off x="9063367" y="1836919"/>
             <a:ext cx="640934" cy="2246769"/>
           </a:xfrm>
           <a:prstGeom prst="rect">
@@ -3513,10 +3513,10 @@
       </p:sp>
       <p:sp>
         <p:nvSpPr>
-          <p:cNvPr id="8" name="CasellaDiTesto 7">
-            <a:extLst>
-              <a:ext uri="{FF2B5EF4-FFF2-40B4-BE49-F238E27FC236}">
-                <a16:creationId xmlns:a16="http://schemas.microsoft.com/office/drawing/2014/main" id="{99E2BD63-4797-300E-F2DC-FB2C30EE7629}"/>
+          <p:cNvPr id="5" name="CasellaDiTesto 4">
+            <a:extLst>
+              <a:ext uri="{FF2B5EF4-FFF2-40B4-BE49-F238E27FC236}">
+                <a16:creationId xmlns:a16="http://schemas.microsoft.com/office/drawing/2014/main" id="{CF87D66F-7DDC-1EF0-E21B-72BF1D720F66}"/>
               </a:ext>
             </a:extLst>
           </p:cNvPr>
@@ -3525,7 +3525,7 @@
         </p:nvSpPr>
         <p:spPr>
           <a:xfrm>
-            <a:off x="10142408" y="2109791"/>
+            <a:off x="9837615" y="1826759"/>
             <a:ext cx="640934" cy="2246769"/>
           </a:xfrm>
           <a:prstGeom prst="rect">
@@ -3623,525 +3623,963 @@
       </p:sp>
       <p:sp>
         <p:nvSpPr>
-          <p:cNvPr id="10" name="CasellaDiTesto 9">
-            <a:extLst>
-              <a:ext uri="{FF2B5EF4-FFF2-40B4-BE49-F238E27FC236}">
-                <a16:creationId xmlns:a16="http://schemas.microsoft.com/office/drawing/2014/main" id="{E9CEF901-06C2-C8D1-2229-4918AAAA054E}"/>
-              </a:ext>
-            </a:extLst>
-          </p:cNvPr>
-          <p:cNvSpPr txBox="1"/>
+          <p:cNvPr id="9" name="Rettangolo 8">
+            <a:extLst>
+              <a:ext uri="{FF2B5EF4-FFF2-40B4-BE49-F238E27FC236}">
+                <a16:creationId xmlns:a16="http://schemas.microsoft.com/office/drawing/2014/main" id="{8D7C3418-A8A7-C46A-88B7-7A1C8E3BDE16}"/>
+              </a:ext>
+            </a:extLst>
+          </p:cNvPr>
+          <p:cNvSpPr/>
           <p:nvPr/>
         </p:nvSpPr>
         <p:spPr>
           <a:xfrm>
-            <a:off x="1611080" y="2155371"/>
-            <a:ext cx="5304749" cy="276999"/>
+            <a:off x="1567910" y="1913120"/>
+            <a:ext cx="900000" cy="231366"/>
           </a:xfrm>
           <a:prstGeom prst="rect">
             <a:avLst/>
           </a:prstGeom>
           <a:solidFill>
-            <a:schemeClr val="bg1"/>
+            <a:srgbClr val="FFFF00">
+              <a:alpha val="30000"/>
+            </a:srgbClr>
           </a:solidFill>
+          <a:ln>
+            <a:noFill/>
+          </a:ln>
         </p:spPr>
-        <p:txBody>
-          <a:bodyPr wrap="square" rtlCol="0">
-            <a:spAutoFit/>
-          </a:bodyPr>
-          <a:lstStyle/>
-          <a:p>
-            <a:r>
-              <a:rPr lang="de-DE" sz="1200" b="1" dirty="0" err="1">
-                <a:latin typeface="Arial" panose="020B0604020202020204" pitchFamily="34" charset="0"/>
-                <a:cs typeface="Arial" panose="020B0604020202020204" pitchFamily="34" charset="0"/>
-              </a:rPr>
-              <a:t>Twint</a:t>
-            </a:r>
-            <a:r>
-              <a:rPr lang="de-DE" sz="1200" b="1" dirty="0">
-                <a:latin typeface="Arial" panose="020B0604020202020204" pitchFamily="34" charset="0"/>
-                <a:cs typeface="Arial" panose="020B0604020202020204" pitchFamily="34" charset="0"/>
-              </a:rPr>
-              <a:t> </a:t>
-            </a:r>
-            <a:r>
-              <a:rPr lang="de-DE" sz="1200" b="1" dirty="0" err="1">
-                <a:latin typeface="Arial" panose="020B0604020202020204" pitchFamily="34" charset="0"/>
-                <a:cs typeface="Arial" panose="020B0604020202020204" pitchFamily="34" charset="0"/>
-              </a:rPr>
-              <a:t>Resale</a:t>
-            </a:r>
-            <a:r>
-              <a:rPr lang="de-DE" sz="1200" b="1" dirty="0">
-                <a:latin typeface="Arial" panose="020B0604020202020204" pitchFamily="34" charset="0"/>
-                <a:cs typeface="Arial" panose="020B0604020202020204" pitchFamily="34" charset="0"/>
-              </a:rPr>
-              <a:t> </a:t>
-            </a:r>
-            <a:r>
-              <a:rPr lang="de-DE" sz="1100" dirty="0">
-                <a:latin typeface="Arial" panose="020B0604020202020204" pitchFamily="34" charset="0"/>
-                <a:cs typeface="Arial" panose="020B0604020202020204" pitchFamily="34" charset="0"/>
-              </a:rPr>
-              <a:t>#131948210 </a:t>
-            </a:r>
-            <a:r>
-              <a:rPr lang="de-DE" sz="1100" dirty="0" err="1">
-                <a:latin typeface="Arial" panose="020B0604020202020204" pitchFamily="34" charset="0"/>
-                <a:cs typeface="Arial" panose="020B0604020202020204" pitchFamily="34" charset="0"/>
-              </a:rPr>
-              <a:t>Ref</a:t>
-            </a:r>
-            <a:r>
-              <a:rPr lang="de-DE" sz="1100" dirty="0">
-                <a:latin typeface="Arial" panose="020B0604020202020204" pitchFamily="34" charset="0"/>
-                <a:cs typeface="Arial" panose="020B0604020202020204" pitchFamily="34" charset="0"/>
-              </a:rPr>
-              <a:t> 9901798E64844898 220525CH09DOI7MZ</a:t>
-            </a:r>
-            <a:endParaRPr lang="de-CH" sz="1100" dirty="0">
-              <a:latin typeface="Arial" panose="020B0604020202020204" pitchFamily="34" charset="0"/>
-              <a:cs typeface="Arial" panose="020B0604020202020204" pitchFamily="34" charset="0"/>
+        <p:style>
+          <a:lnRef idx="2">
+            <a:schemeClr val="accent1">
+              <a:shade val="50000"/>
+            </a:schemeClr>
+          </a:lnRef>
+          <a:fillRef idx="1">
+            <a:schemeClr val="accent1"/>
+          </a:fillRef>
+          <a:effectRef idx="0">
+            <a:schemeClr val="accent1"/>
+          </a:effectRef>
+          <a:fontRef idx="minor">
+            <a:schemeClr val="lt1"/>
+          </a:fontRef>
+        </p:style>
+        <p:txBody>
+          <a:bodyPr rtlCol="0" anchor="ctr"/>
+          <a:lstStyle/>
+          <a:p>
+            <a:pPr algn="ctr"/>
+            <a:endParaRPr lang="de-CH">
+              <a:ln>
+                <a:solidFill>
+                  <a:schemeClr val="tx1"/>
+                </a:solidFill>
+              </a:ln>
+              <a:solidFill>
+                <a:schemeClr val="tx1"/>
+              </a:solidFill>
             </a:endParaRPr>
           </a:p>
         </p:txBody>
       </p:sp>
       <p:sp>
         <p:nvSpPr>
-          <p:cNvPr id="11" name="CasellaDiTesto 10">
-            <a:extLst>
-              <a:ext uri="{FF2B5EF4-FFF2-40B4-BE49-F238E27FC236}">
-                <a16:creationId xmlns:a16="http://schemas.microsoft.com/office/drawing/2014/main" id="{9F4BB1BD-B4DF-02FD-13B7-053127BEF472}"/>
-              </a:ext>
-            </a:extLst>
-          </p:cNvPr>
-          <p:cNvSpPr txBox="1"/>
+          <p:cNvPr id="10" name="Rettangolo 9">
+            <a:extLst>
+              <a:ext uri="{FF2B5EF4-FFF2-40B4-BE49-F238E27FC236}">
+                <a16:creationId xmlns:a16="http://schemas.microsoft.com/office/drawing/2014/main" id="{8479E18A-3FB4-A54D-95EF-CE34E0AE4BC8}"/>
+              </a:ext>
+            </a:extLst>
+          </p:cNvPr>
+          <p:cNvSpPr/>
           <p:nvPr/>
         </p:nvSpPr>
         <p:spPr>
           <a:xfrm>
-            <a:off x="1611080" y="3069775"/>
-            <a:ext cx="5304749" cy="276999"/>
+            <a:off x="3810364" y="2522725"/>
+            <a:ext cx="1296000" cy="231366"/>
           </a:xfrm>
           <a:prstGeom prst="rect">
             <a:avLst/>
           </a:prstGeom>
           <a:solidFill>
-            <a:schemeClr val="bg1"/>
+            <a:srgbClr val="FFFF00">
+              <a:alpha val="30000"/>
+            </a:srgbClr>
           </a:solidFill>
+          <a:ln>
+            <a:noFill/>
+          </a:ln>
         </p:spPr>
-        <p:txBody>
-          <a:bodyPr wrap="square" rtlCol="0">
-            <a:spAutoFit/>
-          </a:bodyPr>
-          <a:lstStyle/>
-          <a:p>
-            <a:r>
-              <a:rPr lang="de-DE" sz="1200" b="1" dirty="0" err="1">
-                <a:latin typeface="Arial" panose="020B0604020202020204" pitchFamily="34" charset="0"/>
-                <a:cs typeface="Arial" panose="020B0604020202020204" pitchFamily="34" charset="0"/>
-              </a:rPr>
-              <a:t>Twint</a:t>
-            </a:r>
-            <a:r>
-              <a:rPr lang="de-DE" sz="1200" b="1" dirty="0">
-                <a:latin typeface="Arial" panose="020B0604020202020204" pitchFamily="34" charset="0"/>
-                <a:cs typeface="Arial" panose="020B0604020202020204" pitchFamily="34" charset="0"/>
-              </a:rPr>
-              <a:t> </a:t>
-            </a:r>
-            <a:r>
-              <a:rPr lang="de-DE" sz="1200" b="1" dirty="0" err="1">
-                <a:latin typeface="Arial" panose="020B0604020202020204" pitchFamily="34" charset="0"/>
-                <a:cs typeface="Arial" panose="020B0604020202020204" pitchFamily="34" charset="0"/>
-              </a:rPr>
-              <a:t>Resale</a:t>
-            </a:r>
-            <a:r>
-              <a:rPr lang="de-DE" sz="1200" b="1" dirty="0">
-                <a:latin typeface="Arial" panose="020B0604020202020204" pitchFamily="34" charset="0"/>
-                <a:cs typeface="Arial" panose="020B0604020202020204" pitchFamily="34" charset="0"/>
-              </a:rPr>
-              <a:t> </a:t>
-            </a:r>
-            <a:r>
-              <a:rPr lang="de-DE" sz="1100" dirty="0">
-                <a:latin typeface="Arial" panose="020B0604020202020204" pitchFamily="34" charset="0"/>
-                <a:cs typeface="Arial" panose="020B0604020202020204" pitchFamily="34" charset="0"/>
-              </a:rPr>
-              <a:t>#131948212 </a:t>
-            </a:r>
-            <a:r>
-              <a:rPr lang="de-DE" sz="1100" dirty="0" err="1">
-                <a:latin typeface="Arial" panose="020B0604020202020204" pitchFamily="34" charset="0"/>
-                <a:cs typeface="Arial" panose="020B0604020202020204" pitchFamily="34" charset="0"/>
-              </a:rPr>
-              <a:t>Ref</a:t>
-            </a:r>
-            <a:r>
-              <a:rPr lang="de-DE" sz="1100" dirty="0">
-                <a:latin typeface="Arial" panose="020B0604020202020204" pitchFamily="34" charset="0"/>
-                <a:cs typeface="Arial" panose="020B0604020202020204" pitchFamily="34" charset="0"/>
-              </a:rPr>
-              <a:t> 9901798E64844992 220619CH08EOI7EL</a:t>
-            </a:r>
-            <a:endParaRPr lang="de-CH" sz="1100" dirty="0">
-              <a:latin typeface="Arial" panose="020B0604020202020204" pitchFamily="34" charset="0"/>
-              <a:cs typeface="Arial" panose="020B0604020202020204" pitchFamily="34" charset="0"/>
+        <p:style>
+          <a:lnRef idx="2">
+            <a:schemeClr val="accent1">
+              <a:shade val="50000"/>
+            </a:schemeClr>
+          </a:lnRef>
+          <a:fillRef idx="1">
+            <a:schemeClr val="accent1"/>
+          </a:fillRef>
+          <a:effectRef idx="0">
+            <a:schemeClr val="accent1"/>
+          </a:effectRef>
+          <a:fontRef idx="minor">
+            <a:schemeClr val="lt1"/>
+          </a:fontRef>
+        </p:style>
+        <p:txBody>
+          <a:bodyPr rtlCol="0" anchor="ctr"/>
+          <a:lstStyle/>
+          <a:p>
+            <a:pPr algn="ctr"/>
+            <a:endParaRPr lang="de-CH">
+              <a:ln>
+                <a:solidFill>
+                  <a:schemeClr val="tx1"/>
+                </a:solidFill>
+              </a:ln>
+              <a:solidFill>
+                <a:schemeClr val="tx1"/>
+              </a:solidFill>
             </a:endParaRPr>
           </a:p>
         </p:txBody>
       </p:sp>
       <p:sp>
         <p:nvSpPr>
-          <p:cNvPr id="12" name="CasellaDiTesto 11">
-            <a:extLst>
-              <a:ext uri="{FF2B5EF4-FFF2-40B4-BE49-F238E27FC236}">
-                <a16:creationId xmlns:a16="http://schemas.microsoft.com/office/drawing/2014/main" id="{EF17402A-A015-96C2-96E4-7645ED115433}"/>
-              </a:ext>
-            </a:extLst>
-          </p:cNvPr>
-          <p:cNvSpPr txBox="1"/>
+          <p:cNvPr id="11" name="Rettangolo 10">
+            <a:extLst>
+              <a:ext uri="{FF2B5EF4-FFF2-40B4-BE49-F238E27FC236}">
+                <a16:creationId xmlns:a16="http://schemas.microsoft.com/office/drawing/2014/main" id="{F1B82713-1F08-E77F-9155-76A9F028EE36}"/>
+              </a:ext>
+            </a:extLst>
+          </p:cNvPr>
+          <p:cNvSpPr/>
           <p:nvPr/>
         </p:nvSpPr>
         <p:spPr>
           <a:xfrm>
-            <a:off x="1611080" y="2471057"/>
-            <a:ext cx="5304749" cy="261610"/>
+            <a:off x="1557020" y="2838406"/>
+            <a:ext cx="900000" cy="231366"/>
           </a:xfrm>
           <a:prstGeom prst="rect">
             <a:avLst/>
           </a:prstGeom>
           <a:solidFill>
-            <a:schemeClr val="bg1"/>
+            <a:srgbClr val="FFFF00">
+              <a:alpha val="30000"/>
+            </a:srgbClr>
           </a:solidFill>
+          <a:ln>
+            <a:noFill/>
+          </a:ln>
         </p:spPr>
-        <p:txBody>
-          <a:bodyPr wrap="square" rtlCol="0">
-            <a:spAutoFit/>
-          </a:bodyPr>
-          <a:lstStyle/>
-          <a:p>
-            <a:r>
-              <a:rPr lang="de-DE" sz="1100" dirty="0">
-                <a:latin typeface="Arial" panose="020B0604020202020204" pitchFamily="34" charset="0"/>
-                <a:cs typeface="Arial" panose="020B0604020202020204" pitchFamily="34" charset="0"/>
-              </a:rPr>
-              <a:t>Fees May - Monthly</a:t>
-            </a:r>
-            <a:endParaRPr lang="de-CH" sz="1100" dirty="0">
-              <a:latin typeface="Arial" panose="020B0604020202020204" pitchFamily="34" charset="0"/>
-              <a:cs typeface="Arial" panose="020B0604020202020204" pitchFamily="34" charset="0"/>
+        <p:style>
+          <a:lnRef idx="2">
+            <a:schemeClr val="accent1">
+              <a:shade val="50000"/>
+            </a:schemeClr>
+          </a:lnRef>
+          <a:fillRef idx="1">
+            <a:schemeClr val="accent1"/>
+          </a:fillRef>
+          <a:effectRef idx="0">
+            <a:schemeClr val="accent1"/>
+          </a:effectRef>
+          <a:fontRef idx="minor">
+            <a:schemeClr val="lt1"/>
+          </a:fontRef>
+        </p:style>
+        <p:txBody>
+          <a:bodyPr rtlCol="0" anchor="ctr"/>
+          <a:lstStyle/>
+          <a:p>
+            <a:pPr algn="ctr"/>
+            <a:endParaRPr lang="de-CH">
+              <a:ln>
+                <a:solidFill>
+                  <a:schemeClr val="tx1"/>
+                </a:solidFill>
+              </a:ln>
+              <a:solidFill>
+                <a:schemeClr val="tx1"/>
+              </a:solidFill>
             </a:endParaRPr>
           </a:p>
         </p:txBody>
       </p:sp>
       <p:sp>
         <p:nvSpPr>
-          <p:cNvPr id="13" name="CasellaDiTesto 12">
-            <a:extLst>
-              <a:ext uri="{FF2B5EF4-FFF2-40B4-BE49-F238E27FC236}">
-                <a16:creationId xmlns:a16="http://schemas.microsoft.com/office/drawing/2014/main" id="{88545D8D-E301-9AB7-7F89-952E84F77056}"/>
-              </a:ext>
-            </a:extLst>
-          </p:cNvPr>
-          <p:cNvSpPr txBox="1"/>
+          <p:cNvPr id="12" name="Rettangolo 11">
+            <a:extLst>
+              <a:ext uri="{FF2B5EF4-FFF2-40B4-BE49-F238E27FC236}">
+                <a16:creationId xmlns:a16="http://schemas.microsoft.com/office/drawing/2014/main" id="{71D645A7-8A1B-EDCC-CE0C-63DC73609134}"/>
+              </a:ext>
+            </a:extLst>
+          </p:cNvPr>
+          <p:cNvSpPr/>
           <p:nvPr/>
         </p:nvSpPr>
         <p:spPr>
           <a:xfrm>
-            <a:off x="1611080" y="2772314"/>
-            <a:ext cx="6723154" cy="276999"/>
+            <a:off x="3810364" y="3135088"/>
+            <a:ext cx="720000" cy="231366"/>
           </a:xfrm>
           <a:prstGeom prst="rect">
             <a:avLst/>
           </a:prstGeom>
           <a:solidFill>
-            <a:schemeClr val="bg1"/>
+            <a:srgbClr val="FFFF00">
+              <a:alpha val="30000"/>
+            </a:srgbClr>
           </a:solidFill>
+          <a:ln>
+            <a:noFill/>
+          </a:ln>
         </p:spPr>
-        <p:txBody>
-          <a:bodyPr wrap="square" rtlCol="0">
-            <a:spAutoFit/>
-          </a:bodyPr>
-          <a:lstStyle/>
-          <a:p>
-            <a:r>
-              <a:rPr lang="de-DE" sz="1100" dirty="0">
-                <a:latin typeface="Arial" panose="020B0604020202020204" pitchFamily="34" charset="0"/>
-                <a:cs typeface="Arial" panose="020B0604020202020204" pitchFamily="34" charset="0"/>
-              </a:rPr>
-              <a:t>Charge CH4570000001690000812 </a:t>
-            </a:r>
-            <a:r>
-              <a:rPr lang="de-DE" sz="1200" b="1" dirty="0" err="1">
-                <a:latin typeface="Arial" panose="020B0604020202020204" pitchFamily="34" charset="0"/>
-                <a:cs typeface="Arial" panose="020B0604020202020204" pitchFamily="34" charset="0"/>
-              </a:rPr>
-              <a:t>Interac</a:t>
-            </a:r>
-            <a:r>
-              <a:rPr lang="de-DE" sz="1200" b="1" dirty="0">
-                <a:latin typeface="Arial" panose="020B0604020202020204" pitchFamily="34" charset="0"/>
-                <a:cs typeface="Arial" panose="020B0604020202020204" pitchFamily="34" charset="0"/>
-              </a:rPr>
-              <a:t> Electronics </a:t>
-            </a:r>
-            <a:r>
-              <a:rPr lang="de-DE" sz="1100" dirty="0">
-                <a:latin typeface="Arial" panose="020B0604020202020204" pitchFamily="34" charset="0"/>
-                <a:cs typeface="Arial" panose="020B0604020202020204" pitchFamily="34" charset="0"/>
-              </a:rPr>
-              <a:t>8000 Zürich Reference 20221024000893583</a:t>
-            </a:r>
-            <a:endParaRPr lang="de-CH" sz="1100" dirty="0">
-              <a:latin typeface="Arial" panose="020B0604020202020204" pitchFamily="34" charset="0"/>
-              <a:cs typeface="Arial" panose="020B0604020202020204" pitchFamily="34" charset="0"/>
+        <p:style>
+          <a:lnRef idx="2">
+            <a:schemeClr val="accent1">
+              <a:shade val="50000"/>
+            </a:schemeClr>
+          </a:lnRef>
+          <a:fillRef idx="1">
+            <a:schemeClr val="accent1"/>
+          </a:fillRef>
+          <a:effectRef idx="0">
+            <a:schemeClr val="accent1"/>
+          </a:effectRef>
+          <a:fontRef idx="minor">
+            <a:schemeClr val="lt1"/>
+          </a:fontRef>
+        </p:style>
+        <p:txBody>
+          <a:bodyPr rtlCol="0" anchor="ctr"/>
+          <a:lstStyle/>
+          <a:p>
+            <a:pPr algn="ctr"/>
+            <a:endParaRPr lang="de-CH">
+              <a:ln>
+                <a:solidFill>
+                  <a:schemeClr val="tx1"/>
+                </a:solidFill>
+              </a:ln>
+              <a:solidFill>
+                <a:schemeClr val="tx1"/>
+              </a:solidFill>
             </a:endParaRPr>
           </a:p>
         </p:txBody>
       </p:sp>
       <p:sp>
         <p:nvSpPr>
-          <p:cNvPr id="14" name="CasellaDiTesto 13">
-            <a:extLst>
-              <a:ext uri="{FF2B5EF4-FFF2-40B4-BE49-F238E27FC236}">
-                <a16:creationId xmlns:a16="http://schemas.microsoft.com/office/drawing/2014/main" id="{08B27F42-C1D8-8AAA-D0A8-2BA1519D153E}"/>
-              </a:ext>
-            </a:extLst>
-          </p:cNvPr>
-          <p:cNvSpPr txBox="1"/>
+          <p:cNvPr id="13" name="Rettangolo 12">
+            <a:extLst>
+              <a:ext uri="{FF2B5EF4-FFF2-40B4-BE49-F238E27FC236}">
+                <a16:creationId xmlns:a16="http://schemas.microsoft.com/office/drawing/2014/main" id="{CF1C2D11-5FCD-B6DD-A9F2-A5CCB36FB559}"/>
+              </a:ext>
+            </a:extLst>
+          </p:cNvPr>
+          <p:cNvSpPr/>
           <p:nvPr/>
         </p:nvSpPr>
         <p:spPr>
           <a:xfrm>
-            <a:off x="1611080" y="3360146"/>
-            <a:ext cx="7315206" cy="276999"/>
+            <a:off x="7010763" y="3124198"/>
+            <a:ext cx="1008000" cy="231366"/>
           </a:xfrm>
           <a:prstGeom prst="rect">
             <a:avLst/>
           </a:prstGeom>
           <a:solidFill>
-            <a:schemeClr val="bg1"/>
+            <a:srgbClr val="FFFF00">
+              <a:alpha val="30000"/>
+            </a:srgbClr>
           </a:solidFill>
+          <a:ln>
+            <a:noFill/>
+          </a:ln>
         </p:spPr>
-        <p:txBody>
-          <a:bodyPr wrap="square" rtlCol="0">
-            <a:spAutoFit/>
-          </a:bodyPr>
-          <a:lstStyle/>
-          <a:p>
-            <a:r>
-              <a:rPr lang="de-DE" sz="1100" dirty="0">
-                <a:latin typeface="Arial" panose="020B0604020202020204" pitchFamily="34" charset="0"/>
-                <a:cs typeface="Arial" panose="020B0604020202020204" pitchFamily="34" charset="0"/>
-              </a:rPr>
-              <a:t>Charge CH6990000001690000823 </a:t>
-            </a:r>
-            <a:r>
-              <a:rPr lang="de-DE" sz="1200" b="1" dirty="0">
-                <a:latin typeface="Arial" panose="020B0604020202020204" pitchFamily="34" charset="0"/>
-                <a:cs typeface="Arial" panose="020B0604020202020204" pitchFamily="34" charset="0"/>
-              </a:rPr>
-              <a:t>Swisscom </a:t>
-            </a:r>
-            <a:r>
-              <a:rPr lang="de-DE" sz="1200" dirty="0">
-                <a:latin typeface="Arial" panose="020B0604020202020204" pitchFamily="34" charset="0"/>
-                <a:cs typeface="Arial" panose="020B0604020202020204" pitchFamily="34" charset="0"/>
-              </a:rPr>
-              <a:t>Bern</a:t>
-            </a:r>
-            <a:r>
-              <a:rPr lang="de-DE" sz="1100" dirty="0">
-                <a:latin typeface="Arial" panose="020B0604020202020204" pitchFamily="34" charset="0"/>
-                <a:cs typeface="Arial" panose="020B0604020202020204" pitchFamily="34" charset="0"/>
-              </a:rPr>
-              <a:t> Reference: 2022-05-31 </a:t>
-            </a:r>
-            <a:r>
-              <a:rPr lang="de-DE" sz="1100" dirty="0" err="1">
-                <a:latin typeface="Arial" panose="020B0604020202020204" pitchFamily="34" charset="0"/>
-                <a:cs typeface="Arial" panose="020B0604020202020204" pitchFamily="34" charset="0"/>
-              </a:rPr>
-              <a:t>Telephone</a:t>
-            </a:r>
-            <a:r>
-              <a:rPr lang="de-DE" sz="1100" dirty="0">
-                <a:latin typeface="Arial" panose="020B0604020202020204" pitchFamily="34" charset="0"/>
-                <a:cs typeface="Arial" panose="020B0604020202020204" pitchFamily="34" charset="0"/>
-              </a:rPr>
-              <a:t> </a:t>
-            </a:r>
-            <a:r>
-              <a:rPr lang="de-DE" sz="1200" b="1" dirty="0">
-                <a:latin typeface="Arial" panose="020B0604020202020204" pitchFamily="34" charset="0"/>
-                <a:cs typeface="Arial" panose="020B0604020202020204" pitchFamily="34" charset="0"/>
-              </a:rPr>
-              <a:t>+41795561718</a:t>
-            </a:r>
-            <a:endParaRPr lang="de-CH" sz="1200" b="1" dirty="0">
-              <a:latin typeface="Arial" panose="020B0604020202020204" pitchFamily="34" charset="0"/>
-              <a:cs typeface="Arial" panose="020B0604020202020204" pitchFamily="34" charset="0"/>
+        <p:style>
+          <a:lnRef idx="2">
+            <a:schemeClr val="accent1">
+              <a:shade val="50000"/>
+            </a:schemeClr>
+          </a:lnRef>
+          <a:fillRef idx="1">
+            <a:schemeClr val="accent1"/>
+          </a:fillRef>
+          <a:effectRef idx="0">
+            <a:schemeClr val="accent1"/>
+          </a:effectRef>
+          <a:fontRef idx="minor">
+            <a:schemeClr val="lt1"/>
+          </a:fontRef>
+        </p:style>
+        <p:txBody>
+          <a:bodyPr rtlCol="0" anchor="ctr"/>
+          <a:lstStyle/>
+          <a:p>
+            <a:pPr algn="ctr"/>
+            <a:endParaRPr lang="de-CH">
+              <a:ln>
+                <a:solidFill>
+                  <a:schemeClr val="tx1"/>
+                </a:solidFill>
+              </a:ln>
+              <a:solidFill>
+                <a:schemeClr val="tx1"/>
+              </a:solidFill>
             </a:endParaRPr>
           </a:p>
         </p:txBody>
       </p:sp>
       <p:sp>
         <p:nvSpPr>
-          <p:cNvPr id="15" name="CasellaDiTesto 14">
-            <a:extLst>
-              <a:ext uri="{FF2B5EF4-FFF2-40B4-BE49-F238E27FC236}">
-                <a16:creationId xmlns:a16="http://schemas.microsoft.com/office/drawing/2014/main" id="{2ED1781B-913C-EE8B-A358-62DE0B785DFA}"/>
-              </a:ext>
-            </a:extLst>
-          </p:cNvPr>
-          <p:cNvSpPr txBox="1"/>
+          <p:cNvPr id="14" name="Rettangolo 13">
+            <a:extLst>
+              <a:ext uri="{FF2B5EF4-FFF2-40B4-BE49-F238E27FC236}">
+                <a16:creationId xmlns:a16="http://schemas.microsoft.com/office/drawing/2014/main" id="{A311E572-A428-BFA6-3252-97CDFB827AED}"/>
+              </a:ext>
+            </a:extLst>
+          </p:cNvPr>
+          <p:cNvSpPr/>
           <p:nvPr/>
         </p:nvSpPr>
         <p:spPr>
           <a:xfrm>
-            <a:off x="1611080" y="3682551"/>
-            <a:ext cx="6723154" cy="276999"/>
+            <a:off x="3798788" y="3448003"/>
+            <a:ext cx="1080000" cy="231366"/>
           </a:xfrm>
           <a:prstGeom prst="rect">
             <a:avLst/>
           </a:prstGeom>
           <a:solidFill>
-            <a:schemeClr val="bg1"/>
+            <a:srgbClr val="FFFF00">
+              <a:alpha val="30000"/>
+            </a:srgbClr>
           </a:solidFill>
+          <a:ln>
+            <a:noFill/>
+          </a:ln>
         </p:spPr>
-        <p:txBody>
-          <a:bodyPr wrap="square" rtlCol="0">
-            <a:spAutoFit/>
-          </a:bodyPr>
-          <a:lstStyle/>
-          <a:p>
-            <a:r>
-              <a:rPr lang="de-DE" sz="1100" dirty="0">
-                <a:latin typeface="Arial" panose="020B0604020202020204" pitchFamily="34" charset="0"/>
-                <a:cs typeface="Arial" panose="020B0604020202020204" pitchFamily="34" charset="0"/>
-              </a:rPr>
-              <a:t>Charge CH6830000001690000944 </a:t>
-            </a:r>
-            <a:r>
-              <a:rPr lang="de-DE" sz="1200" b="1" dirty="0">
-                <a:latin typeface="Arial" panose="020B0604020202020204" pitchFamily="34" charset="0"/>
-                <a:cs typeface="Arial" panose="020B0604020202020204" pitchFamily="34" charset="0"/>
-              </a:rPr>
-              <a:t>Best Insurance</a:t>
-            </a:r>
-            <a:r>
-              <a:rPr lang="de-DE" sz="1100" dirty="0">
-                <a:latin typeface="Arial" panose="020B0604020202020204" pitchFamily="34" charset="0"/>
-                <a:cs typeface="Arial" panose="020B0604020202020204" pitchFamily="34" charset="0"/>
-              </a:rPr>
-              <a:t> 2021 </a:t>
-            </a:r>
-            <a:r>
-              <a:rPr lang="de-DE" sz="1100" dirty="0" err="1">
-                <a:latin typeface="Arial" panose="020B0604020202020204" pitchFamily="34" charset="0"/>
-                <a:cs typeface="Arial" panose="020B0604020202020204" pitchFamily="34" charset="0"/>
-              </a:rPr>
-              <a:t>Contract</a:t>
-            </a:r>
-            <a:r>
-              <a:rPr lang="de-DE" sz="1100" dirty="0">
-                <a:latin typeface="Arial" panose="020B0604020202020204" pitchFamily="34" charset="0"/>
-                <a:cs typeface="Arial" panose="020B0604020202020204" pitchFamily="34" charset="0"/>
-              </a:rPr>
-              <a:t> </a:t>
-            </a:r>
-            <a:r>
-              <a:rPr lang="de-DE" sz="1200" b="1" dirty="0">
-                <a:latin typeface="Arial" panose="020B0604020202020204" pitchFamily="34" charset="0"/>
-                <a:cs typeface="Arial" panose="020B0604020202020204" pitchFamily="34" charset="0"/>
-              </a:rPr>
-              <a:t>892-948</a:t>
-            </a:r>
-            <a:endParaRPr lang="de-CH" sz="1200" b="1" dirty="0">
-              <a:latin typeface="Arial" panose="020B0604020202020204" pitchFamily="34" charset="0"/>
-              <a:cs typeface="Arial" panose="020B0604020202020204" pitchFamily="34" charset="0"/>
+        <p:style>
+          <a:lnRef idx="2">
+            <a:schemeClr val="accent1">
+              <a:shade val="50000"/>
+            </a:schemeClr>
+          </a:lnRef>
+          <a:fillRef idx="1">
+            <a:schemeClr val="accent1"/>
+          </a:fillRef>
+          <a:effectRef idx="0">
+            <a:schemeClr val="accent1"/>
+          </a:effectRef>
+          <a:fontRef idx="minor">
+            <a:schemeClr val="lt1"/>
+          </a:fontRef>
+        </p:style>
+        <p:txBody>
+          <a:bodyPr rtlCol="0" anchor="ctr"/>
+          <a:lstStyle/>
+          <a:p>
+            <a:pPr algn="ctr"/>
+            <a:endParaRPr lang="de-CH">
+              <a:ln>
+                <a:solidFill>
+                  <a:schemeClr val="tx1"/>
+                </a:solidFill>
+              </a:ln>
+              <a:solidFill>
+                <a:schemeClr val="tx1"/>
+              </a:solidFill>
             </a:endParaRPr>
           </a:p>
         </p:txBody>
       </p:sp>
       <p:sp>
         <p:nvSpPr>
-          <p:cNvPr id="16" name="CasellaDiTesto 15">
-            <a:extLst>
-              <a:ext uri="{FF2B5EF4-FFF2-40B4-BE49-F238E27FC236}">
-                <a16:creationId xmlns:a16="http://schemas.microsoft.com/office/drawing/2014/main" id="{AC029DA2-A05D-98A1-C49A-E004B5938D0E}"/>
-              </a:ext>
-            </a:extLst>
-          </p:cNvPr>
-          <p:cNvSpPr txBox="1"/>
+          <p:cNvPr id="15" name="Rettangolo 14">
+            <a:extLst>
+              <a:ext uri="{FF2B5EF4-FFF2-40B4-BE49-F238E27FC236}">
+                <a16:creationId xmlns:a16="http://schemas.microsoft.com/office/drawing/2014/main" id="{3676EB5F-66C9-4238-1E2C-2151278CEBE3}"/>
+              </a:ext>
+            </a:extLst>
+          </p:cNvPr>
+          <p:cNvSpPr/>
           <p:nvPr/>
         </p:nvSpPr>
         <p:spPr>
           <a:xfrm>
-            <a:off x="1611080" y="3976466"/>
-            <a:ext cx="6723154" cy="276999"/>
+            <a:off x="5829947" y="3448003"/>
+            <a:ext cx="648000" cy="231366"/>
           </a:xfrm>
           <a:prstGeom prst="rect">
             <a:avLst/>
           </a:prstGeom>
           <a:solidFill>
-            <a:schemeClr val="bg1"/>
+            <a:srgbClr val="FFFF00">
+              <a:alpha val="30000"/>
+            </a:srgbClr>
           </a:solidFill>
+          <a:ln>
+            <a:noFill/>
+          </a:ln>
         </p:spPr>
-        <p:txBody>
-          <a:bodyPr wrap="square" rtlCol="0">
-            <a:spAutoFit/>
-          </a:bodyPr>
-          <a:lstStyle/>
-          <a:p>
-            <a:r>
-              <a:rPr lang="de-DE" sz="1100" dirty="0">
-                <a:latin typeface="Arial" panose="020B0604020202020204" pitchFamily="34" charset="0"/>
-                <a:cs typeface="Arial" panose="020B0604020202020204" pitchFamily="34" charset="0"/>
-              </a:rPr>
-              <a:t>Charge CH6830000001690000944 </a:t>
-            </a:r>
-            <a:r>
-              <a:rPr lang="de-DE" sz="1200" b="1" dirty="0">
-                <a:latin typeface="Arial" panose="020B0604020202020204" pitchFamily="34" charset="0"/>
-                <a:cs typeface="Arial" panose="020B0604020202020204" pitchFamily="34" charset="0"/>
-              </a:rPr>
-              <a:t>Best Insurance</a:t>
-            </a:r>
-            <a:r>
-              <a:rPr lang="de-DE" sz="1100" dirty="0">
-                <a:latin typeface="Arial" panose="020B0604020202020204" pitchFamily="34" charset="0"/>
-                <a:cs typeface="Arial" panose="020B0604020202020204" pitchFamily="34" charset="0"/>
-              </a:rPr>
-              <a:t> 2021 </a:t>
-            </a:r>
-            <a:r>
-              <a:rPr lang="de-DE" sz="1100" dirty="0" err="1">
-                <a:latin typeface="Arial" panose="020B0604020202020204" pitchFamily="34" charset="0"/>
-                <a:cs typeface="Arial" panose="020B0604020202020204" pitchFamily="34" charset="0"/>
-              </a:rPr>
-              <a:t>Contract</a:t>
-            </a:r>
-            <a:r>
-              <a:rPr lang="de-DE" sz="1100" dirty="0">
-                <a:latin typeface="Arial" panose="020B0604020202020204" pitchFamily="34" charset="0"/>
-                <a:cs typeface="Arial" panose="020B0604020202020204" pitchFamily="34" charset="0"/>
-              </a:rPr>
-              <a:t> </a:t>
-            </a:r>
-            <a:r>
-              <a:rPr lang="de-DE" sz="1200" b="1" dirty="0">
-                <a:latin typeface="Arial" panose="020B0604020202020204" pitchFamily="34" charset="0"/>
-                <a:cs typeface="Arial" panose="020B0604020202020204" pitchFamily="34" charset="0"/>
-              </a:rPr>
-              <a:t>987-650</a:t>
-            </a:r>
-            <a:endParaRPr lang="de-CH" sz="1200" b="1" dirty="0">
-              <a:latin typeface="Arial" panose="020B0604020202020204" pitchFamily="34" charset="0"/>
-              <a:cs typeface="Arial" panose="020B0604020202020204" pitchFamily="34" charset="0"/>
+        <p:style>
+          <a:lnRef idx="2">
+            <a:schemeClr val="accent1">
+              <a:shade val="50000"/>
+            </a:schemeClr>
+          </a:lnRef>
+          <a:fillRef idx="1">
+            <a:schemeClr val="accent1"/>
+          </a:fillRef>
+          <a:effectRef idx="0">
+            <a:schemeClr val="accent1"/>
+          </a:effectRef>
+          <a:fontRef idx="minor">
+            <a:schemeClr val="lt1"/>
+          </a:fontRef>
+        </p:style>
+        <p:txBody>
+          <a:bodyPr rtlCol="0" anchor="ctr"/>
+          <a:lstStyle/>
+          <a:p>
+            <a:pPr algn="ctr"/>
+            <a:endParaRPr lang="de-CH">
+              <a:ln>
+                <a:solidFill>
+                  <a:schemeClr val="tx1"/>
+                </a:solidFill>
+              </a:ln>
+              <a:solidFill>
+                <a:schemeClr val="tx1"/>
+              </a:solidFill>
+            </a:endParaRPr>
+          </a:p>
+        </p:txBody>
+      </p:sp>
+      <p:sp>
+        <p:nvSpPr>
+          <p:cNvPr id="16" name="Rettangolo 15">
+            <a:extLst>
+              <a:ext uri="{FF2B5EF4-FFF2-40B4-BE49-F238E27FC236}">
+                <a16:creationId xmlns:a16="http://schemas.microsoft.com/office/drawing/2014/main" id="{8847848F-3B98-B3B0-5DF9-3B1CCAE99649}"/>
+              </a:ext>
+            </a:extLst>
+          </p:cNvPr>
+          <p:cNvSpPr/>
+          <p:nvPr/>
+        </p:nvSpPr>
+        <p:spPr>
+          <a:xfrm>
+            <a:off x="3809673" y="3741921"/>
+            <a:ext cx="1080000" cy="231366"/>
+          </a:xfrm>
+          <a:prstGeom prst="rect">
+            <a:avLst/>
+          </a:prstGeom>
+          <a:solidFill>
+            <a:srgbClr val="FFFF00">
+              <a:alpha val="30000"/>
+            </a:srgbClr>
+          </a:solidFill>
+          <a:ln>
+            <a:noFill/>
+          </a:ln>
+        </p:spPr>
+        <p:style>
+          <a:lnRef idx="2">
+            <a:schemeClr val="accent1">
+              <a:shade val="50000"/>
+            </a:schemeClr>
+          </a:lnRef>
+          <a:fillRef idx="1">
+            <a:schemeClr val="accent1"/>
+          </a:fillRef>
+          <a:effectRef idx="0">
+            <a:schemeClr val="accent1"/>
+          </a:effectRef>
+          <a:fontRef idx="minor">
+            <a:schemeClr val="lt1"/>
+          </a:fontRef>
+        </p:style>
+        <p:txBody>
+          <a:bodyPr rtlCol="0" anchor="ctr"/>
+          <a:lstStyle/>
+          <a:p>
+            <a:pPr algn="ctr"/>
+            <a:endParaRPr lang="de-CH">
+              <a:ln>
+                <a:solidFill>
+                  <a:schemeClr val="tx1"/>
+                </a:solidFill>
+              </a:ln>
+              <a:solidFill>
+                <a:schemeClr val="tx1"/>
+              </a:solidFill>
+            </a:endParaRPr>
+          </a:p>
+        </p:txBody>
+      </p:sp>
+      <p:sp>
+        <p:nvSpPr>
+          <p:cNvPr id="17" name="Rettangolo 16">
+            <a:extLst>
+              <a:ext uri="{FF2B5EF4-FFF2-40B4-BE49-F238E27FC236}">
+                <a16:creationId xmlns:a16="http://schemas.microsoft.com/office/drawing/2014/main" id="{329DDC66-8C33-51AF-EC72-610041A88B90}"/>
+              </a:ext>
+            </a:extLst>
+          </p:cNvPr>
+          <p:cNvSpPr/>
+          <p:nvPr/>
+        </p:nvSpPr>
+        <p:spPr>
+          <a:xfrm>
+            <a:off x="5840832" y="3741921"/>
+            <a:ext cx="648000" cy="231366"/>
+          </a:xfrm>
+          <a:prstGeom prst="rect">
+            <a:avLst/>
+          </a:prstGeom>
+          <a:solidFill>
+            <a:srgbClr val="FFFF00">
+              <a:alpha val="30000"/>
+            </a:srgbClr>
+          </a:solidFill>
+          <a:ln>
+            <a:noFill/>
+          </a:ln>
+        </p:spPr>
+        <p:style>
+          <a:lnRef idx="2">
+            <a:schemeClr val="accent1">
+              <a:shade val="50000"/>
+            </a:schemeClr>
+          </a:lnRef>
+          <a:fillRef idx="1">
+            <a:schemeClr val="accent1"/>
+          </a:fillRef>
+          <a:effectRef idx="0">
+            <a:schemeClr val="accent1"/>
+          </a:effectRef>
+          <a:fontRef idx="minor">
+            <a:schemeClr val="lt1"/>
+          </a:fontRef>
+        </p:style>
+        <p:txBody>
+          <a:bodyPr rtlCol="0" anchor="ctr"/>
+          <a:lstStyle/>
+          <a:p>
+            <a:pPr algn="ctr"/>
+            <a:endParaRPr lang="de-CH">
+              <a:ln>
+                <a:solidFill>
+                  <a:schemeClr val="tx1"/>
+                </a:solidFill>
+              </a:ln>
+              <a:solidFill>
+                <a:schemeClr val="tx1"/>
+              </a:solidFill>
+            </a:endParaRPr>
+          </a:p>
+        </p:txBody>
+      </p:sp>
+      <p:sp>
+        <p:nvSpPr>
+          <p:cNvPr id="18" name="Rettangolo 17">
+            <a:extLst>
+              <a:ext uri="{FF2B5EF4-FFF2-40B4-BE49-F238E27FC236}">
+                <a16:creationId xmlns:a16="http://schemas.microsoft.com/office/drawing/2014/main" id="{E40B7228-1F17-7D97-1B01-0F7DAF1A454C}"/>
+              </a:ext>
+            </a:extLst>
+          </p:cNvPr>
+          <p:cNvSpPr/>
+          <p:nvPr/>
+        </p:nvSpPr>
+        <p:spPr>
+          <a:xfrm>
+            <a:off x="9463551" y="1913120"/>
+            <a:ext cx="432000" cy="231366"/>
+          </a:xfrm>
+          <a:prstGeom prst="rect">
+            <a:avLst/>
+          </a:prstGeom>
+          <a:solidFill>
+            <a:srgbClr val="92D050">
+              <a:alpha val="30000"/>
+            </a:srgbClr>
+          </a:solidFill>
+          <a:ln>
+            <a:noFill/>
+          </a:ln>
+        </p:spPr>
+        <p:style>
+          <a:lnRef idx="2">
+            <a:schemeClr val="accent1">
+              <a:shade val="50000"/>
+            </a:schemeClr>
+          </a:lnRef>
+          <a:fillRef idx="1">
+            <a:schemeClr val="accent1"/>
+          </a:fillRef>
+          <a:effectRef idx="0">
+            <a:schemeClr val="accent1"/>
+          </a:effectRef>
+          <a:fontRef idx="minor">
+            <a:schemeClr val="lt1"/>
+          </a:fontRef>
+        </p:style>
+        <p:txBody>
+          <a:bodyPr rtlCol="0" anchor="ctr"/>
+          <a:lstStyle/>
+          <a:p>
+            <a:pPr algn="ctr"/>
+            <a:endParaRPr lang="de-CH" dirty="0">
+              <a:ln>
+                <a:solidFill>
+                  <a:schemeClr val="tx1"/>
+                </a:solidFill>
+              </a:ln>
+              <a:solidFill>
+                <a:schemeClr val="tx1"/>
+              </a:solidFill>
+              <a:highlight>
+                <a:srgbClr val="FFFF00"/>
+              </a:highlight>
+            </a:endParaRPr>
+          </a:p>
+        </p:txBody>
+      </p:sp>
+      <p:sp>
+        <p:nvSpPr>
+          <p:cNvPr id="20" name="Rettangolo 19">
+            <a:extLst>
+              <a:ext uri="{FF2B5EF4-FFF2-40B4-BE49-F238E27FC236}">
+                <a16:creationId xmlns:a16="http://schemas.microsoft.com/office/drawing/2014/main" id="{4A7231A3-A09E-F040-908E-B5B7B5220A19}"/>
+              </a:ext>
+            </a:extLst>
+          </p:cNvPr>
+          <p:cNvSpPr/>
+          <p:nvPr/>
+        </p:nvSpPr>
+        <p:spPr>
+          <a:xfrm>
+            <a:off x="8059294" y="2533601"/>
+            <a:ext cx="432000" cy="231366"/>
+          </a:xfrm>
+          <a:prstGeom prst="rect">
+            <a:avLst/>
+          </a:prstGeom>
+          <a:solidFill>
+            <a:srgbClr val="92D050">
+              <a:alpha val="30000"/>
+            </a:srgbClr>
+          </a:solidFill>
+          <a:ln>
+            <a:noFill/>
+          </a:ln>
+        </p:spPr>
+        <p:style>
+          <a:lnRef idx="2">
+            <a:schemeClr val="accent1">
+              <a:shade val="50000"/>
+            </a:schemeClr>
+          </a:lnRef>
+          <a:fillRef idx="1">
+            <a:schemeClr val="accent1"/>
+          </a:fillRef>
+          <a:effectRef idx="0">
+            <a:schemeClr val="accent1"/>
+          </a:effectRef>
+          <a:fontRef idx="minor">
+            <a:schemeClr val="lt1"/>
+          </a:fontRef>
+        </p:style>
+        <p:txBody>
+          <a:bodyPr rtlCol="0" anchor="ctr"/>
+          <a:lstStyle/>
+          <a:p>
+            <a:pPr algn="ctr"/>
+            <a:endParaRPr lang="de-CH" dirty="0">
+              <a:ln>
+                <a:solidFill>
+                  <a:schemeClr val="tx1"/>
+                </a:solidFill>
+              </a:ln>
+              <a:solidFill>
+                <a:schemeClr val="tx1"/>
+              </a:solidFill>
+              <a:highlight>
+                <a:srgbClr val="FFFF00"/>
+              </a:highlight>
+            </a:endParaRPr>
+          </a:p>
+        </p:txBody>
+      </p:sp>
+      <p:sp>
+        <p:nvSpPr>
+          <p:cNvPr id="21" name="Rettangolo 20">
+            <a:extLst>
+              <a:ext uri="{FF2B5EF4-FFF2-40B4-BE49-F238E27FC236}">
+                <a16:creationId xmlns:a16="http://schemas.microsoft.com/office/drawing/2014/main" id="{D7F4507C-3DE3-9BB1-DA11-2A40FBD982A3}"/>
+              </a:ext>
+            </a:extLst>
+          </p:cNvPr>
+          <p:cNvSpPr/>
+          <p:nvPr/>
+        </p:nvSpPr>
+        <p:spPr>
+          <a:xfrm>
+            <a:off x="8059294" y="3135088"/>
+            <a:ext cx="432000" cy="231366"/>
+          </a:xfrm>
+          <a:prstGeom prst="rect">
+            <a:avLst/>
+          </a:prstGeom>
+          <a:solidFill>
+            <a:srgbClr val="92D050">
+              <a:alpha val="30000"/>
+            </a:srgbClr>
+          </a:solidFill>
+          <a:ln>
+            <a:noFill/>
+          </a:ln>
+        </p:spPr>
+        <p:style>
+          <a:lnRef idx="2">
+            <a:schemeClr val="accent1">
+              <a:shade val="50000"/>
+            </a:schemeClr>
+          </a:lnRef>
+          <a:fillRef idx="1">
+            <a:schemeClr val="accent1"/>
+          </a:fillRef>
+          <a:effectRef idx="0">
+            <a:schemeClr val="accent1"/>
+          </a:effectRef>
+          <a:fontRef idx="minor">
+            <a:schemeClr val="lt1"/>
+          </a:fontRef>
+        </p:style>
+        <p:txBody>
+          <a:bodyPr rtlCol="0" anchor="ctr"/>
+          <a:lstStyle/>
+          <a:p>
+            <a:pPr algn="ctr"/>
+            <a:endParaRPr lang="de-CH" dirty="0">
+              <a:ln>
+                <a:solidFill>
+                  <a:schemeClr val="tx1"/>
+                </a:solidFill>
+              </a:ln>
+              <a:solidFill>
+                <a:schemeClr val="tx1"/>
+              </a:solidFill>
+              <a:highlight>
+                <a:srgbClr val="FFFF00"/>
+              </a:highlight>
+            </a:endParaRPr>
+          </a:p>
+        </p:txBody>
+      </p:sp>
+      <p:sp>
+        <p:nvSpPr>
+          <p:cNvPr id="22" name="Rettangolo 21">
+            <a:extLst>
+              <a:ext uri="{FF2B5EF4-FFF2-40B4-BE49-F238E27FC236}">
+                <a16:creationId xmlns:a16="http://schemas.microsoft.com/office/drawing/2014/main" id="{54F837BD-2613-5045-612F-58AA61585F5A}"/>
+              </a:ext>
+            </a:extLst>
+          </p:cNvPr>
+          <p:cNvSpPr/>
+          <p:nvPr/>
+        </p:nvSpPr>
+        <p:spPr>
+          <a:xfrm>
+            <a:off x="8059294" y="3437117"/>
+            <a:ext cx="432000" cy="231366"/>
+          </a:xfrm>
+          <a:prstGeom prst="rect">
+            <a:avLst/>
+          </a:prstGeom>
+          <a:solidFill>
+            <a:srgbClr val="92D050">
+              <a:alpha val="30000"/>
+            </a:srgbClr>
+          </a:solidFill>
+          <a:ln>
+            <a:noFill/>
+          </a:ln>
+        </p:spPr>
+        <p:style>
+          <a:lnRef idx="2">
+            <a:schemeClr val="accent1">
+              <a:shade val="50000"/>
+            </a:schemeClr>
+          </a:lnRef>
+          <a:fillRef idx="1">
+            <a:schemeClr val="accent1"/>
+          </a:fillRef>
+          <a:effectRef idx="0">
+            <a:schemeClr val="accent1"/>
+          </a:effectRef>
+          <a:fontRef idx="minor">
+            <a:schemeClr val="lt1"/>
+          </a:fontRef>
+        </p:style>
+        <p:txBody>
+          <a:bodyPr rtlCol="0" anchor="ctr"/>
+          <a:lstStyle/>
+          <a:p>
+            <a:pPr algn="ctr"/>
+            <a:endParaRPr lang="de-CH" dirty="0">
+              <a:ln>
+                <a:solidFill>
+                  <a:schemeClr val="tx1"/>
+                </a:solidFill>
+              </a:ln>
+              <a:solidFill>
+                <a:schemeClr val="tx1"/>
+              </a:solidFill>
+              <a:highlight>
+                <a:srgbClr val="FFFF00"/>
+              </a:highlight>
+            </a:endParaRPr>
+          </a:p>
+        </p:txBody>
+      </p:sp>
+      <p:sp>
+        <p:nvSpPr>
+          <p:cNvPr id="23" name="Rettangolo 22">
+            <a:extLst>
+              <a:ext uri="{FF2B5EF4-FFF2-40B4-BE49-F238E27FC236}">
+                <a16:creationId xmlns:a16="http://schemas.microsoft.com/office/drawing/2014/main" id="{E1D92E01-DAEA-36AB-9838-709635D7B71A}"/>
+              </a:ext>
+            </a:extLst>
+          </p:cNvPr>
+          <p:cNvSpPr/>
+          <p:nvPr/>
+        </p:nvSpPr>
+        <p:spPr>
+          <a:xfrm>
+            <a:off x="8059294" y="3750032"/>
+            <a:ext cx="432000" cy="231366"/>
+          </a:xfrm>
+          <a:prstGeom prst="rect">
+            <a:avLst/>
+          </a:prstGeom>
+          <a:solidFill>
+            <a:srgbClr val="92D050">
+              <a:alpha val="30000"/>
+            </a:srgbClr>
+          </a:solidFill>
+          <a:ln>
+            <a:noFill/>
+          </a:ln>
+        </p:spPr>
+        <p:style>
+          <a:lnRef idx="2">
+            <a:schemeClr val="accent1">
+              <a:shade val="50000"/>
+            </a:schemeClr>
+          </a:lnRef>
+          <a:fillRef idx="1">
+            <a:schemeClr val="accent1"/>
+          </a:fillRef>
+          <a:effectRef idx="0">
+            <a:schemeClr val="accent1"/>
+          </a:effectRef>
+          <a:fontRef idx="minor">
+            <a:schemeClr val="lt1"/>
+          </a:fontRef>
+        </p:style>
+        <p:txBody>
+          <a:bodyPr rtlCol="0" anchor="ctr"/>
+          <a:lstStyle/>
+          <a:p>
+            <a:pPr algn="ctr"/>
+            <a:endParaRPr lang="de-CH" dirty="0">
+              <a:ln>
+                <a:solidFill>
+                  <a:schemeClr val="tx1"/>
+                </a:solidFill>
+              </a:ln>
+              <a:solidFill>
+                <a:schemeClr val="tx1"/>
+              </a:solidFill>
+              <a:highlight>
+                <a:srgbClr val="FFFF00"/>
+              </a:highlight>
+            </a:endParaRPr>
+          </a:p>
+        </p:txBody>
+      </p:sp>
+      <p:sp>
+        <p:nvSpPr>
+          <p:cNvPr id="24" name="Rettangolo 23">
+            <a:extLst>
+              <a:ext uri="{FF2B5EF4-FFF2-40B4-BE49-F238E27FC236}">
+                <a16:creationId xmlns:a16="http://schemas.microsoft.com/office/drawing/2014/main" id="{4E061106-42AD-512B-827A-4F7756E7B29B}"/>
+              </a:ext>
+            </a:extLst>
+          </p:cNvPr>
+          <p:cNvSpPr/>
+          <p:nvPr/>
+        </p:nvSpPr>
+        <p:spPr>
+          <a:xfrm>
+            <a:off x="9463551" y="2833734"/>
+            <a:ext cx="432000" cy="231366"/>
+          </a:xfrm>
+          <a:prstGeom prst="rect">
+            <a:avLst/>
+          </a:prstGeom>
+          <a:solidFill>
+            <a:srgbClr val="92D050">
+              <a:alpha val="30000"/>
+            </a:srgbClr>
+          </a:solidFill>
+          <a:ln>
+            <a:noFill/>
+          </a:ln>
+        </p:spPr>
+        <p:style>
+          <a:lnRef idx="2">
+            <a:schemeClr val="accent1">
+              <a:shade val="50000"/>
+            </a:schemeClr>
+          </a:lnRef>
+          <a:fillRef idx="1">
+            <a:schemeClr val="accent1"/>
+          </a:fillRef>
+          <a:effectRef idx="0">
+            <a:schemeClr val="accent1"/>
+          </a:effectRef>
+          <a:fontRef idx="minor">
+            <a:schemeClr val="lt1"/>
+          </a:fontRef>
+        </p:style>
+        <p:txBody>
+          <a:bodyPr rtlCol="0" anchor="ctr"/>
+          <a:lstStyle/>
+          <a:p>
+            <a:pPr algn="ctr"/>
+            <a:endParaRPr lang="de-CH" dirty="0">
+              <a:ln>
+                <a:solidFill>
+                  <a:schemeClr val="tx1"/>
+                </a:solidFill>
+              </a:ln>
+              <a:solidFill>
+                <a:schemeClr val="tx1"/>
+              </a:solidFill>
+              <a:highlight>
+                <a:srgbClr val="FFFF00"/>
+              </a:highlight>
             </a:endParaRPr>
           </a:p>
         </p:txBody>
@@ -4149,7 +4587,7 @@
     </p:spTree>
     <p:extLst>
       <p:ext uri="{BB962C8B-B14F-4D97-AF65-F5344CB8AC3E}">
-        <p14:creationId xmlns:p14="http://schemas.microsoft.com/office/powerpoint/2010/main" val="3864314638"/>
+        <p14:creationId xmlns:p14="http://schemas.microsoft.com/office/powerpoint/2010/main" val="1324342689"/>
       </p:ext>
     </p:extLst>
   </p:cSld>
@@ -4178,10 +4616,10 @@
       </p:grpSpPr>
       <p:pic>
         <p:nvPicPr>
-          <p:cNvPr id="8" name="Immagine 7">
-            <a:extLst>
-              <a:ext uri="{FF2B5EF4-FFF2-40B4-BE49-F238E27FC236}">
-                <a16:creationId xmlns:a16="http://schemas.microsoft.com/office/drawing/2014/main" id="{F1374FC1-6786-D8DD-F122-F5CB8FEE30AC}"/>
+          <p:cNvPr id="12" name="Immagine 11">
+            <a:extLst>
+              <a:ext uri="{FF2B5EF4-FFF2-40B4-BE49-F238E27FC236}">
+                <a16:creationId xmlns:a16="http://schemas.microsoft.com/office/drawing/2014/main" id="{7427017E-5454-6378-A4C2-937EF0D97314}"/>
               </a:ext>
             </a:extLst>
           </p:cNvPr>
@@ -4204,8 +4642,8 @@
         </p:blipFill>
         <p:spPr>
           <a:xfrm>
-            <a:off x="0" y="987778"/>
-            <a:ext cx="12192000" cy="4882444"/>
+            <a:off x="0" y="1072444"/>
+            <a:ext cx="12192000" cy="4713112"/>
           </a:xfrm>
           <a:prstGeom prst="rect">
             <a:avLst/>
@@ -4214,10 +4652,10 @@
       </p:pic>
       <p:sp>
         <p:nvSpPr>
-          <p:cNvPr id="4" name="CasellaDiTesto 3">
-            <a:extLst>
-              <a:ext uri="{FF2B5EF4-FFF2-40B4-BE49-F238E27FC236}">
-                <a16:creationId xmlns:a16="http://schemas.microsoft.com/office/drawing/2014/main" id="{C595C068-3A71-DF52-C755-419161569562}"/>
+          <p:cNvPr id="2" name="CasellaDiTesto 1">
+            <a:extLst>
+              <a:ext uri="{FF2B5EF4-FFF2-40B4-BE49-F238E27FC236}">
+                <a16:creationId xmlns:a16="http://schemas.microsoft.com/office/drawing/2014/main" id="{4517AAB0-A1AB-E571-60FB-6E65B7DD0AF6}"/>
               </a:ext>
             </a:extLst>
           </p:cNvPr>
@@ -4226,8 +4664,8 @@
         </p:nvSpPr>
         <p:spPr>
           <a:xfrm>
-            <a:off x="4828823" y="2109065"/>
-            <a:ext cx="640934" cy="1631216"/>
+            <a:off x="8050996" y="1880461"/>
+            <a:ext cx="640934" cy="1938992"/>
           </a:xfrm>
           <a:prstGeom prst="rect">
             <a:avLst/>
@@ -4239,6 +4677,132 @@
             <a:spAutoFit/>
           </a:bodyPr>
           <a:lstStyle/>
+          <a:p>
+            <a:endParaRPr lang="de-CH" sz="2000" dirty="0">
+              <a:solidFill>
+                <a:srgbClr val="FF0000"/>
+              </a:solidFill>
+              <a:effectLst/>
+              <a:latin typeface="Calibri" panose="020F0502020204030204" pitchFamily="34" charset="0"/>
+              <a:ea typeface="DengXian" panose="02010600030101010101" pitchFamily="2" charset="-122"/>
+              <a:cs typeface="Times New Roman" panose="02020603050405020304" pitchFamily="18" charset="0"/>
+              <a:sym typeface="Wingdings" panose="05000000000000000000" pitchFamily="2" charset="2"/>
+            </a:endParaRPr>
+          </a:p>
+          <a:p>
+            <a:endParaRPr lang="de-CH" sz="2000" dirty="0">
+              <a:solidFill>
+                <a:srgbClr val="FF0000"/>
+              </a:solidFill>
+              <a:effectLst/>
+              <a:latin typeface="Calibri" panose="020F0502020204030204" pitchFamily="34" charset="0"/>
+              <a:ea typeface="DengXian" panose="02010600030101010101" pitchFamily="2" charset="-122"/>
+              <a:cs typeface="Times New Roman" panose="02020603050405020304" pitchFamily="18" charset="0"/>
+              <a:sym typeface="Wingdings" panose="05000000000000000000" pitchFamily="2" charset="2"/>
+            </a:endParaRPr>
+          </a:p>
+          <a:p>
+            <a:r>
+              <a:rPr lang="de-CH" sz="2000" dirty="0">
+                <a:solidFill>
+                  <a:srgbClr val="FF0000"/>
+                </a:solidFill>
+                <a:effectLst/>
+                <a:latin typeface="Calibri" panose="020F0502020204030204" pitchFamily="34" charset="0"/>
+                <a:ea typeface="DengXian" panose="02010600030101010101" pitchFamily="2" charset="-122"/>
+                <a:cs typeface="Times New Roman" panose="02020603050405020304" pitchFamily="18" charset="0"/>
+                <a:sym typeface="Wingdings" panose="05000000000000000000" pitchFamily="2" charset="2"/>
+              </a:rPr>
+              <a:t></a:t>
+            </a:r>
+          </a:p>
+          <a:p>
+            <a:r>
+              <a:rPr lang="de-CH" sz="2000" dirty="0">
+                <a:solidFill>
+                  <a:srgbClr val="FF0000"/>
+                </a:solidFill>
+                <a:effectLst/>
+                <a:latin typeface="Calibri" panose="020F0502020204030204" pitchFamily="34" charset="0"/>
+                <a:ea typeface="DengXian" panose="02010600030101010101" pitchFamily="2" charset="-122"/>
+                <a:cs typeface="Times New Roman" panose="02020603050405020304" pitchFamily="18" charset="0"/>
+                <a:sym typeface="Wingdings" panose="05000000000000000000" pitchFamily="2" charset="2"/>
+              </a:rPr>
+              <a:t></a:t>
+            </a:r>
+          </a:p>
+          <a:p>
+            <a:r>
+              <a:rPr lang="de-CH" sz="2000" dirty="0">
+                <a:solidFill>
+                  <a:srgbClr val="FF0000"/>
+                </a:solidFill>
+                <a:effectLst/>
+                <a:latin typeface="Calibri" panose="020F0502020204030204" pitchFamily="34" charset="0"/>
+                <a:ea typeface="DengXian" panose="02010600030101010101" pitchFamily="2" charset="-122"/>
+                <a:cs typeface="Times New Roman" panose="02020603050405020304" pitchFamily="18" charset="0"/>
+                <a:sym typeface="Wingdings" panose="05000000000000000000" pitchFamily="2" charset="2"/>
+              </a:rPr>
+              <a:t></a:t>
+            </a:r>
+          </a:p>
+          <a:p>
+            <a:r>
+              <a:rPr lang="de-CH" sz="2000" dirty="0">
+                <a:solidFill>
+                  <a:srgbClr val="FF0000"/>
+                </a:solidFill>
+                <a:effectLst/>
+                <a:latin typeface="Calibri" panose="020F0502020204030204" pitchFamily="34" charset="0"/>
+                <a:ea typeface="DengXian" panose="02010600030101010101" pitchFamily="2" charset="-122"/>
+                <a:cs typeface="Times New Roman" panose="02020603050405020304" pitchFamily="18" charset="0"/>
+                <a:sym typeface="Wingdings" panose="05000000000000000000" pitchFamily="2" charset="2"/>
+              </a:rPr>
+              <a:t></a:t>
+            </a:r>
+            <a:endParaRPr lang="de-CH" sz="2000" dirty="0"/>
+          </a:p>
+        </p:txBody>
+      </p:sp>
+      <p:sp>
+        <p:nvSpPr>
+          <p:cNvPr id="3" name="CasellaDiTesto 2">
+            <a:extLst>
+              <a:ext uri="{FF2B5EF4-FFF2-40B4-BE49-F238E27FC236}">
+                <a16:creationId xmlns:a16="http://schemas.microsoft.com/office/drawing/2014/main" id="{9CA4282D-5684-2577-E923-02A0EC1DD222}"/>
+              </a:ext>
+            </a:extLst>
+          </p:cNvPr>
+          <p:cNvSpPr txBox="1"/>
+          <p:nvPr/>
+        </p:nvSpPr>
+        <p:spPr>
+          <a:xfrm>
+            <a:off x="8879674" y="1881187"/>
+            <a:ext cx="640934" cy="2246769"/>
+          </a:xfrm>
+          <a:prstGeom prst="rect">
+            <a:avLst/>
+          </a:prstGeom>
+          <a:noFill/>
+        </p:spPr>
+        <p:txBody>
+          <a:bodyPr wrap="square">
+            <a:spAutoFit/>
+          </a:bodyPr>
+          <a:lstStyle/>
+          <a:p>
+            <a:endParaRPr lang="de-CH" sz="2000" dirty="0">
+              <a:solidFill>
+                <a:srgbClr val="FF0000"/>
+              </a:solidFill>
+              <a:effectLst/>
+              <a:latin typeface="Calibri" panose="020F0502020204030204" pitchFamily="34" charset="0"/>
+              <a:ea typeface="DengXian" panose="02010600030101010101" pitchFamily="2" charset="-122"/>
+              <a:cs typeface="Times New Roman" panose="02020603050405020304" pitchFamily="18" charset="0"/>
+              <a:sym typeface="Wingdings" panose="05000000000000000000" pitchFamily="2" charset="2"/>
+            </a:endParaRPr>
+          </a:p>
           <a:p>
             <a:r>
               <a:rPr lang="de-CH" sz="2000" dirty="0">
@@ -4255,64 +4819,385 @@
             </a:r>
           </a:p>
           <a:p>
-            <a:r>
-              <a:rPr lang="de-CH" sz="2000" dirty="0">
+            <a:endParaRPr lang="de-CH" sz="2000" dirty="0">
+              <a:solidFill>
+                <a:srgbClr val="FF0000"/>
+              </a:solidFill>
+              <a:effectLst/>
+              <a:latin typeface="Calibri" panose="020F0502020204030204" pitchFamily="34" charset="0"/>
+              <a:ea typeface="DengXian" panose="02010600030101010101" pitchFamily="2" charset="-122"/>
+              <a:cs typeface="Times New Roman" panose="02020603050405020304" pitchFamily="18" charset="0"/>
+              <a:sym typeface="Wingdings" panose="05000000000000000000" pitchFamily="2" charset="2"/>
+            </a:endParaRPr>
+          </a:p>
+          <a:p>
+            <a:endParaRPr lang="de-CH" sz="2000" dirty="0">
+              <a:solidFill>
+                <a:srgbClr val="FF0000"/>
+              </a:solidFill>
+              <a:effectLst/>
+              <a:latin typeface="Calibri" panose="020F0502020204030204" pitchFamily="34" charset="0"/>
+              <a:ea typeface="DengXian" panose="02010600030101010101" pitchFamily="2" charset="-122"/>
+              <a:cs typeface="Times New Roman" panose="02020603050405020304" pitchFamily="18" charset="0"/>
+              <a:sym typeface="Wingdings" panose="05000000000000000000" pitchFamily="2" charset="2"/>
+            </a:endParaRPr>
+          </a:p>
+          <a:p>
+            <a:endParaRPr lang="de-CH" sz="2000" dirty="0">
+              <a:solidFill>
+                <a:srgbClr val="FF0000"/>
+              </a:solidFill>
+              <a:effectLst/>
+              <a:latin typeface="Calibri" panose="020F0502020204030204" pitchFamily="34" charset="0"/>
+              <a:ea typeface="DengXian" panose="02010600030101010101" pitchFamily="2" charset="-122"/>
+              <a:cs typeface="Times New Roman" panose="02020603050405020304" pitchFamily="18" charset="0"/>
+              <a:sym typeface="Wingdings" panose="05000000000000000000" pitchFamily="2" charset="2"/>
+            </a:endParaRPr>
+          </a:p>
+          <a:p>
+            <a:endParaRPr lang="de-CH" sz="2000" dirty="0">
+              <a:solidFill>
+                <a:srgbClr val="FF0000"/>
+              </a:solidFill>
+              <a:effectLst/>
+              <a:latin typeface="Calibri" panose="020F0502020204030204" pitchFamily="34" charset="0"/>
+              <a:ea typeface="DengXian" panose="02010600030101010101" pitchFamily="2" charset="-122"/>
+              <a:cs typeface="Times New Roman" panose="02020603050405020304" pitchFamily="18" charset="0"/>
+              <a:sym typeface="Wingdings" panose="05000000000000000000" pitchFamily="2" charset="2"/>
+            </a:endParaRPr>
+          </a:p>
+          <a:p>
+            <a:endParaRPr lang="de-CH" sz="2000" dirty="0"/>
+          </a:p>
+        </p:txBody>
+      </p:sp>
+      <p:sp>
+        <p:nvSpPr>
+          <p:cNvPr id="5" name="Rettangolo 4">
+            <a:extLst>
+              <a:ext uri="{FF2B5EF4-FFF2-40B4-BE49-F238E27FC236}">
+                <a16:creationId xmlns:a16="http://schemas.microsoft.com/office/drawing/2014/main" id="{9EED3135-19D6-2596-87E9-ED2FE84206D0}"/>
+              </a:ext>
+            </a:extLst>
+          </p:cNvPr>
+          <p:cNvSpPr/>
+          <p:nvPr/>
+        </p:nvSpPr>
+        <p:spPr>
+          <a:xfrm>
+            <a:off x="8537645" y="2267483"/>
+            <a:ext cx="432000" cy="231366"/>
+          </a:xfrm>
+          <a:prstGeom prst="rect">
+            <a:avLst/>
+          </a:prstGeom>
+          <a:solidFill>
+            <a:srgbClr val="92D050">
+              <a:alpha val="30000"/>
+            </a:srgbClr>
+          </a:solidFill>
+          <a:ln>
+            <a:noFill/>
+          </a:ln>
+        </p:spPr>
+        <p:style>
+          <a:lnRef idx="2">
+            <a:schemeClr val="accent1">
+              <a:shade val="50000"/>
+            </a:schemeClr>
+          </a:lnRef>
+          <a:fillRef idx="1">
+            <a:schemeClr val="accent1"/>
+          </a:fillRef>
+          <a:effectRef idx="0">
+            <a:schemeClr val="accent1"/>
+          </a:effectRef>
+          <a:fontRef idx="minor">
+            <a:schemeClr val="lt1"/>
+          </a:fontRef>
+        </p:style>
+        <p:txBody>
+          <a:bodyPr rtlCol="0" anchor="ctr"/>
+          <a:lstStyle/>
+          <a:p>
+            <a:pPr algn="ctr"/>
+            <a:endParaRPr lang="de-CH" dirty="0">
+              <a:ln>
                 <a:solidFill>
-                  <a:srgbClr val="FF0000"/>
+                  <a:schemeClr val="tx1"/>
                 </a:solidFill>
-                <a:effectLst/>
-                <a:latin typeface="Calibri" panose="020F0502020204030204" pitchFamily="34" charset="0"/>
-                <a:ea typeface="DengXian" panose="02010600030101010101" pitchFamily="2" charset="-122"/>
-                <a:cs typeface="Times New Roman" panose="02020603050405020304" pitchFamily="18" charset="0"/>
-                <a:sym typeface="Wingdings" panose="05000000000000000000" pitchFamily="2" charset="2"/>
-              </a:rPr>
-              <a:t></a:t>
-            </a:r>
-          </a:p>
-          <a:p>
-            <a:r>
-              <a:rPr lang="de-CH" sz="2000" dirty="0">
+              </a:ln>
+              <a:solidFill>
+                <a:schemeClr val="tx1"/>
+              </a:solidFill>
+              <a:highlight>
+                <a:srgbClr val="FFFF00"/>
+              </a:highlight>
+            </a:endParaRPr>
+          </a:p>
+        </p:txBody>
+      </p:sp>
+      <p:sp>
+        <p:nvSpPr>
+          <p:cNvPr id="6" name="Rettangolo 5">
+            <a:extLst>
+              <a:ext uri="{FF2B5EF4-FFF2-40B4-BE49-F238E27FC236}">
+                <a16:creationId xmlns:a16="http://schemas.microsoft.com/office/drawing/2014/main" id="{63A60816-0D2A-C98E-D296-22FFE162C22A}"/>
+              </a:ext>
+            </a:extLst>
+          </p:cNvPr>
+          <p:cNvSpPr/>
+          <p:nvPr/>
+        </p:nvSpPr>
+        <p:spPr>
+          <a:xfrm>
+            <a:off x="6805787" y="2574941"/>
+            <a:ext cx="540000" cy="231366"/>
+          </a:xfrm>
+          <a:prstGeom prst="rect">
+            <a:avLst/>
+          </a:prstGeom>
+          <a:solidFill>
+            <a:srgbClr val="92D050">
+              <a:alpha val="30000"/>
+            </a:srgbClr>
+          </a:solidFill>
+          <a:ln>
+            <a:noFill/>
+          </a:ln>
+        </p:spPr>
+        <p:style>
+          <a:lnRef idx="2">
+            <a:schemeClr val="accent1">
+              <a:shade val="50000"/>
+            </a:schemeClr>
+          </a:lnRef>
+          <a:fillRef idx="1">
+            <a:schemeClr val="accent1"/>
+          </a:fillRef>
+          <a:effectRef idx="0">
+            <a:schemeClr val="accent1"/>
+          </a:effectRef>
+          <a:fontRef idx="minor">
+            <a:schemeClr val="lt1"/>
+          </a:fontRef>
+        </p:style>
+        <p:txBody>
+          <a:bodyPr rtlCol="0" anchor="ctr"/>
+          <a:lstStyle/>
+          <a:p>
+            <a:pPr algn="ctr"/>
+            <a:endParaRPr lang="de-CH" dirty="0">
+              <a:ln>
                 <a:solidFill>
-                  <a:srgbClr val="FF0000"/>
+                  <a:schemeClr val="tx1"/>
                 </a:solidFill>
-                <a:effectLst/>
-                <a:latin typeface="Calibri" panose="020F0502020204030204" pitchFamily="34" charset="0"/>
-                <a:ea typeface="DengXian" panose="02010600030101010101" pitchFamily="2" charset="-122"/>
-                <a:cs typeface="Times New Roman" panose="02020603050405020304" pitchFamily="18" charset="0"/>
-                <a:sym typeface="Wingdings" panose="05000000000000000000" pitchFamily="2" charset="2"/>
-              </a:rPr>
-              <a:t></a:t>
-            </a:r>
-          </a:p>
-          <a:p>
-            <a:r>
-              <a:rPr lang="de-CH" sz="2000" dirty="0">
+              </a:ln>
+              <a:solidFill>
+                <a:schemeClr val="tx1"/>
+              </a:solidFill>
+              <a:highlight>
+                <a:srgbClr val="FFFF00"/>
+              </a:highlight>
+            </a:endParaRPr>
+          </a:p>
+        </p:txBody>
+      </p:sp>
+      <p:sp>
+        <p:nvSpPr>
+          <p:cNvPr id="7" name="Rettangolo 6">
+            <a:extLst>
+              <a:ext uri="{FF2B5EF4-FFF2-40B4-BE49-F238E27FC236}">
+                <a16:creationId xmlns:a16="http://schemas.microsoft.com/office/drawing/2014/main" id="{0D29438E-6A34-5B3D-2715-58F60A37192F}"/>
+              </a:ext>
+            </a:extLst>
+          </p:cNvPr>
+          <p:cNvSpPr/>
+          <p:nvPr/>
+        </p:nvSpPr>
+        <p:spPr>
+          <a:xfrm>
+            <a:off x="6805787" y="2882401"/>
+            <a:ext cx="540000" cy="231366"/>
+          </a:xfrm>
+          <a:prstGeom prst="rect">
+            <a:avLst/>
+          </a:prstGeom>
+          <a:solidFill>
+            <a:srgbClr val="92D050">
+              <a:alpha val="30000"/>
+            </a:srgbClr>
+          </a:solidFill>
+          <a:ln>
+            <a:noFill/>
+          </a:ln>
+        </p:spPr>
+        <p:style>
+          <a:lnRef idx="2">
+            <a:schemeClr val="accent1">
+              <a:shade val="50000"/>
+            </a:schemeClr>
+          </a:lnRef>
+          <a:fillRef idx="1">
+            <a:schemeClr val="accent1"/>
+          </a:fillRef>
+          <a:effectRef idx="0">
+            <a:schemeClr val="accent1"/>
+          </a:effectRef>
+          <a:fontRef idx="minor">
+            <a:schemeClr val="lt1"/>
+          </a:fontRef>
+        </p:style>
+        <p:txBody>
+          <a:bodyPr rtlCol="0" anchor="ctr"/>
+          <a:lstStyle/>
+          <a:p>
+            <a:pPr algn="ctr"/>
+            <a:endParaRPr lang="de-CH" dirty="0">
+              <a:ln>
                 <a:solidFill>
-                  <a:srgbClr val="FF0000"/>
+                  <a:schemeClr val="tx1"/>
                 </a:solidFill>
-                <a:effectLst/>
-                <a:latin typeface="Calibri" panose="020F0502020204030204" pitchFamily="34" charset="0"/>
-                <a:ea typeface="DengXian" panose="02010600030101010101" pitchFamily="2" charset="-122"/>
-                <a:cs typeface="Times New Roman" panose="02020603050405020304" pitchFamily="18" charset="0"/>
-                <a:sym typeface="Wingdings" panose="05000000000000000000" pitchFamily="2" charset="2"/>
-              </a:rPr>
-              <a:t></a:t>
-            </a:r>
-          </a:p>
-          <a:p>
-            <a:r>
-              <a:rPr lang="de-CH" sz="2000" dirty="0">
+              </a:ln>
+              <a:solidFill>
+                <a:schemeClr val="tx1"/>
+              </a:solidFill>
+              <a:highlight>
+                <a:srgbClr val="FFFF00"/>
+              </a:highlight>
+            </a:endParaRPr>
+          </a:p>
+        </p:txBody>
+      </p:sp>
+      <p:sp>
+        <p:nvSpPr>
+          <p:cNvPr id="9" name="Rettangolo 8">
+            <a:extLst>
+              <a:ext uri="{FF2B5EF4-FFF2-40B4-BE49-F238E27FC236}">
+                <a16:creationId xmlns:a16="http://schemas.microsoft.com/office/drawing/2014/main" id="{4CF0D81E-59DE-EE75-87EA-136C3267CC87}"/>
+              </a:ext>
+            </a:extLst>
+          </p:cNvPr>
+          <p:cNvSpPr/>
+          <p:nvPr/>
+        </p:nvSpPr>
+        <p:spPr>
+          <a:xfrm>
+            <a:off x="6805787" y="3189861"/>
+            <a:ext cx="1260000" cy="231366"/>
+          </a:xfrm>
+          <a:prstGeom prst="rect">
+            <a:avLst/>
+          </a:prstGeom>
+          <a:solidFill>
+            <a:srgbClr val="92D050">
+              <a:alpha val="30000"/>
+            </a:srgbClr>
+          </a:solidFill>
+          <a:ln>
+            <a:noFill/>
+          </a:ln>
+        </p:spPr>
+        <p:style>
+          <a:lnRef idx="2">
+            <a:schemeClr val="accent1">
+              <a:shade val="50000"/>
+            </a:schemeClr>
+          </a:lnRef>
+          <a:fillRef idx="1">
+            <a:schemeClr val="accent1"/>
+          </a:fillRef>
+          <a:effectRef idx="0">
+            <a:schemeClr val="accent1"/>
+          </a:effectRef>
+          <a:fontRef idx="minor">
+            <a:schemeClr val="lt1"/>
+          </a:fontRef>
+        </p:style>
+        <p:txBody>
+          <a:bodyPr rtlCol="0" anchor="ctr"/>
+          <a:lstStyle/>
+          <a:p>
+            <a:pPr algn="ctr"/>
+            <a:endParaRPr lang="de-CH" dirty="0">
+              <a:ln>
                 <a:solidFill>
-                  <a:srgbClr val="FF0000"/>
+                  <a:schemeClr val="tx1"/>
                 </a:solidFill>
-                <a:effectLst/>
-                <a:latin typeface="Calibri" panose="020F0502020204030204" pitchFamily="34" charset="0"/>
-                <a:ea typeface="DengXian" panose="02010600030101010101" pitchFamily="2" charset="-122"/>
-                <a:cs typeface="Times New Roman" panose="02020603050405020304" pitchFamily="18" charset="0"/>
-                <a:sym typeface="Wingdings" panose="05000000000000000000" pitchFamily="2" charset="2"/>
-              </a:rPr>
-              <a:t></a:t>
-            </a:r>
+              </a:ln>
+              <a:solidFill>
+                <a:schemeClr val="tx1"/>
+              </a:solidFill>
+              <a:highlight>
+                <a:srgbClr val="FFFF00"/>
+              </a:highlight>
+            </a:endParaRPr>
+          </a:p>
+        </p:txBody>
+      </p:sp>
+      <p:sp>
+        <p:nvSpPr>
+          <p:cNvPr id="10" name="Rettangolo 9">
+            <a:extLst>
+              <a:ext uri="{FF2B5EF4-FFF2-40B4-BE49-F238E27FC236}">
+                <a16:creationId xmlns:a16="http://schemas.microsoft.com/office/drawing/2014/main" id="{ECC6A85D-8504-BF92-3983-249810CF6370}"/>
+              </a:ext>
+            </a:extLst>
+          </p:cNvPr>
+          <p:cNvSpPr/>
+          <p:nvPr/>
+        </p:nvSpPr>
+        <p:spPr>
+          <a:xfrm>
+            <a:off x="6805787" y="3482375"/>
+            <a:ext cx="1260000" cy="231366"/>
+          </a:xfrm>
+          <a:prstGeom prst="rect">
+            <a:avLst/>
+          </a:prstGeom>
+          <a:solidFill>
+            <a:srgbClr val="92D050">
+              <a:alpha val="30000"/>
+            </a:srgbClr>
+          </a:solidFill>
+          <a:ln>
+            <a:noFill/>
+          </a:ln>
+        </p:spPr>
+        <p:style>
+          <a:lnRef idx="2">
+            <a:schemeClr val="accent1">
+              <a:shade val="50000"/>
+            </a:schemeClr>
+          </a:lnRef>
+          <a:fillRef idx="1">
+            <a:schemeClr val="accent1"/>
+          </a:fillRef>
+          <a:effectRef idx="0">
+            <a:schemeClr val="accent1"/>
+          </a:effectRef>
+          <a:fontRef idx="minor">
+            <a:schemeClr val="lt1"/>
+          </a:fontRef>
+        </p:style>
+        <p:txBody>
+          <a:bodyPr rtlCol="0" anchor="ctr"/>
+          <a:lstStyle/>
+          <a:p>
+            <a:pPr algn="ctr"/>
+            <a:endParaRPr lang="de-CH" dirty="0">
+              <a:ln>
+                <a:solidFill>
+                  <a:schemeClr val="tx1"/>
+                </a:solidFill>
+              </a:ln>
+              <a:solidFill>
+                <a:schemeClr val="tx1"/>
+              </a:solidFill>
+              <a:highlight>
+                <a:srgbClr val="FFFF00"/>
+              </a:highlight>
+            </a:endParaRPr>
           </a:p>
         </p:txBody>
       </p:sp>
@@ -4348,10 +5233,10 @@
       </p:grpSpPr>
       <p:pic>
         <p:nvPicPr>
-          <p:cNvPr id="7" name="Immagine 6">
-            <a:extLst>
-              <a:ext uri="{FF2B5EF4-FFF2-40B4-BE49-F238E27FC236}">
-                <a16:creationId xmlns:a16="http://schemas.microsoft.com/office/drawing/2014/main" id="{1D5A62A0-EBC4-319A-4B0C-1A7417350F20}"/>
+          <p:cNvPr id="3" name="Immagine 2">
+            <a:extLst>
+              <a:ext uri="{FF2B5EF4-FFF2-40B4-BE49-F238E27FC236}">
+                <a16:creationId xmlns:a16="http://schemas.microsoft.com/office/drawing/2014/main" id="{9975656B-F6BA-B7DE-641A-41342BCD15DD}"/>
               </a:ext>
             </a:extLst>
           </p:cNvPr>
@@ -4384,10 +5269,10 @@
       </p:pic>
       <p:sp>
         <p:nvSpPr>
-          <p:cNvPr id="4" name="CasellaDiTesto 3">
-            <a:extLst>
-              <a:ext uri="{FF2B5EF4-FFF2-40B4-BE49-F238E27FC236}">
-                <a16:creationId xmlns:a16="http://schemas.microsoft.com/office/drawing/2014/main" id="{3EB9ADD0-7BD0-1F9C-047F-4EF6F8E8024D}"/>
+          <p:cNvPr id="7" name="CasellaDiTesto 6">
+            <a:extLst>
+              <a:ext uri="{FF2B5EF4-FFF2-40B4-BE49-F238E27FC236}">
+                <a16:creationId xmlns:a16="http://schemas.microsoft.com/office/drawing/2014/main" id="{39FB5C5B-84C9-B056-08CC-B9B3EBC4D0FA}"/>
               </a:ext>
             </a:extLst>
           </p:cNvPr>
@@ -4396,7 +5281,7 @@
         </p:nvSpPr>
         <p:spPr>
           <a:xfrm>
-            <a:off x="9063367" y="1836919"/>
+            <a:off x="8301362" y="1847809"/>
             <a:ext cx="640934" cy="2246769"/>
           </a:xfrm>
           <a:prstGeom prst="rect">
@@ -4510,10 +5395,10 @@
       </p:sp>
       <p:sp>
         <p:nvSpPr>
-          <p:cNvPr id="5" name="CasellaDiTesto 4">
-            <a:extLst>
-              <a:ext uri="{FF2B5EF4-FFF2-40B4-BE49-F238E27FC236}">
-                <a16:creationId xmlns:a16="http://schemas.microsoft.com/office/drawing/2014/main" id="{CF87D66F-7DDC-1EF0-E21B-72BF1D720F66}"/>
+          <p:cNvPr id="8" name="CasellaDiTesto 7">
+            <a:extLst>
+              <a:ext uri="{FF2B5EF4-FFF2-40B4-BE49-F238E27FC236}">
+                <a16:creationId xmlns:a16="http://schemas.microsoft.com/office/drawing/2014/main" id="{99E2BD63-4797-300E-F2DC-FB2C30EE7629}"/>
               </a:ext>
             </a:extLst>
           </p:cNvPr>
@@ -4522,7 +5407,7 @@
         </p:nvSpPr>
         <p:spPr>
           <a:xfrm>
-            <a:off x="9837615" y="1826759"/>
+            <a:off x="9075610" y="1837649"/>
             <a:ext cx="640934" cy="2246769"/>
           </a:xfrm>
           <a:prstGeom prst="rect">
@@ -4618,10 +5503,406 @@
           </a:p>
         </p:txBody>
       </p:sp>
+      <p:sp>
+        <p:nvSpPr>
+          <p:cNvPr id="4" name="Rettangolo 3">
+            <a:extLst>
+              <a:ext uri="{FF2B5EF4-FFF2-40B4-BE49-F238E27FC236}">
+                <a16:creationId xmlns:a16="http://schemas.microsoft.com/office/drawing/2014/main" id="{E9B2F73C-638F-B1DE-B6AD-7ADD8B4AC819}"/>
+              </a:ext>
+            </a:extLst>
+          </p:cNvPr>
+          <p:cNvSpPr/>
+          <p:nvPr/>
+        </p:nvSpPr>
+        <p:spPr>
+          <a:xfrm>
+            <a:off x="8632715" y="1908254"/>
+            <a:ext cx="540000" cy="231366"/>
+          </a:xfrm>
+          <a:prstGeom prst="rect">
+            <a:avLst/>
+          </a:prstGeom>
+          <a:solidFill>
+            <a:srgbClr val="92D050">
+              <a:alpha val="30000"/>
+            </a:srgbClr>
+          </a:solidFill>
+          <a:ln>
+            <a:noFill/>
+          </a:ln>
+        </p:spPr>
+        <p:style>
+          <a:lnRef idx="2">
+            <a:schemeClr val="accent1">
+              <a:shade val="50000"/>
+            </a:schemeClr>
+          </a:lnRef>
+          <a:fillRef idx="1">
+            <a:schemeClr val="accent1"/>
+          </a:fillRef>
+          <a:effectRef idx="0">
+            <a:schemeClr val="accent1"/>
+          </a:effectRef>
+          <a:fontRef idx="minor">
+            <a:schemeClr val="lt1"/>
+          </a:fontRef>
+        </p:style>
+        <p:txBody>
+          <a:bodyPr rtlCol="0" anchor="ctr"/>
+          <a:lstStyle/>
+          <a:p>
+            <a:pPr algn="ctr"/>
+            <a:endParaRPr lang="de-CH" dirty="0">
+              <a:ln>
+                <a:solidFill>
+                  <a:schemeClr val="tx1"/>
+                </a:solidFill>
+              </a:ln>
+              <a:solidFill>
+                <a:schemeClr val="tx1"/>
+              </a:solidFill>
+              <a:highlight>
+                <a:srgbClr val="FFFF00"/>
+              </a:highlight>
+            </a:endParaRPr>
+          </a:p>
+        </p:txBody>
+      </p:sp>
+      <p:sp>
+        <p:nvSpPr>
+          <p:cNvPr id="5" name="Rettangolo 4">
+            <a:extLst>
+              <a:ext uri="{FF2B5EF4-FFF2-40B4-BE49-F238E27FC236}">
+                <a16:creationId xmlns:a16="http://schemas.microsoft.com/office/drawing/2014/main" id="{58AD1A9F-124F-7371-60DC-084D0CE2E5F1}"/>
+              </a:ext>
+            </a:extLst>
+          </p:cNvPr>
+          <p:cNvSpPr/>
+          <p:nvPr/>
+        </p:nvSpPr>
+        <p:spPr>
+          <a:xfrm>
+            <a:off x="7252101" y="2515433"/>
+            <a:ext cx="540000" cy="231366"/>
+          </a:xfrm>
+          <a:prstGeom prst="rect">
+            <a:avLst/>
+          </a:prstGeom>
+          <a:solidFill>
+            <a:srgbClr val="92D050">
+              <a:alpha val="30000"/>
+            </a:srgbClr>
+          </a:solidFill>
+          <a:ln>
+            <a:noFill/>
+          </a:ln>
+        </p:spPr>
+        <p:style>
+          <a:lnRef idx="2">
+            <a:schemeClr val="accent1">
+              <a:shade val="50000"/>
+            </a:schemeClr>
+          </a:lnRef>
+          <a:fillRef idx="1">
+            <a:schemeClr val="accent1"/>
+          </a:fillRef>
+          <a:effectRef idx="0">
+            <a:schemeClr val="accent1"/>
+          </a:effectRef>
+          <a:fontRef idx="minor">
+            <a:schemeClr val="lt1"/>
+          </a:fontRef>
+        </p:style>
+        <p:txBody>
+          <a:bodyPr rtlCol="0" anchor="ctr"/>
+          <a:lstStyle/>
+          <a:p>
+            <a:pPr algn="ctr"/>
+            <a:endParaRPr lang="de-CH" dirty="0">
+              <a:ln>
+                <a:solidFill>
+                  <a:schemeClr val="tx1"/>
+                </a:solidFill>
+              </a:ln>
+              <a:solidFill>
+                <a:schemeClr val="tx1"/>
+              </a:solidFill>
+              <a:highlight>
+                <a:srgbClr val="FFFF00"/>
+              </a:highlight>
+            </a:endParaRPr>
+          </a:p>
+        </p:txBody>
+      </p:sp>
+      <p:sp>
+        <p:nvSpPr>
+          <p:cNvPr id="6" name="Rettangolo 5">
+            <a:extLst>
+              <a:ext uri="{FF2B5EF4-FFF2-40B4-BE49-F238E27FC236}">
+                <a16:creationId xmlns:a16="http://schemas.microsoft.com/office/drawing/2014/main" id="{9E3322A0-9CCE-D1F3-9A79-BB15FEBA3D19}"/>
+              </a:ext>
+            </a:extLst>
+          </p:cNvPr>
+          <p:cNvSpPr/>
+          <p:nvPr/>
+        </p:nvSpPr>
+        <p:spPr>
+          <a:xfrm>
+            <a:off x="8632715" y="2812096"/>
+            <a:ext cx="540000" cy="231366"/>
+          </a:xfrm>
+          <a:prstGeom prst="rect">
+            <a:avLst/>
+          </a:prstGeom>
+          <a:solidFill>
+            <a:srgbClr val="92D050">
+              <a:alpha val="30000"/>
+            </a:srgbClr>
+          </a:solidFill>
+          <a:ln>
+            <a:noFill/>
+          </a:ln>
+        </p:spPr>
+        <p:style>
+          <a:lnRef idx="2">
+            <a:schemeClr val="accent1">
+              <a:shade val="50000"/>
+            </a:schemeClr>
+          </a:lnRef>
+          <a:fillRef idx="1">
+            <a:schemeClr val="accent1"/>
+          </a:fillRef>
+          <a:effectRef idx="0">
+            <a:schemeClr val="accent1"/>
+          </a:effectRef>
+          <a:fontRef idx="minor">
+            <a:schemeClr val="lt1"/>
+          </a:fontRef>
+        </p:style>
+        <p:txBody>
+          <a:bodyPr rtlCol="0" anchor="ctr"/>
+          <a:lstStyle/>
+          <a:p>
+            <a:pPr algn="ctr"/>
+            <a:endParaRPr lang="de-CH" dirty="0">
+              <a:ln>
+                <a:solidFill>
+                  <a:schemeClr val="tx1"/>
+                </a:solidFill>
+              </a:ln>
+              <a:solidFill>
+                <a:schemeClr val="tx1"/>
+              </a:solidFill>
+              <a:highlight>
+                <a:srgbClr val="FFFF00"/>
+              </a:highlight>
+            </a:endParaRPr>
+          </a:p>
+        </p:txBody>
+      </p:sp>
+      <p:sp>
+        <p:nvSpPr>
+          <p:cNvPr id="9" name="Rettangolo 8">
+            <a:extLst>
+              <a:ext uri="{FF2B5EF4-FFF2-40B4-BE49-F238E27FC236}">
+                <a16:creationId xmlns:a16="http://schemas.microsoft.com/office/drawing/2014/main" id="{9FED85D7-7429-6E89-F0F0-0FB8800BFA96}"/>
+              </a:ext>
+            </a:extLst>
+          </p:cNvPr>
+          <p:cNvSpPr/>
+          <p:nvPr/>
+        </p:nvSpPr>
+        <p:spPr>
+          <a:xfrm>
+            <a:off x="7252101" y="3743669"/>
+            <a:ext cx="1260000" cy="231366"/>
+          </a:xfrm>
+          <a:prstGeom prst="rect">
+            <a:avLst/>
+          </a:prstGeom>
+          <a:solidFill>
+            <a:srgbClr val="92D050">
+              <a:alpha val="30000"/>
+            </a:srgbClr>
+          </a:solidFill>
+          <a:ln>
+            <a:noFill/>
+          </a:ln>
+        </p:spPr>
+        <p:style>
+          <a:lnRef idx="2">
+            <a:schemeClr val="accent1">
+              <a:shade val="50000"/>
+            </a:schemeClr>
+          </a:lnRef>
+          <a:fillRef idx="1">
+            <a:schemeClr val="accent1"/>
+          </a:fillRef>
+          <a:effectRef idx="0">
+            <a:schemeClr val="accent1"/>
+          </a:effectRef>
+          <a:fontRef idx="minor">
+            <a:schemeClr val="lt1"/>
+          </a:fontRef>
+        </p:style>
+        <p:txBody>
+          <a:bodyPr rtlCol="0" anchor="ctr"/>
+          <a:lstStyle/>
+          <a:p>
+            <a:pPr algn="ctr"/>
+            <a:endParaRPr lang="de-CH" dirty="0">
+              <a:ln>
+                <a:solidFill>
+                  <a:schemeClr val="tx1"/>
+                </a:solidFill>
+              </a:ln>
+              <a:solidFill>
+                <a:schemeClr val="tx1"/>
+              </a:solidFill>
+              <a:highlight>
+                <a:srgbClr val="FFFF00"/>
+              </a:highlight>
+            </a:endParaRPr>
+          </a:p>
+        </p:txBody>
+      </p:sp>
+      <p:sp>
+        <p:nvSpPr>
+          <p:cNvPr id="17" name="Rettangolo 16">
+            <a:extLst>
+              <a:ext uri="{FF2B5EF4-FFF2-40B4-BE49-F238E27FC236}">
+                <a16:creationId xmlns:a16="http://schemas.microsoft.com/office/drawing/2014/main" id="{10C6482A-A575-5533-7B28-CFEF4A5389D6}"/>
+              </a:ext>
+            </a:extLst>
+          </p:cNvPr>
+          <p:cNvSpPr/>
+          <p:nvPr/>
+        </p:nvSpPr>
+        <p:spPr>
+          <a:xfrm>
+            <a:off x="7252101" y="3449717"/>
+            <a:ext cx="1260000" cy="231366"/>
+          </a:xfrm>
+          <a:prstGeom prst="rect">
+            <a:avLst/>
+          </a:prstGeom>
+          <a:solidFill>
+            <a:srgbClr val="92D050">
+              <a:alpha val="30000"/>
+            </a:srgbClr>
+          </a:solidFill>
+          <a:ln>
+            <a:noFill/>
+          </a:ln>
+        </p:spPr>
+        <p:style>
+          <a:lnRef idx="2">
+            <a:schemeClr val="accent1">
+              <a:shade val="50000"/>
+            </a:schemeClr>
+          </a:lnRef>
+          <a:fillRef idx="1">
+            <a:schemeClr val="accent1"/>
+          </a:fillRef>
+          <a:effectRef idx="0">
+            <a:schemeClr val="accent1"/>
+          </a:effectRef>
+          <a:fontRef idx="minor">
+            <a:schemeClr val="lt1"/>
+          </a:fontRef>
+        </p:style>
+        <p:txBody>
+          <a:bodyPr rtlCol="0" anchor="ctr"/>
+          <a:lstStyle/>
+          <a:p>
+            <a:pPr algn="ctr"/>
+            <a:endParaRPr lang="de-CH" dirty="0">
+              <a:ln>
+                <a:solidFill>
+                  <a:schemeClr val="tx1"/>
+                </a:solidFill>
+              </a:ln>
+              <a:solidFill>
+                <a:schemeClr val="tx1"/>
+              </a:solidFill>
+              <a:highlight>
+                <a:srgbClr val="FFFF00"/>
+              </a:highlight>
+            </a:endParaRPr>
+          </a:p>
+        </p:txBody>
+      </p:sp>
+      <p:sp>
+        <p:nvSpPr>
+          <p:cNvPr id="19" name="Rettangolo 18">
+            <a:extLst>
+              <a:ext uri="{FF2B5EF4-FFF2-40B4-BE49-F238E27FC236}">
+                <a16:creationId xmlns:a16="http://schemas.microsoft.com/office/drawing/2014/main" id="{064060E2-2F48-E453-7095-3BA120F88E0F}"/>
+              </a:ext>
+            </a:extLst>
+          </p:cNvPr>
+          <p:cNvSpPr/>
+          <p:nvPr/>
+        </p:nvSpPr>
+        <p:spPr>
+          <a:xfrm>
+            <a:off x="7252101" y="3149551"/>
+            <a:ext cx="540000" cy="231366"/>
+          </a:xfrm>
+          <a:prstGeom prst="rect">
+            <a:avLst/>
+          </a:prstGeom>
+          <a:solidFill>
+            <a:srgbClr val="92D050">
+              <a:alpha val="30000"/>
+            </a:srgbClr>
+          </a:solidFill>
+          <a:ln>
+            <a:noFill/>
+          </a:ln>
+        </p:spPr>
+        <p:style>
+          <a:lnRef idx="2">
+            <a:schemeClr val="accent1">
+              <a:shade val="50000"/>
+            </a:schemeClr>
+          </a:lnRef>
+          <a:fillRef idx="1">
+            <a:schemeClr val="accent1"/>
+          </a:fillRef>
+          <a:effectRef idx="0">
+            <a:schemeClr val="accent1"/>
+          </a:effectRef>
+          <a:fontRef idx="minor">
+            <a:schemeClr val="lt1"/>
+          </a:fontRef>
+        </p:style>
+        <p:txBody>
+          <a:bodyPr rtlCol="0" anchor="ctr"/>
+          <a:lstStyle/>
+          <a:p>
+            <a:pPr algn="ctr"/>
+            <a:endParaRPr lang="de-CH" dirty="0">
+              <a:ln>
+                <a:solidFill>
+                  <a:schemeClr val="tx1"/>
+                </a:solidFill>
+              </a:ln>
+              <a:solidFill>
+                <a:schemeClr val="tx1"/>
+              </a:solidFill>
+              <a:highlight>
+                <a:srgbClr val="FFFF00"/>
+              </a:highlight>
+            </a:endParaRPr>
+          </a:p>
+        </p:txBody>
+      </p:sp>
     </p:spTree>
     <p:extLst>
       <p:ext uri="{BB962C8B-B14F-4D97-AF65-F5344CB8AC3E}">
-        <p14:creationId xmlns:p14="http://schemas.microsoft.com/office/powerpoint/2010/main" val="1324342689"/>
+        <p14:creationId xmlns:p14="http://schemas.microsoft.com/office/powerpoint/2010/main" val="3864314638"/>
       </p:ext>
     </p:extLst>
   </p:cSld>

</xml_diff>

<commit_message>
Update contra accounts images
</commit_message>
<xml_diff>
--- a/en/accounting/other functions/node_9981_images.pptx
+++ b/en/accounting/other functions/node_9981_images.pptx
@@ -263,7 +263,7 @@
           <a:p>
             <a:fld id="{EFB833B5-D8B8-4489-A7BD-CF7361CF5303}" type="datetimeFigureOut">
               <a:rPr lang="de-CH" smtClean="0"/>
-              <a:t>18.11.2022</a:t>
+              <a:t>21.11.2022</a:t>
             </a:fld>
             <a:endParaRPr lang="de-CH"/>
           </a:p>
@@ -463,7 +463,7 @@
           <a:p>
             <a:fld id="{EFB833B5-D8B8-4489-A7BD-CF7361CF5303}" type="datetimeFigureOut">
               <a:rPr lang="de-CH" smtClean="0"/>
-              <a:t>18.11.2022</a:t>
+              <a:t>21.11.2022</a:t>
             </a:fld>
             <a:endParaRPr lang="de-CH"/>
           </a:p>
@@ -673,7 +673,7 @@
           <a:p>
             <a:fld id="{EFB833B5-D8B8-4489-A7BD-CF7361CF5303}" type="datetimeFigureOut">
               <a:rPr lang="de-CH" smtClean="0"/>
-              <a:t>18.11.2022</a:t>
+              <a:t>21.11.2022</a:t>
             </a:fld>
             <a:endParaRPr lang="de-CH"/>
           </a:p>
@@ -873,7 +873,7 @@
           <a:p>
             <a:fld id="{EFB833B5-D8B8-4489-A7BD-CF7361CF5303}" type="datetimeFigureOut">
               <a:rPr lang="de-CH" smtClean="0"/>
-              <a:t>18.11.2022</a:t>
+              <a:t>21.11.2022</a:t>
             </a:fld>
             <a:endParaRPr lang="de-CH"/>
           </a:p>
@@ -1149,7 +1149,7 @@
           <a:p>
             <a:fld id="{EFB833B5-D8B8-4489-A7BD-CF7361CF5303}" type="datetimeFigureOut">
               <a:rPr lang="de-CH" smtClean="0"/>
-              <a:t>18.11.2022</a:t>
+              <a:t>21.11.2022</a:t>
             </a:fld>
             <a:endParaRPr lang="de-CH"/>
           </a:p>
@@ -1417,7 +1417,7 @@
           <a:p>
             <a:fld id="{EFB833B5-D8B8-4489-A7BD-CF7361CF5303}" type="datetimeFigureOut">
               <a:rPr lang="de-CH" smtClean="0"/>
-              <a:t>18.11.2022</a:t>
+              <a:t>21.11.2022</a:t>
             </a:fld>
             <a:endParaRPr lang="de-CH"/>
           </a:p>
@@ -1832,7 +1832,7 @@
           <a:p>
             <a:fld id="{EFB833B5-D8B8-4489-A7BD-CF7361CF5303}" type="datetimeFigureOut">
               <a:rPr lang="de-CH" smtClean="0"/>
-              <a:t>18.11.2022</a:t>
+              <a:t>21.11.2022</a:t>
             </a:fld>
             <a:endParaRPr lang="de-CH"/>
           </a:p>
@@ -1974,7 +1974,7 @@
           <a:p>
             <a:fld id="{EFB833B5-D8B8-4489-A7BD-CF7361CF5303}" type="datetimeFigureOut">
               <a:rPr lang="de-CH" smtClean="0"/>
-              <a:t>18.11.2022</a:t>
+              <a:t>21.11.2022</a:t>
             </a:fld>
             <a:endParaRPr lang="de-CH"/>
           </a:p>
@@ -2087,7 +2087,7 @@
           <a:p>
             <a:fld id="{EFB833B5-D8B8-4489-A7BD-CF7361CF5303}" type="datetimeFigureOut">
               <a:rPr lang="de-CH" smtClean="0"/>
-              <a:t>18.11.2022</a:t>
+              <a:t>21.11.2022</a:t>
             </a:fld>
             <a:endParaRPr lang="de-CH"/>
           </a:p>
@@ -2400,7 +2400,7 @@
           <a:p>
             <a:fld id="{EFB833B5-D8B8-4489-A7BD-CF7361CF5303}" type="datetimeFigureOut">
               <a:rPr lang="de-CH" smtClean="0"/>
-              <a:t>18.11.2022</a:t>
+              <a:t>21.11.2022</a:t>
             </a:fld>
             <a:endParaRPr lang="de-CH"/>
           </a:p>
@@ -2689,7 +2689,7 @@
           <a:p>
             <a:fld id="{EFB833B5-D8B8-4489-A7BD-CF7361CF5303}" type="datetimeFigureOut">
               <a:rPr lang="de-CH" smtClean="0"/>
-              <a:t>18.11.2022</a:t>
+              <a:t>21.11.2022</a:t>
             </a:fld>
             <a:endParaRPr lang="de-CH"/>
           </a:p>
@@ -2932,7 +2932,7 @@
           <a:p>
             <a:fld id="{EFB833B5-D8B8-4489-A7BD-CF7361CF5303}" type="datetimeFigureOut">
               <a:rPr lang="de-CH" smtClean="0"/>
-              <a:t>18.11.2022</a:t>
+              <a:t>21.11.2022</a:t>
             </a:fld>
             <a:endParaRPr lang="de-CH"/>
           </a:p>
@@ -3351,10 +3351,10 @@
       </p:grpSpPr>
       <p:pic>
         <p:nvPicPr>
-          <p:cNvPr id="26" name="Immagine 25">
-            <a:extLst>
-              <a:ext uri="{FF2B5EF4-FFF2-40B4-BE49-F238E27FC236}">
-                <a16:creationId xmlns:a16="http://schemas.microsoft.com/office/drawing/2014/main" id="{FD8CCD54-69C1-4F5A-8551-5C0B3EFC4060}"/>
+          <p:cNvPr id="25" name="Immagine 24">
+            <a:extLst>
+              <a:ext uri="{FF2B5EF4-FFF2-40B4-BE49-F238E27FC236}">
+                <a16:creationId xmlns:a16="http://schemas.microsoft.com/office/drawing/2014/main" id="{9ED24220-F0A9-148B-B862-540DB1C5914E}"/>
               </a:ext>
             </a:extLst>
           </p:cNvPr>
@@ -3377,8 +3377,8 @@
         </p:blipFill>
         <p:spPr>
           <a:xfrm>
-            <a:off x="0" y="724370"/>
-            <a:ext cx="12192000" cy="5409259"/>
+            <a:off x="0" y="954851"/>
+            <a:ext cx="12192000" cy="4948297"/>
           </a:xfrm>
           <a:prstGeom prst="rect">
             <a:avLst/>
@@ -3399,8 +3399,8 @@
         </p:nvSpPr>
         <p:spPr>
           <a:xfrm>
-            <a:off x="9063367" y="1836919"/>
-            <a:ext cx="640934" cy="2246769"/>
+            <a:off x="8805913" y="1774776"/>
+            <a:ext cx="640934" cy="2554545"/>
           </a:xfrm>
           <a:prstGeom prst="rect">
             <a:avLst/>
@@ -3464,6 +3464,18 @@
             </a:endParaRPr>
           </a:p>
           <a:p>
+            <a:endParaRPr lang="de-CH" sz="2000" dirty="0">
+              <a:solidFill>
+                <a:srgbClr val="FF0000"/>
+              </a:solidFill>
+              <a:effectLst/>
+              <a:latin typeface="Calibri" panose="020F0502020204030204" pitchFamily="34" charset="0"/>
+              <a:ea typeface="DengXian" panose="02010600030101010101" pitchFamily="2" charset="-122"/>
+              <a:cs typeface="Times New Roman" panose="02020603050405020304" pitchFamily="18" charset="0"/>
+              <a:sym typeface="Wingdings" panose="05000000000000000000" pitchFamily="2" charset="2"/>
+            </a:endParaRPr>
+          </a:p>
+          <a:p>
             <a:r>
               <a:rPr lang="de-CH" sz="2000" dirty="0">
                 <a:solidFill>
@@ -3525,7 +3537,7 @@
         </p:nvSpPr>
         <p:spPr>
           <a:xfrm>
-            <a:off x="9837615" y="1826759"/>
+            <a:off x="9882004" y="2075335"/>
             <a:ext cx="640934" cy="2246769"/>
           </a:xfrm>
           <a:prstGeom prst="rect">
@@ -3635,7 +3647,7 @@
         </p:nvSpPr>
         <p:spPr>
           <a:xfrm>
-            <a:off x="1567910" y="1913120"/>
+            <a:off x="1550154" y="2143948"/>
             <a:ext cx="900000" cy="231366"/>
           </a:xfrm>
           <a:prstGeom prst="rect">
@@ -3698,8 +3710,8 @@
         </p:nvSpPr>
         <p:spPr>
           <a:xfrm>
-            <a:off x="3810364" y="2522725"/>
-            <a:ext cx="1296000" cy="231366"/>
+            <a:off x="3810364" y="2771302"/>
+            <a:ext cx="1223275" cy="231366"/>
           </a:xfrm>
           <a:prstGeom prst="rect">
             <a:avLst/>
@@ -3761,7 +3773,7 @@
         </p:nvSpPr>
         <p:spPr>
           <a:xfrm>
-            <a:off x="1557020" y="2838406"/>
+            <a:off x="1550154" y="3069229"/>
             <a:ext cx="900000" cy="231366"/>
           </a:xfrm>
           <a:prstGeom prst="rect">
@@ -3824,8 +3836,8 @@
         </p:nvSpPr>
         <p:spPr>
           <a:xfrm>
-            <a:off x="3810364" y="3135088"/>
-            <a:ext cx="720000" cy="231366"/>
+            <a:off x="3810364" y="3365909"/>
+            <a:ext cx="712700" cy="231366"/>
           </a:xfrm>
           <a:prstGeom prst="rect">
             <a:avLst/>
@@ -3887,7 +3899,7 @@
         </p:nvSpPr>
         <p:spPr>
           <a:xfrm>
-            <a:off x="7010763" y="3124198"/>
+            <a:off x="7010763" y="3365909"/>
             <a:ext cx="1008000" cy="231366"/>
           </a:xfrm>
           <a:prstGeom prst="rect">
@@ -3950,8 +3962,8 @@
         </p:nvSpPr>
         <p:spPr>
           <a:xfrm>
-            <a:off x="3798788" y="3448003"/>
-            <a:ext cx="1080000" cy="231366"/>
+            <a:off x="3798788" y="3669946"/>
+            <a:ext cx="977398" cy="231366"/>
           </a:xfrm>
           <a:prstGeom prst="rect">
             <a:avLst/>
@@ -4013,7 +4025,7 @@
         </p:nvSpPr>
         <p:spPr>
           <a:xfrm>
-            <a:off x="5829947" y="3448003"/>
+            <a:off x="5732289" y="3669946"/>
             <a:ext cx="648000" cy="231366"/>
           </a:xfrm>
           <a:prstGeom prst="rect">
@@ -4076,8 +4088,8 @@
         </p:nvSpPr>
         <p:spPr>
           <a:xfrm>
-            <a:off x="3809673" y="3741921"/>
-            <a:ext cx="1080000" cy="231366"/>
+            <a:off x="3809673" y="3963864"/>
+            <a:ext cx="966513" cy="231366"/>
           </a:xfrm>
           <a:prstGeom prst="rect">
             <a:avLst/>
@@ -4139,7 +4151,7 @@
         </p:nvSpPr>
         <p:spPr>
           <a:xfrm>
-            <a:off x="5840832" y="3741921"/>
+            <a:off x="5732289" y="3963864"/>
             <a:ext cx="648000" cy="231366"/>
           </a:xfrm>
           <a:prstGeom prst="rect">
@@ -4202,7 +4214,7 @@
         </p:nvSpPr>
         <p:spPr>
           <a:xfrm>
-            <a:off x="9463551" y="1913120"/>
+            <a:off x="9188342" y="2152822"/>
             <a:ext cx="432000" cy="231366"/>
           </a:xfrm>
           <a:prstGeom prst="rect">
@@ -4268,7 +4280,7 @@
         </p:nvSpPr>
         <p:spPr>
           <a:xfrm>
-            <a:off x="8059294" y="2533601"/>
+            <a:off x="8085928" y="2462577"/>
             <a:ext cx="432000" cy="231366"/>
           </a:xfrm>
           <a:prstGeom prst="rect">
@@ -4334,7 +4346,7 @@
         </p:nvSpPr>
         <p:spPr>
           <a:xfrm>
-            <a:off x="8059294" y="3135088"/>
+            <a:off x="8085928" y="3383665"/>
             <a:ext cx="432000" cy="231366"/>
           </a:xfrm>
           <a:prstGeom prst="rect">
@@ -4400,7 +4412,7 @@
         </p:nvSpPr>
         <p:spPr>
           <a:xfrm>
-            <a:off x="8059294" y="3437117"/>
+            <a:off x="8085928" y="3685694"/>
             <a:ext cx="432000" cy="231366"/>
           </a:xfrm>
           <a:prstGeom prst="rect">
@@ -4466,7 +4478,7 @@
         </p:nvSpPr>
         <p:spPr>
           <a:xfrm>
-            <a:off x="8059294" y="3750032"/>
+            <a:off x="8085928" y="3989731"/>
             <a:ext cx="432000" cy="231366"/>
           </a:xfrm>
           <a:prstGeom prst="rect">
@@ -4532,7 +4544,7 @@
         </p:nvSpPr>
         <p:spPr>
           <a:xfrm>
-            <a:off x="9463551" y="2833734"/>
+            <a:off x="9188342" y="3082313"/>
             <a:ext cx="432000" cy="231366"/>
           </a:xfrm>
           <a:prstGeom prst="rect">
@@ -4580,6 +4592,62 @@
               <a:highlight>
                 <a:srgbClr val="FFFF00"/>
               </a:highlight>
+            </a:endParaRPr>
+          </a:p>
+        </p:txBody>
+      </p:sp>
+      <p:sp>
+        <p:nvSpPr>
+          <p:cNvPr id="6" name="Rettangolo 5">
+            <a:extLst>
+              <a:ext uri="{FF2B5EF4-FFF2-40B4-BE49-F238E27FC236}">
+                <a16:creationId xmlns:a16="http://schemas.microsoft.com/office/drawing/2014/main" id="{806D6CA5-8595-B254-7A2F-F1F2E45841AB}"/>
+              </a:ext>
+            </a:extLst>
+          </p:cNvPr>
+          <p:cNvSpPr/>
+          <p:nvPr/>
+        </p:nvSpPr>
+        <p:spPr>
+          <a:xfrm>
+            <a:off x="7572652" y="1322775"/>
+            <a:ext cx="4314548" cy="319597"/>
+          </a:xfrm>
+          <a:prstGeom prst="rect">
+            <a:avLst/>
+          </a:prstGeom>
+          <a:solidFill>
+            <a:schemeClr val="bg1"/>
+          </a:solidFill>
+          <a:ln>
+            <a:noFill/>
+          </a:ln>
+        </p:spPr>
+        <p:style>
+          <a:lnRef idx="2">
+            <a:schemeClr val="accent1">
+              <a:shade val="50000"/>
+            </a:schemeClr>
+          </a:lnRef>
+          <a:fillRef idx="1">
+            <a:schemeClr val="accent1"/>
+          </a:fillRef>
+          <a:effectRef idx="0">
+            <a:schemeClr val="accent1"/>
+          </a:effectRef>
+          <a:fontRef idx="minor">
+            <a:schemeClr val="lt1"/>
+          </a:fontRef>
+        </p:style>
+        <p:txBody>
+          <a:bodyPr rtlCol="0" anchor="ctr"/>
+          <a:lstStyle/>
+          <a:p>
+            <a:pPr algn="ctr"/>
+            <a:endParaRPr lang="de-CH">
+              <a:solidFill>
+                <a:schemeClr val="bg1"/>
+              </a:solidFill>
             </a:endParaRPr>
           </a:p>
         </p:txBody>
@@ -4616,10 +4684,10 @@
       </p:grpSpPr>
       <p:pic>
         <p:nvPicPr>
-          <p:cNvPr id="12" name="Immagine 11">
-            <a:extLst>
-              <a:ext uri="{FF2B5EF4-FFF2-40B4-BE49-F238E27FC236}">
-                <a16:creationId xmlns:a16="http://schemas.microsoft.com/office/drawing/2014/main" id="{7427017E-5454-6378-A4C2-937EF0D97314}"/>
+          <p:cNvPr id="16" name="Immagine 15">
+            <a:extLst>
+              <a:ext uri="{FF2B5EF4-FFF2-40B4-BE49-F238E27FC236}">
+                <a16:creationId xmlns:a16="http://schemas.microsoft.com/office/drawing/2014/main" id="{DB2E20CB-6B48-92D7-D50B-D60D436527AD}"/>
               </a:ext>
             </a:extLst>
           </p:cNvPr>
@@ -4642,8 +4710,8 @@
         </p:blipFill>
         <p:spPr>
           <a:xfrm>
-            <a:off x="0" y="1072444"/>
-            <a:ext cx="12192000" cy="4713112"/>
+            <a:off x="0" y="1255889"/>
+            <a:ext cx="12192000" cy="4346222"/>
           </a:xfrm>
           <a:prstGeom prst="rect">
             <a:avLst/>
@@ -4664,7 +4732,7 @@
         </p:nvSpPr>
         <p:spPr>
           <a:xfrm>
-            <a:off x="8050996" y="1880461"/>
+            <a:off x="8335077" y="2066898"/>
             <a:ext cx="640934" cy="1938992"/>
           </a:xfrm>
           <a:prstGeom prst="rect">
@@ -4778,7 +4846,7 @@
         </p:nvSpPr>
         <p:spPr>
           <a:xfrm>
-            <a:off x="8879674" y="1881187"/>
+            <a:off x="9412332" y="2067623"/>
             <a:ext cx="640934" cy="2246769"/>
           </a:xfrm>
           <a:prstGeom prst="rect">
@@ -4885,7 +4953,7 @@
         </p:nvSpPr>
         <p:spPr>
           <a:xfrm>
-            <a:off x="8537645" y="2267483"/>
+            <a:off x="8702239" y="2459258"/>
             <a:ext cx="432000" cy="231366"/>
           </a:xfrm>
           <a:prstGeom prst="rect">
@@ -4951,7 +5019,7 @@
         </p:nvSpPr>
         <p:spPr>
           <a:xfrm>
-            <a:off x="6805787" y="2574941"/>
+            <a:off x="7169769" y="2761371"/>
             <a:ext cx="540000" cy="231366"/>
           </a:xfrm>
           <a:prstGeom prst="rect">
@@ -5017,7 +5085,7 @@
         </p:nvSpPr>
         <p:spPr>
           <a:xfrm>
-            <a:off x="6805787" y="2882401"/>
+            <a:off x="7169769" y="3068831"/>
             <a:ext cx="540000" cy="231366"/>
           </a:xfrm>
           <a:prstGeom prst="rect">
@@ -5083,7 +5151,7 @@
         </p:nvSpPr>
         <p:spPr>
           <a:xfrm>
-            <a:off x="6805787" y="3189861"/>
+            <a:off x="7169769" y="3376291"/>
             <a:ext cx="1260000" cy="231366"/>
           </a:xfrm>
           <a:prstGeom prst="rect">
@@ -5149,7 +5217,7 @@
         </p:nvSpPr>
         <p:spPr>
           <a:xfrm>
-            <a:off x="6805787" y="3482375"/>
+            <a:off x="7169769" y="3668805"/>
             <a:ext cx="1260000" cy="231366"/>
           </a:xfrm>
           <a:prstGeom prst="rect">
@@ -5197,6 +5265,62 @@
               <a:highlight>
                 <a:srgbClr val="FFFF00"/>
               </a:highlight>
+            </a:endParaRPr>
+          </a:p>
+        </p:txBody>
+      </p:sp>
+      <p:sp>
+        <p:nvSpPr>
+          <p:cNvPr id="14" name="Rettangolo 13">
+            <a:extLst>
+              <a:ext uri="{FF2B5EF4-FFF2-40B4-BE49-F238E27FC236}">
+                <a16:creationId xmlns:a16="http://schemas.microsoft.com/office/drawing/2014/main" id="{3AF3628A-AF1A-A314-D998-BE25BD29697E}"/>
+              </a:ext>
+            </a:extLst>
+          </p:cNvPr>
+          <p:cNvSpPr/>
+          <p:nvPr/>
+        </p:nvSpPr>
+        <p:spPr>
+          <a:xfrm>
+            <a:off x="7549772" y="1619075"/>
+            <a:ext cx="4314548" cy="319597"/>
+          </a:xfrm>
+          <a:prstGeom prst="rect">
+            <a:avLst/>
+          </a:prstGeom>
+          <a:solidFill>
+            <a:schemeClr val="bg1"/>
+          </a:solidFill>
+          <a:ln>
+            <a:noFill/>
+          </a:ln>
+        </p:spPr>
+        <p:style>
+          <a:lnRef idx="2">
+            <a:schemeClr val="accent1">
+              <a:shade val="50000"/>
+            </a:schemeClr>
+          </a:lnRef>
+          <a:fillRef idx="1">
+            <a:schemeClr val="accent1"/>
+          </a:fillRef>
+          <a:effectRef idx="0">
+            <a:schemeClr val="accent1"/>
+          </a:effectRef>
+          <a:fontRef idx="minor">
+            <a:schemeClr val="lt1"/>
+          </a:fontRef>
+        </p:style>
+        <p:txBody>
+          <a:bodyPr rtlCol="0" anchor="ctr"/>
+          <a:lstStyle/>
+          <a:p>
+            <a:pPr algn="ctr"/>
+            <a:endParaRPr lang="de-CH">
+              <a:solidFill>
+                <a:schemeClr val="bg1"/>
+              </a:solidFill>
             </a:endParaRPr>
           </a:p>
         </p:txBody>
@@ -5233,10 +5357,10 @@
       </p:grpSpPr>
       <p:pic>
         <p:nvPicPr>
-          <p:cNvPr id="3" name="Immagine 2">
-            <a:extLst>
-              <a:ext uri="{FF2B5EF4-FFF2-40B4-BE49-F238E27FC236}">
-                <a16:creationId xmlns:a16="http://schemas.microsoft.com/office/drawing/2014/main" id="{9975656B-F6BA-B7DE-641A-41342BCD15DD}"/>
+          <p:cNvPr id="13" name="Immagine 12">
+            <a:extLst>
+              <a:ext uri="{FF2B5EF4-FFF2-40B4-BE49-F238E27FC236}">
+                <a16:creationId xmlns:a16="http://schemas.microsoft.com/office/drawing/2014/main" id="{67101DA5-DE96-9674-99DE-5ED1E6F281F8}"/>
               </a:ext>
             </a:extLst>
           </p:cNvPr>
@@ -5259,8 +5383,8 @@
         </p:blipFill>
         <p:spPr>
           <a:xfrm>
-            <a:off x="0" y="724370"/>
-            <a:ext cx="12192000" cy="5409259"/>
+            <a:off x="0" y="635000"/>
+            <a:ext cx="12192000" cy="5588000"/>
           </a:xfrm>
           <a:prstGeom prst="rect">
             <a:avLst/>
@@ -5281,7 +5405,7 @@
         </p:nvSpPr>
         <p:spPr>
           <a:xfrm>
-            <a:off x="8301362" y="1847809"/>
+            <a:off x="8780753" y="1759029"/>
             <a:ext cx="640934" cy="2246769"/>
           </a:xfrm>
           <a:prstGeom prst="rect">
@@ -5407,7 +5531,7 @@
         </p:nvSpPr>
         <p:spPr>
           <a:xfrm>
-            <a:off x="9075610" y="1837649"/>
+            <a:off x="9910111" y="1766625"/>
             <a:ext cx="640934" cy="2246769"/>
           </a:xfrm>
           <a:prstGeom prst="rect">
@@ -5517,7 +5641,7 @@
         </p:nvSpPr>
         <p:spPr>
           <a:xfrm>
-            <a:off x="8632715" y="1908254"/>
+            <a:off x="9156494" y="1837230"/>
             <a:ext cx="540000" cy="231366"/>
           </a:xfrm>
           <a:prstGeom prst="rect">
@@ -5583,7 +5707,7 @@
         </p:nvSpPr>
         <p:spPr>
           <a:xfrm>
-            <a:off x="7252101" y="2515433"/>
+            <a:off x="7749250" y="2426653"/>
             <a:ext cx="540000" cy="231366"/>
           </a:xfrm>
           <a:prstGeom prst="rect">
@@ -5649,7 +5773,7 @@
         </p:nvSpPr>
         <p:spPr>
           <a:xfrm>
-            <a:off x="8632715" y="2812096"/>
+            <a:off x="9156494" y="2749950"/>
             <a:ext cx="540000" cy="231366"/>
           </a:xfrm>
           <a:prstGeom prst="rect">
@@ -5715,8 +5839,8 @@
         </p:nvSpPr>
         <p:spPr>
           <a:xfrm>
-            <a:off x="7252101" y="3743669"/>
-            <a:ext cx="1260000" cy="231366"/>
+            <a:off x="7749250" y="3654889"/>
+            <a:ext cx="1111405" cy="231366"/>
           </a:xfrm>
           <a:prstGeom prst="rect">
             <a:avLst/>
@@ -5781,8 +5905,8 @@
         </p:nvSpPr>
         <p:spPr>
           <a:xfrm>
-            <a:off x="7252101" y="3449717"/>
-            <a:ext cx="1260000" cy="231366"/>
+            <a:off x="7749250" y="3360937"/>
+            <a:ext cx="1111405" cy="231366"/>
           </a:xfrm>
           <a:prstGeom prst="rect">
             <a:avLst/>
@@ -5847,7 +5971,7 @@
         </p:nvSpPr>
         <p:spPr>
           <a:xfrm>
-            <a:off x="7252101" y="3149551"/>
+            <a:off x="7749250" y="3060771"/>
             <a:ext cx="540000" cy="231366"/>
           </a:xfrm>
           <a:prstGeom prst="rect">
@@ -5895,6 +6019,62 @@
               <a:highlight>
                 <a:srgbClr val="FFFF00"/>
               </a:highlight>
+            </a:endParaRPr>
+          </a:p>
+        </p:txBody>
+      </p:sp>
+      <p:sp>
+        <p:nvSpPr>
+          <p:cNvPr id="11" name="Rettangolo 10">
+            <a:extLst>
+              <a:ext uri="{FF2B5EF4-FFF2-40B4-BE49-F238E27FC236}">
+                <a16:creationId xmlns:a16="http://schemas.microsoft.com/office/drawing/2014/main" id="{F6D8A4D8-5ABE-C0A0-AD7D-D2F1EC26DC19}"/>
+              </a:ext>
+            </a:extLst>
+          </p:cNvPr>
+          <p:cNvSpPr/>
+          <p:nvPr/>
+        </p:nvSpPr>
+        <p:spPr>
+          <a:xfrm>
+            <a:off x="7572652" y="1003175"/>
+            <a:ext cx="4314548" cy="319597"/>
+          </a:xfrm>
+          <a:prstGeom prst="rect">
+            <a:avLst/>
+          </a:prstGeom>
+          <a:solidFill>
+            <a:schemeClr val="bg1"/>
+          </a:solidFill>
+          <a:ln>
+            <a:noFill/>
+          </a:ln>
+        </p:spPr>
+        <p:style>
+          <a:lnRef idx="2">
+            <a:schemeClr val="accent1">
+              <a:shade val="50000"/>
+            </a:schemeClr>
+          </a:lnRef>
+          <a:fillRef idx="1">
+            <a:schemeClr val="accent1"/>
+          </a:fillRef>
+          <a:effectRef idx="0">
+            <a:schemeClr val="accent1"/>
+          </a:effectRef>
+          <a:fontRef idx="minor">
+            <a:schemeClr val="lt1"/>
+          </a:fontRef>
+        </p:style>
+        <p:txBody>
+          <a:bodyPr rtlCol="0" anchor="ctr"/>
+          <a:lstStyle/>
+          <a:p>
+            <a:pPr algn="ctr"/>
+            <a:endParaRPr lang="de-CH">
+              <a:solidFill>
+                <a:schemeClr val="bg1"/>
+              </a:solidFill>
             </a:endParaRPr>
           </a:p>
         </p:txBody>

</xml_diff>